<commit_message>
feat(slimfaas): publish sync mode to all pods
</commit_message>
<xml_diff>
--- a/documentation/slimfaas.pptx
+++ b/documentation/slimfaas.pptx
@@ -5,14 +5,15 @@
     <p:sldMasterId id="2147483648" r:id="rId4"/>
   </p:sldMasterIdLst>
   <p:notesMasterIdLst>
-    <p:notesMasterId r:id="rId7"/>
+    <p:notesMasterId r:id="rId8"/>
   </p:notesMasterIdLst>
   <p:handoutMasterIdLst>
-    <p:handoutMasterId r:id="rId8"/>
+    <p:handoutMasterId r:id="rId9"/>
   </p:handoutMasterIdLst>
   <p:sldIdLst>
     <p:sldId id="891" r:id="rId5"/>
     <p:sldId id="892" r:id="rId6"/>
+    <p:sldId id="893" r:id="rId7"/>
   </p:sldIdLst>
   <p:sldSz cx="12192000" cy="6858000"/>
   <p:notesSz cx="6858000" cy="9144000"/>
@@ -118,6 +119,7 @@
           <p14:sldIdLst>
             <p14:sldId id="891"/>
             <p14:sldId id="892"/>
+            <p14:sldId id="893"/>
           </p14:sldIdLst>
         </p14:section>
       </p14:sectionLst>
@@ -234,7 +236,7 @@
           <a:p>
             <a:fld id="{F60FFC85-34C0-4167-8801-71D65E4D986C}" type="datetimeFigureOut">
               <a:rPr lang="fr-FR" smtClean="0"/>
-              <a:t>06/12/2023</a:t>
+              <a:t>24/05/2024</a:t>
             </a:fld>
             <a:endParaRPr lang="fr-FR"/>
           </a:p>
@@ -411,7 +413,7 @@
           <a:p>
             <a:fld id="{F2EE8696-3B2B-7D49-B212-A8F746F3A84B}" type="datetimeFigureOut">
               <a:rPr lang="es-ES_tradnl" smtClean="0"/>
-              <a:t>06/12/2023</a:t>
+              <a:t>24/05/2024</a:t>
             </a:fld>
             <a:endParaRPr lang="es-ES_tradnl"/>
           </a:p>
@@ -1108,7 +1110,7 @@
           <a:p>
             <a:fld id="{80160E5B-2E24-B941-8DE0-C0A90C36B7C5}" type="datetimeFigureOut">
               <a:rPr lang="en-GB" smtClean="0"/>
-              <a:t>06/12/2023</a:t>
+              <a:t>24/05/2024</a:t>
             </a:fld>
             <a:endParaRPr lang="en-GB"/>
           </a:p>
@@ -1306,7 +1308,7 @@
           <a:p>
             <a:fld id="{80160E5B-2E24-B941-8DE0-C0A90C36B7C5}" type="datetimeFigureOut">
               <a:rPr lang="en-GB" smtClean="0"/>
-              <a:t>06/12/2023</a:t>
+              <a:t>24/05/2024</a:t>
             </a:fld>
             <a:endParaRPr lang="en-GB"/>
           </a:p>
@@ -1553,7 +1555,7 @@
           <a:p>
             <a:fld id="{80160E5B-2E24-B941-8DE0-C0A90C36B7C5}" type="datetimeFigureOut">
               <a:rPr lang="en-GB" smtClean="0"/>
-              <a:t>06/12/2023</a:t>
+              <a:t>24/05/2024</a:t>
             </a:fld>
             <a:endParaRPr lang="en-GB"/>
           </a:p>
@@ -1772,7 +1774,7 @@
           <a:p>
             <a:fld id="{80160E5B-2E24-B941-8DE0-C0A90C36B7C5}" type="datetimeFigureOut">
               <a:rPr lang="en-GB" smtClean="0"/>
-              <a:t>06/12/2023</a:t>
+              <a:t>24/05/2024</a:t>
             </a:fld>
             <a:endParaRPr lang="en-GB"/>
           </a:p>
@@ -2047,7 +2049,7 @@
           <a:p>
             <a:fld id="{80160E5B-2E24-B941-8DE0-C0A90C36B7C5}" type="datetimeFigureOut">
               <a:rPr lang="en-GB" smtClean="0"/>
-              <a:t>06/12/2023</a:t>
+              <a:t>24/05/2024</a:t>
             </a:fld>
             <a:endParaRPr lang="en-GB"/>
           </a:p>
@@ -2351,7 +2353,7 @@
           <a:p>
             <a:fld id="{80160E5B-2E24-B941-8DE0-C0A90C36B7C5}" type="datetimeFigureOut">
               <a:rPr lang="en-GB" smtClean="0"/>
-              <a:t>06/12/2023</a:t>
+              <a:t>24/05/2024</a:t>
             </a:fld>
             <a:endParaRPr lang="en-GB"/>
           </a:p>
@@ -2802,7 +2804,7 @@
           <a:p>
             <a:fld id="{80160E5B-2E24-B941-8DE0-C0A90C36B7C5}" type="datetimeFigureOut">
               <a:rPr lang="en-GB" smtClean="0"/>
-              <a:t>06/12/2023</a:t>
+              <a:t>24/05/2024</a:t>
             </a:fld>
             <a:endParaRPr lang="en-GB"/>
           </a:p>
@@ -2982,7 +2984,7 @@
           <a:p>
             <a:fld id="{80160E5B-2E24-B941-8DE0-C0A90C36B7C5}" type="datetimeFigureOut">
               <a:rPr lang="en-GB" smtClean="0"/>
-              <a:t>06/12/2023</a:t>
+              <a:t>24/05/2024</a:t>
             </a:fld>
             <a:endParaRPr lang="en-GB"/>
           </a:p>
@@ -3134,7 +3136,7 @@
           <a:p>
             <a:fld id="{80160E5B-2E24-B941-8DE0-C0A90C36B7C5}" type="datetimeFigureOut">
               <a:rPr lang="en-GB" smtClean="0"/>
-              <a:t>06/12/2023</a:t>
+              <a:t>24/05/2024</a:t>
             </a:fld>
             <a:endParaRPr lang="en-GB"/>
           </a:p>
@@ -3484,7 +3486,7 @@
           <a:p>
             <a:fld id="{80160E5B-2E24-B941-8DE0-C0A90C36B7C5}" type="datetimeFigureOut">
               <a:rPr lang="en-GB" smtClean="0"/>
-              <a:t>06/12/2023</a:t>
+              <a:t>24/05/2024</a:t>
             </a:fld>
             <a:endParaRPr lang="en-GB"/>
           </a:p>
@@ -3811,7 +3813,7 @@
           <a:p>
             <a:fld id="{80160E5B-2E24-B941-8DE0-C0A90C36B7C5}" type="datetimeFigureOut">
               <a:rPr lang="en-GB" smtClean="0"/>
-              <a:t>06/12/2023</a:t>
+              <a:t>24/05/2024</a:t>
             </a:fld>
             <a:endParaRPr lang="en-GB"/>
           </a:p>
@@ -4091,7 +4093,7 @@
           <a:p>
             <a:fld id="{80160E5B-2E24-B941-8DE0-C0A90C36B7C5}" type="datetimeFigureOut">
               <a:rPr lang="en-GB" smtClean="0"/>
-              <a:t>06/12/2023</a:t>
+              <a:t>24/05/2024</a:t>
             </a:fld>
             <a:endParaRPr lang="en-GB"/>
           </a:p>
@@ -6335,6 +6337,1054 @@
     <p:extLst>
       <p:ext uri="{BB962C8B-B14F-4D97-AF65-F5344CB8AC3E}">
         <p14:creationId xmlns:p14="http://schemas.microsoft.com/office/powerpoint/2010/main" val="129032465"/>
+      </p:ext>
+    </p:extLst>
+  </p:cSld>
+  <p:clrMapOvr>
+    <a:masterClrMapping/>
+  </p:clrMapOvr>
+</p:sld>
+</file>
+
+<file path=ppt/slides/slide3.xml><?xml version="1.0" encoding="utf-8"?>
+<p:sld xmlns:a="http://schemas.openxmlformats.org/drawingml/2006/main" xmlns:r="http://schemas.openxmlformats.org/officeDocument/2006/relationships" xmlns:p="http://schemas.openxmlformats.org/presentationml/2006/main">
+  <p:cSld>
+    <p:spTree>
+      <p:nvGrpSpPr>
+        <p:cNvPr id="1" name=""/>
+        <p:cNvGrpSpPr/>
+        <p:nvPr/>
+      </p:nvGrpSpPr>
+      <p:grpSpPr>
+        <a:xfrm>
+          <a:off x="0" y="0"/>
+          <a:ext cx="0" cy="0"/>
+          <a:chOff x="0" y="0"/>
+          <a:chExt cx="0" cy="0"/>
+        </a:xfrm>
+      </p:grpSpPr>
+      <p:sp>
+        <p:nvSpPr>
+          <p:cNvPr id="3" name="Espace réservé du contenu 2">
+            <a:extLst>
+              <a:ext uri="{FF2B5EF4-FFF2-40B4-BE49-F238E27FC236}">
+                <a16:creationId xmlns:a16="http://schemas.microsoft.com/office/drawing/2014/main" id="{FC72177F-6E5E-241E-BA74-8D91DC6E05F3}"/>
+              </a:ext>
+            </a:extLst>
+          </p:cNvPr>
+          <p:cNvSpPr>
+            <a:spLocks noGrp="1"/>
+          </p:cNvSpPr>
+          <p:nvPr>
+            <p:ph idx="1"/>
+          </p:nvPr>
+        </p:nvSpPr>
+        <p:spPr/>
+        <p:txBody>
+          <a:bodyPr/>
+          <a:lstStyle/>
+          <a:p>
+            <a:endParaRPr lang="fr-FR" dirty="0"/>
+          </a:p>
+        </p:txBody>
+      </p:sp>
+      <p:sp>
+        <p:nvSpPr>
+          <p:cNvPr id="6" name="Rounded Rectangle 44">
+            <a:extLst>
+              <a:ext uri="{FF2B5EF4-FFF2-40B4-BE49-F238E27FC236}">
+                <a16:creationId xmlns:a16="http://schemas.microsoft.com/office/drawing/2014/main" id="{DDD08BA0-70BB-583F-312D-C1BE714A89E8}"/>
+              </a:ext>
+            </a:extLst>
+          </p:cNvPr>
+          <p:cNvSpPr/>
+          <p:nvPr/>
+        </p:nvSpPr>
+        <p:spPr>
+          <a:xfrm>
+            <a:off x="4275182" y="2785207"/>
+            <a:ext cx="2245224" cy="1125268"/>
+          </a:xfrm>
+          <a:prstGeom prst="roundRect">
+            <a:avLst/>
+          </a:prstGeom>
+          <a:solidFill>
+            <a:schemeClr val="bg2">
+              <a:lumMod val="25000"/>
+            </a:schemeClr>
+          </a:solidFill>
+          <a:ln>
+            <a:noFill/>
+          </a:ln>
+        </p:spPr>
+        <p:style>
+          <a:lnRef idx="2">
+            <a:schemeClr val="accent1">
+              <a:shade val="50000"/>
+            </a:schemeClr>
+          </a:lnRef>
+          <a:fillRef idx="1">
+            <a:schemeClr val="accent1"/>
+          </a:fillRef>
+          <a:effectRef idx="0">
+            <a:schemeClr val="accent1"/>
+          </a:effectRef>
+          <a:fontRef idx="minor">
+            <a:schemeClr val="lt1"/>
+          </a:fontRef>
+        </p:style>
+        <p:txBody>
+          <a:bodyPr rtlCol="0" anchor="ctr"/>
+          <a:lstStyle/>
+          <a:p>
+            <a:pPr algn="ctr"/>
+            <a:r>
+              <a:rPr lang="en-US" sz="2400" dirty="0">
+                <a:solidFill>
+                  <a:schemeClr val="bg1"/>
+                </a:solidFill>
+              </a:rPr>
+              <a:t>SlimFaas</a:t>
+            </a:r>
+          </a:p>
+        </p:txBody>
+      </p:sp>
+      <p:cxnSp>
+        <p:nvCxnSpPr>
+          <p:cNvPr id="7" name="Connecteur droit avec flèche 6">
+            <a:extLst>
+              <a:ext uri="{FF2B5EF4-FFF2-40B4-BE49-F238E27FC236}">
+                <a16:creationId xmlns:a16="http://schemas.microsoft.com/office/drawing/2014/main" id="{2846A4F1-5F1E-1B4A-EAEC-F51C758D93A6}"/>
+              </a:ext>
+            </a:extLst>
+          </p:cNvPr>
+          <p:cNvCxnSpPr>
+            <a:cxnSpLocks/>
+            <a:stCxn id="8" idx="3"/>
+            <a:endCxn id="6" idx="1"/>
+          </p:cNvCxnSpPr>
+          <p:nvPr/>
+        </p:nvCxnSpPr>
+        <p:spPr>
+          <a:xfrm flipV="1">
+            <a:off x="3322445" y="3347841"/>
+            <a:ext cx="952737" cy="1"/>
+          </a:xfrm>
+          <a:prstGeom prst="straightConnector1">
+            <a:avLst/>
+          </a:prstGeom>
+          <a:ln w="127000">
+            <a:solidFill>
+              <a:schemeClr val="accent6">
+                <a:lumMod val="75000"/>
+              </a:schemeClr>
+            </a:solidFill>
+            <a:tailEnd type="triangle"/>
+          </a:ln>
+        </p:spPr>
+        <p:style>
+          <a:lnRef idx="1">
+            <a:schemeClr val="accent1"/>
+          </a:lnRef>
+          <a:fillRef idx="0">
+            <a:schemeClr val="accent1"/>
+          </a:fillRef>
+          <a:effectRef idx="0">
+            <a:schemeClr val="accent1"/>
+          </a:effectRef>
+          <a:fontRef idx="minor">
+            <a:schemeClr val="tx1"/>
+          </a:fontRef>
+        </p:style>
+      </p:cxnSp>
+      <p:sp>
+        <p:nvSpPr>
+          <p:cNvPr id="8" name="ZoneTexte 7">
+            <a:extLst>
+              <a:ext uri="{FF2B5EF4-FFF2-40B4-BE49-F238E27FC236}">
+                <a16:creationId xmlns:a16="http://schemas.microsoft.com/office/drawing/2014/main" id="{AC32730B-6D07-37BE-5E05-17826CC33CC8}"/>
+              </a:ext>
+            </a:extLst>
+          </p:cNvPr>
+          <p:cNvSpPr txBox="1"/>
+          <p:nvPr/>
+        </p:nvSpPr>
+        <p:spPr>
+          <a:xfrm>
+            <a:off x="166495" y="2932343"/>
+            <a:ext cx="3155950" cy="830997"/>
+          </a:xfrm>
+          <a:prstGeom prst="rect">
+            <a:avLst/>
+          </a:prstGeom>
+          <a:noFill/>
+        </p:spPr>
+        <p:txBody>
+          <a:bodyPr wrap="square" rtlCol="0">
+            <a:spAutoFit/>
+          </a:bodyPr>
+          <a:lstStyle/>
+          <a:p>
+            <a:r>
+              <a:rPr lang="fr-FR" sz="1600" dirty="0"/>
+              <a:t>HTTP POST</a:t>
+            </a:r>
+          </a:p>
+          <a:p>
+            <a:r>
+              <a:rPr lang="fr-FR" sz="1600" dirty="0">
+                <a:hlinkClick r:id="rId2"/>
+              </a:rPr>
+              <a:t>http://slimfaas/publish/fibonacci</a:t>
+            </a:r>
+            <a:endParaRPr lang="fr-FR" sz="1600" dirty="0"/>
+          </a:p>
+          <a:p>
+            <a:r>
+              <a:rPr lang="fr-FR" sz="1600" dirty="0"/>
+              <a:t>{</a:t>
+            </a:r>
+            <a:r>
+              <a:rPr lang="fr-FR" sz="1600" b="0" i="0" dirty="0">
+                <a:effectLst/>
+                <a:latin typeface="-apple-system"/>
+              </a:rPr>
+              <a:t>"</a:t>
+            </a:r>
+            <a:r>
+              <a:rPr lang="fr-FR" sz="1600" dirty="0"/>
+              <a:t>input</a:t>
+            </a:r>
+            <a:r>
+              <a:rPr lang="fr-FR" sz="1600" b="0" i="0" dirty="0">
+                <a:effectLst/>
+                <a:latin typeface="-apple-system"/>
+              </a:rPr>
+              <a:t>"</a:t>
+            </a:r>
+            <a:r>
+              <a:rPr lang="fr-FR" sz="1600" dirty="0"/>
+              <a:t>:42}</a:t>
+            </a:r>
+          </a:p>
+        </p:txBody>
+      </p:sp>
+      <p:sp>
+        <p:nvSpPr>
+          <p:cNvPr id="9" name="ZoneTexte 8">
+            <a:extLst>
+              <a:ext uri="{FF2B5EF4-FFF2-40B4-BE49-F238E27FC236}">
+                <a16:creationId xmlns:a16="http://schemas.microsoft.com/office/drawing/2014/main" id="{6611272C-28EE-7524-CD4D-AAE3B72A1A73}"/>
+              </a:ext>
+            </a:extLst>
+          </p:cNvPr>
+          <p:cNvSpPr txBox="1"/>
+          <p:nvPr/>
+        </p:nvSpPr>
+        <p:spPr>
+          <a:xfrm>
+            <a:off x="6542729" y="997387"/>
+            <a:ext cx="1659171" cy="830997"/>
+          </a:xfrm>
+          <a:prstGeom prst="rect">
+            <a:avLst/>
+          </a:prstGeom>
+          <a:noFill/>
+        </p:spPr>
+        <p:txBody>
+          <a:bodyPr wrap="square" rtlCol="0">
+            <a:spAutoFit/>
+          </a:bodyPr>
+          <a:lstStyle/>
+          <a:p>
+            <a:r>
+              <a:rPr lang="fr-FR" sz="1600" dirty="0"/>
+              <a:t>HTTP POST</a:t>
+            </a:r>
+          </a:p>
+          <a:p>
+            <a:r>
+              <a:rPr lang="fr-FR" sz="1600" dirty="0">
+                <a:hlinkClick r:id="rId3"/>
+              </a:rPr>
+              <a:t>http://fibonacci</a:t>
+            </a:r>
+            <a:r>
+              <a:rPr lang="fr-FR" sz="1600" dirty="0"/>
+              <a:t> </a:t>
+            </a:r>
+            <a:br>
+              <a:rPr lang="fr-FR" sz="1600" dirty="0"/>
+            </a:br>
+            <a:r>
+              <a:rPr lang="fr-FR" sz="1600" dirty="0"/>
+              <a:t>{</a:t>
+            </a:r>
+            <a:r>
+              <a:rPr lang="fr-FR" sz="1600" b="0" i="0" dirty="0">
+                <a:effectLst/>
+                <a:latin typeface="-apple-system"/>
+              </a:rPr>
+              <a:t>"</a:t>
+            </a:r>
+            <a:r>
+              <a:rPr lang="fr-FR" sz="1600" dirty="0"/>
+              <a:t>input</a:t>
+            </a:r>
+            <a:r>
+              <a:rPr lang="fr-FR" sz="1600" b="0" i="0" dirty="0">
+                <a:effectLst/>
+                <a:latin typeface="-apple-system"/>
+              </a:rPr>
+              <a:t>"</a:t>
+            </a:r>
+            <a:r>
+              <a:rPr lang="fr-FR" sz="1600" dirty="0"/>
+              <a:t>:42}</a:t>
+            </a:r>
+          </a:p>
+        </p:txBody>
+      </p:sp>
+      <p:sp>
+        <p:nvSpPr>
+          <p:cNvPr id="10" name="Rounded Rectangle 45">
+            <a:extLst>
+              <a:ext uri="{FF2B5EF4-FFF2-40B4-BE49-F238E27FC236}">
+                <a16:creationId xmlns:a16="http://schemas.microsoft.com/office/drawing/2014/main" id="{D79C9965-A2CD-C2C1-A01C-697EABB121C8}"/>
+              </a:ext>
+            </a:extLst>
+          </p:cNvPr>
+          <p:cNvSpPr/>
+          <p:nvPr/>
+        </p:nvSpPr>
+        <p:spPr>
+          <a:xfrm>
+            <a:off x="8812333" y="509182"/>
+            <a:ext cx="3040144" cy="1540322"/>
+          </a:xfrm>
+          <a:prstGeom prst="roundRect">
+            <a:avLst/>
+          </a:prstGeom>
+          <a:solidFill>
+            <a:schemeClr val="bg2">
+              <a:lumMod val="25000"/>
+            </a:schemeClr>
+          </a:solidFill>
+          <a:ln>
+            <a:noFill/>
+          </a:ln>
+        </p:spPr>
+        <p:style>
+          <a:lnRef idx="2">
+            <a:schemeClr val="accent1">
+              <a:shade val="50000"/>
+            </a:schemeClr>
+          </a:lnRef>
+          <a:fillRef idx="1">
+            <a:schemeClr val="accent1"/>
+          </a:fillRef>
+          <a:effectRef idx="0">
+            <a:schemeClr val="accent1"/>
+          </a:effectRef>
+          <a:fontRef idx="minor">
+            <a:schemeClr val="lt1"/>
+          </a:fontRef>
+        </p:style>
+        <p:txBody>
+          <a:bodyPr rtlCol="0" anchor="ctr"/>
+          <a:lstStyle/>
+          <a:p>
+            <a:pPr algn="ctr"/>
+            <a:r>
+              <a:rPr lang="fr-FR" sz="2400" dirty="0">
+                <a:solidFill>
+                  <a:schemeClr val="bg1"/>
+                </a:solidFill>
+              </a:rPr>
+              <a:t>function « </a:t>
+            </a:r>
+            <a:r>
+              <a:rPr lang="fr-FR" sz="2400" dirty="0" err="1">
+                <a:solidFill>
+                  <a:schemeClr val="bg1"/>
+                </a:solidFill>
+              </a:rPr>
+              <a:t>fibonacci</a:t>
+            </a:r>
+            <a:r>
+              <a:rPr lang="fr-FR" sz="2400" dirty="0">
+                <a:solidFill>
+                  <a:schemeClr val="bg1"/>
+                </a:solidFill>
+              </a:rPr>
+              <a:t> » instance 1</a:t>
+            </a:r>
+            <a:endParaRPr lang="en-FR" sz="2400" dirty="0">
+              <a:solidFill>
+                <a:schemeClr val="bg1"/>
+              </a:solidFill>
+            </a:endParaRPr>
+          </a:p>
+        </p:txBody>
+      </p:sp>
+      <p:pic>
+        <p:nvPicPr>
+          <p:cNvPr id="11" name="Picture 2" descr="Afficher l’image source">
+            <a:extLst>
+              <a:ext uri="{FF2B5EF4-FFF2-40B4-BE49-F238E27FC236}">
+                <a16:creationId xmlns:a16="http://schemas.microsoft.com/office/drawing/2014/main" id="{B80A9736-02F1-1190-8A3C-F71D0B8C1D08}"/>
+              </a:ext>
+            </a:extLst>
+          </p:cNvPr>
+          <p:cNvPicPr>
+            <a:picLocks noChangeAspect="1" noChangeArrowheads="1"/>
+          </p:cNvPicPr>
+          <p:nvPr/>
+        </p:nvPicPr>
+        <p:blipFill>
+          <a:blip r:embed="rId4">
+            <a:extLst>
+              <a:ext uri="{28A0092B-C50C-407E-A947-70E740481C1C}">
+                <a14:useLocalDpi xmlns:a14="http://schemas.microsoft.com/office/drawing/2010/main" val="0"/>
+              </a:ext>
+            </a:extLst>
+          </a:blip>
+          <a:srcRect/>
+          <a:stretch>
+            <a:fillRect/>
+          </a:stretch>
+        </p:blipFill>
+        <p:spPr bwMode="auto">
+          <a:xfrm>
+            <a:off x="8618142" y="206059"/>
+            <a:ext cx="588793" cy="572693"/>
+          </a:xfrm>
+          <a:prstGeom prst="rect">
+            <a:avLst/>
+          </a:prstGeom>
+          <a:noFill/>
+          <a:extLst>
+            <a:ext uri="{909E8E84-426E-40DD-AFC4-6F175D3DCCD1}">
+              <a14:hiddenFill xmlns:a14="http://schemas.microsoft.com/office/drawing/2010/main">
+                <a:solidFill>
+                  <a:srgbClr val="FFFFFF"/>
+                </a:solidFill>
+              </a14:hiddenFill>
+            </a:ext>
+          </a:extLst>
+        </p:spPr>
+      </p:pic>
+      <p:cxnSp>
+        <p:nvCxnSpPr>
+          <p:cNvPr id="12" name="Connecteur droit avec flèche 11">
+            <a:extLst>
+              <a:ext uri="{FF2B5EF4-FFF2-40B4-BE49-F238E27FC236}">
+                <a16:creationId xmlns:a16="http://schemas.microsoft.com/office/drawing/2014/main" id="{3AFE1186-6876-1E2D-BB90-BFA726C0ACA3}"/>
+              </a:ext>
+            </a:extLst>
+          </p:cNvPr>
+          <p:cNvCxnSpPr>
+            <a:cxnSpLocks/>
+            <a:stCxn id="6" idx="3"/>
+            <a:endCxn id="10" idx="1"/>
+          </p:cNvCxnSpPr>
+          <p:nvPr/>
+        </p:nvCxnSpPr>
+        <p:spPr>
+          <a:xfrm flipV="1">
+            <a:off x="6520406" y="1279343"/>
+            <a:ext cx="2291927" cy="2068498"/>
+          </a:xfrm>
+          <a:prstGeom prst="straightConnector1">
+            <a:avLst/>
+          </a:prstGeom>
+          <a:ln w="127000">
+            <a:solidFill>
+              <a:schemeClr val="accent6">
+                <a:lumMod val="75000"/>
+              </a:schemeClr>
+            </a:solidFill>
+            <a:tailEnd type="triangle"/>
+          </a:ln>
+        </p:spPr>
+        <p:style>
+          <a:lnRef idx="1">
+            <a:schemeClr val="accent1"/>
+          </a:lnRef>
+          <a:fillRef idx="0">
+            <a:schemeClr val="accent1"/>
+          </a:fillRef>
+          <a:effectRef idx="0">
+            <a:schemeClr val="accent1"/>
+          </a:effectRef>
+          <a:fontRef idx="minor">
+            <a:schemeClr val="tx1"/>
+          </a:fontRef>
+        </p:style>
+      </p:cxnSp>
+      <p:sp>
+        <p:nvSpPr>
+          <p:cNvPr id="22" name="ZoneTexte 21">
+            <a:extLst>
+              <a:ext uri="{FF2B5EF4-FFF2-40B4-BE49-F238E27FC236}">
+                <a16:creationId xmlns:a16="http://schemas.microsoft.com/office/drawing/2014/main" id="{B20F6461-EFC4-60A1-6479-F83792C4E189}"/>
+              </a:ext>
+            </a:extLst>
+          </p:cNvPr>
+          <p:cNvSpPr txBox="1"/>
+          <p:nvPr/>
+        </p:nvSpPr>
+        <p:spPr>
+          <a:xfrm>
+            <a:off x="7304194" y="3284661"/>
+            <a:ext cx="1659171" cy="830997"/>
+          </a:xfrm>
+          <a:prstGeom prst="rect">
+            <a:avLst/>
+          </a:prstGeom>
+          <a:noFill/>
+        </p:spPr>
+        <p:txBody>
+          <a:bodyPr wrap="square" rtlCol="0">
+            <a:spAutoFit/>
+          </a:bodyPr>
+          <a:lstStyle/>
+          <a:p>
+            <a:r>
+              <a:rPr lang="fr-FR" sz="1600" dirty="0"/>
+              <a:t>HTTP POST</a:t>
+            </a:r>
+          </a:p>
+          <a:p>
+            <a:r>
+              <a:rPr lang="fr-FR" sz="1600" dirty="0">
+                <a:hlinkClick r:id="rId3"/>
+              </a:rPr>
+              <a:t>http://fibonacci</a:t>
+            </a:r>
+            <a:r>
+              <a:rPr lang="fr-FR" sz="1600" dirty="0"/>
+              <a:t> </a:t>
+            </a:r>
+            <a:br>
+              <a:rPr lang="fr-FR" sz="1600" dirty="0"/>
+            </a:br>
+            <a:r>
+              <a:rPr lang="fr-FR" sz="1600" dirty="0"/>
+              <a:t>{</a:t>
+            </a:r>
+            <a:r>
+              <a:rPr lang="fr-FR" sz="1600" b="0" i="0" dirty="0">
+                <a:effectLst/>
+                <a:latin typeface="-apple-system"/>
+              </a:rPr>
+              <a:t>"</a:t>
+            </a:r>
+            <a:r>
+              <a:rPr lang="fr-FR" sz="1600" dirty="0"/>
+              <a:t>input</a:t>
+            </a:r>
+            <a:r>
+              <a:rPr lang="fr-FR" sz="1600" b="0" i="0" dirty="0">
+                <a:effectLst/>
+                <a:latin typeface="-apple-system"/>
+              </a:rPr>
+              <a:t>"</a:t>
+            </a:r>
+            <a:r>
+              <a:rPr lang="fr-FR" sz="1600" dirty="0"/>
+              <a:t>:42}</a:t>
+            </a:r>
+          </a:p>
+        </p:txBody>
+      </p:sp>
+      <p:sp>
+        <p:nvSpPr>
+          <p:cNvPr id="23" name="Rounded Rectangle 45">
+            <a:extLst>
+              <a:ext uri="{FF2B5EF4-FFF2-40B4-BE49-F238E27FC236}">
+                <a16:creationId xmlns:a16="http://schemas.microsoft.com/office/drawing/2014/main" id="{02CDF874-6617-192D-7FBF-DFCDF050DE8B}"/>
+              </a:ext>
+            </a:extLst>
+          </p:cNvPr>
+          <p:cNvSpPr/>
+          <p:nvPr/>
+        </p:nvSpPr>
+        <p:spPr>
+          <a:xfrm>
+            <a:off x="8858733" y="2401822"/>
+            <a:ext cx="3040144" cy="1540322"/>
+          </a:xfrm>
+          <a:prstGeom prst="roundRect">
+            <a:avLst/>
+          </a:prstGeom>
+          <a:solidFill>
+            <a:schemeClr val="bg2">
+              <a:lumMod val="25000"/>
+            </a:schemeClr>
+          </a:solidFill>
+          <a:ln>
+            <a:noFill/>
+          </a:ln>
+        </p:spPr>
+        <p:style>
+          <a:lnRef idx="2">
+            <a:schemeClr val="accent1">
+              <a:shade val="50000"/>
+            </a:schemeClr>
+          </a:lnRef>
+          <a:fillRef idx="1">
+            <a:schemeClr val="accent1"/>
+          </a:fillRef>
+          <a:effectRef idx="0">
+            <a:schemeClr val="accent1"/>
+          </a:effectRef>
+          <a:fontRef idx="minor">
+            <a:schemeClr val="lt1"/>
+          </a:fontRef>
+        </p:style>
+        <p:txBody>
+          <a:bodyPr rtlCol="0" anchor="ctr"/>
+          <a:lstStyle/>
+          <a:p>
+            <a:pPr algn="ctr"/>
+            <a:r>
+              <a:rPr lang="fr-FR" sz="2400" dirty="0" err="1">
+                <a:solidFill>
+                  <a:schemeClr val="bg1"/>
+                </a:solidFill>
+              </a:rPr>
+              <a:t>function</a:t>
+            </a:r>
+            <a:r>
+              <a:rPr lang="fr-FR" sz="2400" dirty="0">
+                <a:solidFill>
+                  <a:schemeClr val="bg1"/>
+                </a:solidFill>
+              </a:rPr>
+              <a:t> « </a:t>
+            </a:r>
+            <a:r>
+              <a:rPr lang="fr-FR" sz="2400" dirty="0" err="1">
+                <a:solidFill>
+                  <a:schemeClr val="bg1"/>
+                </a:solidFill>
+              </a:rPr>
+              <a:t>fibonacci</a:t>
+            </a:r>
+            <a:r>
+              <a:rPr lang="fr-FR" sz="2400" dirty="0">
+                <a:solidFill>
+                  <a:schemeClr val="bg1"/>
+                </a:solidFill>
+              </a:rPr>
+              <a:t> » instance 2</a:t>
+            </a:r>
+          </a:p>
+        </p:txBody>
+      </p:sp>
+      <p:pic>
+        <p:nvPicPr>
+          <p:cNvPr id="24" name="Picture 2" descr="Afficher l’image source">
+            <a:extLst>
+              <a:ext uri="{FF2B5EF4-FFF2-40B4-BE49-F238E27FC236}">
+                <a16:creationId xmlns:a16="http://schemas.microsoft.com/office/drawing/2014/main" id="{6367FF6E-BE42-9237-982C-7249BC298201}"/>
+              </a:ext>
+            </a:extLst>
+          </p:cNvPr>
+          <p:cNvPicPr>
+            <a:picLocks noChangeAspect="1" noChangeArrowheads="1"/>
+          </p:cNvPicPr>
+          <p:nvPr/>
+        </p:nvPicPr>
+        <p:blipFill>
+          <a:blip r:embed="rId4">
+            <a:extLst>
+              <a:ext uri="{28A0092B-C50C-407E-A947-70E740481C1C}">
+                <a14:useLocalDpi xmlns:a14="http://schemas.microsoft.com/office/drawing/2010/main" val="0"/>
+              </a:ext>
+            </a:extLst>
+          </a:blip>
+          <a:srcRect/>
+          <a:stretch>
+            <a:fillRect/>
+          </a:stretch>
+        </p:blipFill>
+        <p:spPr bwMode="auto">
+          <a:xfrm>
+            <a:off x="8799603" y="2111546"/>
+            <a:ext cx="588793" cy="572693"/>
+          </a:xfrm>
+          <a:prstGeom prst="rect">
+            <a:avLst/>
+          </a:prstGeom>
+          <a:noFill/>
+          <a:extLst>
+            <a:ext uri="{909E8E84-426E-40DD-AFC4-6F175D3DCCD1}">
+              <a14:hiddenFill xmlns:a14="http://schemas.microsoft.com/office/drawing/2010/main">
+                <a:solidFill>
+                  <a:srgbClr val="FFFFFF"/>
+                </a:solidFill>
+              </a14:hiddenFill>
+            </a:ext>
+          </a:extLst>
+        </p:spPr>
+      </p:pic>
+      <p:cxnSp>
+        <p:nvCxnSpPr>
+          <p:cNvPr id="25" name="Connecteur droit avec flèche 24">
+            <a:extLst>
+              <a:ext uri="{FF2B5EF4-FFF2-40B4-BE49-F238E27FC236}">
+                <a16:creationId xmlns:a16="http://schemas.microsoft.com/office/drawing/2014/main" id="{47CCB34C-BDE9-83E6-DBE9-369CE229F27F}"/>
+              </a:ext>
+            </a:extLst>
+          </p:cNvPr>
+          <p:cNvCxnSpPr>
+            <a:cxnSpLocks/>
+            <a:stCxn id="6" idx="3"/>
+            <a:endCxn id="23" idx="1"/>
+          </p:cNvCxnSpPr>
+          <p:nvPr/>
+        </p:nvCxnSpPr>
+        <p:spPr>
+          <a:xfrm flipV="1">
+            <a:off x="6520406" y="3171983"/>
+            <a:ext cx="2338327" cy="175858"/>
+          </a:xfrm>
+          <a:prstGeom prst="straightConnector1">
+            <a:avLst/>
+          </a:prstGeom>
+          <a:ln w="127000">
+            <a:solidFill>
+              <a:schemeClr val="accent6">
+                <a:lumMod val="75000"/>
+              </a:schemeClr>
+            </a:solidFill>
+            <a:tailEnd type="triangle"/>
+          </a:ln>
+        </p:spPr>
+        <p:style>
+          <a:lnRef idx="1">
+            <a:schemeClr val="accent1"/>
+          </a:lnRef>
+          <a:fillRef idx="0">
+            <a:schemeClr val="accent1"/>
+          </a:fillRef>
+          <a:effectRef idx="0">
+            <a:schemeClr val="accent1"/>
+          </a:effectRef>
+          <a:fontRef idx="minor">
+            <a:schemeClr val="tx1"/>
+          </a:fontRef>
+        </p:style>
+      </p:cxnSp>
+      <p:sp>
+        <p:nvSpPr>
+          <p:cNvPr id="28" name="Rounded Rectangle 45">
+            <a:extLst>
+              <a:ext uri="{FF2B5EF4-FFF2-40B4-BE49-F238E27FC236}">
+                <a16:creationId xmlns:a16="http://schemas.microsoft.com/office/drawing/2014/main" id="{38FF5A4C-559C-1D52-9476-314AAD56BECB}"/>
+              </a:ext>
+            </a:extLst>
+          </p:cNvPr>
+          <p:cNvSpPr/>
+          <p:nvPr/>
+        </p:nvSpPr>
+        <p:spPr>
+          <a:xfrm>
+            <a:off x="8822212" y="4493355"/>
+            <a:ext cx="3040144" cy="1540322"/>
+          </a:xfrm>
+          <a:prstGeom prst="roundRect">
+            <a:avLst/>
+          </a:prstGeom>
+          <a:solidFill>
+            <a:schemeClr val="bg2">
+              <a:lumMod val="25000"/>
+            </a:schemeClr>
+          </a:solidFill>
+          <a:ln>
+            <a:noFill/>
+          </a:ln>
+        </p:spPr>
+        <p:style>
+          <a:lnRef idx="2">
+            <a:schemeClr val="accent1">
+              <a:shade val="50000"/>
+            </a:schemeClr>
+          </a:lnRef>
+          <a:fillRef idx="1">
+            <a:schemeClr val="accent1"/>
+          </a:fillRef>
+          <a:effectRef idx="0">
+            <a:schemeClr val="accent1"/>
+          </a:effectRef>
+          <a:fontRef idx="minor">
+            <a:schemeClr val="lt1"/>
+          </a:fontRef>
+        </p:style>
+        <p:txBody>
+          <a:bodyPr rtlCol="0" anchor="ctr"/>
+          <a:lstStyle/>
+          <a:p>
+            <a:pPr algn="ctr"/>
+            <a:r>
+              <a:rPr lang="fr-FR" sz="2400" dirty="0" err="1">
+                <a:solidFill>
+                  <a:schemeClr val="bg1"/>
+                </a:solidFill>
+              </a:rPr>
+              <a:t>function</a:t>
+            </a:r>
+            <a:r>
+              <a:rPr lang="fr-FR" sz="2400" dirty="0">
+                <a:solidFill>
+                  <a:schemeClr val="bg1"/>
+                </a:solidFill>
+              </a:rPr>
+              <a:t> « </a:t>
+            </a:r>
+            <a:r>
+              <a:rPr lang="fr-FR" sz="2400" dirty="0" err="1">
+                <a:solidFill>
+                  <a:schemeClr val="bg1"/>
+                </a:solidFill>
+              </a:rPr>
+              <a:t>fibonacci</a:t>
+            </a:r>
+            <a:r>
+              <a:rPr lang="fr-FR" sz="2400" dirty="0">
+                <a:solidFill>
+                  <a:schemeClr val="bg1"/>
+                </a:solidFill>
+              </a:rPr>
+              <a:t> » instance 3</a:t>
+            </a:r>
+          </a:p>
+        </p:txBody>
+      </p:sp>
+      <p:pic>
+        <p:nvPicPr>
+          <p:cNvPr id="29" name="Picture 2" descr="Afficher l’image source">
+            <a:extLst>
+              <a:ext uri="{FF2B5EF4-FFF2-40B4-BE49-F238E27FC236}">
+                <a16:creationId xmlns:a16="http://schemas.microsoft.com/office/drawing/2014/main" id="{5C2C929B-DD3A-D402-D3D0-47B59BB4F807}"/>
+              </a:ext>
+            </a:extLst>
+          </p:cNvPr>
+          <p:cNvPicPr>
+            <a:picLocks noChangeAspect="1" noChangeArrowheads="1"/>
+          </p:cNvPicPr>
+          <p:nvPr/>
+        </p:nvPicPr>
+        <p:blipFill>
+          <a:blip r:embed="rId4">
+            <a:extLst>
+              <a:ext uri="{28A0092B-C50C-407E-A947-70E740481C1C}">
+                <a14:useLocalDpi xmlns:a14="http://schemas.microsoft.com/office/drawing/2010/main" val="0"/>
+              </a:ext>
+            </a:extLst>
+          </a:blip>
+          <a:srcRect/>
+          <a:stretch>
+            <a:fillRect/>
+          </a:stretch>
+        </p:blipFill>
+        <p:spPr bwMode="auto">
+          <a:xfrm>
+            <a:off x="8753203" y="4252319"/>
+            <a:ext cx="588793" cy="572693"/>
+          </a:xfrm>
+          <a:prstGeom prst="rect">
+            <a:avLst/>
+          </a:prstGeom>
+          <a:noFill/>
+          <a:extLst>
+            <a:ext uri="{909E8E84-426E-40DD-AFC4-6F175D3DCCD1}">
+              <a14:hiddenFill xmlns:a14="http://schemas.microsoft.com/office/drawing/2010/main">
+                <a:solidFill>
+                  <a:srgbClr val="FFFFFF"/>
+                </a:solidFill>
+              </a14:hiddenFill>
+            </a:ext>
+          </a:extLst>
+        </p:spPr>
+      </p:pic>
+      <p:cxnSp>
+        <p:nvCxnSpPr>
+          <p:cNvPr id="30" name="Connecteur droit avec flèche 29">
+            <a:extLst>
+              <a:ext uri="{FF2B5EF4-FFF2-40B4-BE49-F238E27FC236}">
+                <a16:creationId xmlns:a16="http://schemas.microsoft.com/office/drawing/2014/main" id="{3C17D7D9-AD0C-3CB9-E9C2-8FE52952EA0A}"/>
+              </a:ext>
+            </a:extLst>
+          </p:cNvPr>
+          <p:cNvCxnSpPr>
+            <a:cxnSpLocks/>
+            <a:stCxn id="6" idx="3"/>
+            <a:endCxn id="28" idx="1"/>
+          </p:cNvCxnSpPr>
+          <p:nvPr/>
+        </p:nvCxnSpPr>
+        <p:spPr>
+          <a:xfrm>
+            <a:off x="6520406" y="3347841"/>
+            <a:ext cx="2301806" cy="1915675"/>
+          </a:xfrm>
+          <a:prstGeom prst="straightConnector1">
+            <a:avLst/>
+          </a:prstGeom>
+          <a:ln w="127000">
+            <a:solidFill>
+              <a:schemeClr val="accent6">
+                <a:lumMod val="75000"/>
+              </a:schemeClr>
+            </a:solidFill>
+            <a:tailEnd type="triangle"/>
+          </a:ln>
+        </p:spPr>
+        <p:style>
+          <a:lnRef idx="1">
+            <a:schemeClr val="accent1"/>
+          </a:lnRef>
+          <a:fillRef idx="0">
+            <a:schemeClr val="accent1"/>
+          </a:fillRef>
+          <a:effectRef idx="0">
+            <a:schemeClr val="accent1"/>
+          </a:effectRef>
+          <a:fontRef idx="minor">
+            <a:schemeClr val="tx1"/>
+          </a:fontRef>
+        </p:style>
+      </p:cxnSp>
+      <p:sp>
+        <p:nvSpPr>
+          <p:cNvPr id="38" name="ZoneTexte 37">
+            <a:extLst>
+              <a:ext uri="{FF2B5EF4-FFF2-40B4-BE49-F238E27FC236}">
+                <a16:creationId xmlns:a16="http://schemas.microsoft.com/office/drawing/2014/main" id="{3E51368A-C3EC-DCF9-2D42-54C522F99A21}"/>
+              </a:ext>
+            </a:extLst>
+          </p:cNvPr>
+          <p:cNvSpPr txBox="1"/>
+          <p:nvPr/>
+        </p:nvSpPr>
+        <p:spPr>
+          <a:xfrm>
+            <a:off x="7218978" y="5412088"/>
+            <a:ext cx="1659171" cy="830997"/>
+          </a:xfrm>
+          <a:prstGeom prst="rect">
+            <a:avLst/>
+          </a:prstGeom>
+          <a:noFill/>
+        </p:spPr>
+        <p:txBody>
+          <a:bodyPr wrap="square" rtlCol="0">
+            <a:spAutoFit/>
+          </a:bodyPr>
+          <a:lstStyle/>
+          <a:p>
+            <a:r>
+              <a:rPr lang="fr-FR" sz="1600" dirty="0"/>
+              <a:t>HTTP POST</a:t>
+            </a:r>
+          </a:p>
+          <a:p>
+            <a:r>
+              <a:rPr lang="fr-FR" sz="1600" dirty="0">
+                <a:hlinkClick r:id="rId3"/>
+              </a:rPr>
+              <a:t>http://fibonacci</a:t>
+            </a:r>
+            <a:r>
+              <a:rPr lang="fr-FR" sz="1600" dirty="0"/>
+              <a:t> </a:t>
+            </a:r>
+            <a:br>
+              <a:rPr lang="fr-FR" sz="1600" dirty="0"/>
+            </a:br>
+            <a:r>
+              <a:rPr lang="fr-FR" sz="1600" dirty="0"/>
+              <a:t>{</a:t>
+            </a:r>
+            <a:r>
+              <a:rPr lang="fr-FR" sz="1600" b="0" i="0" dirty="0">
+                <a:effectLst/>
+                <a:latin typeface="-apple-system"/>
+              </a:rPr>
+              <a:t>"</a:t>
+            </a:r>
+            <a:r>
+              <a:rPr lang="fr-FR" sz="1600" dirty="0"/>
+              <a:t>input</a:t>
+            </a:r>
+            <a:r>
+              <a:rPr lang="fr-FR" sz="1600" b="0" i="0" dirty="0">
+                <a:effectLst/>
+                <a:latin typeface="-apple-system"/>
+              </a:rPr>
+              <a:t>"</a:t>
+            </a:r>
+            <a:r>
+              <a:rPr lang="fr-FR" sz="1600" dirty="0"/>
+              <a:t>:42}</a:t>
+            </a:r>
+          </a:p>
+        </p:txBody>
+      </p:sp>
+      <p:pic>
+        <p:nvPicPr>
+          <p:cNvPr id="5" name="Picture 2" descr="Afficher l’image source">
+            <a:extLst>
+              <a:ext uri="{FF2B5EF4-FFF2-40B4-BE49-F238E27FC236}">
+                <a16:creationId xmlns:a16="http://schemas.microsoft.com/office/drawing/2014/main" id="{9CF92849-9C7F-61C9-32C2-F99F37E01F43}"/>
+              </a:ext>
+            </a:extLst>
+          </p:cNvPr>
+          <p:cNvPicPr>
+            <a:picLocks noChangeAspect="1" noChangeArrowheads="1"/>
+          </p:cNvPicPr>
+          <p:nvPr/>
+        </p:nvPicPr>
+        <p:blipFill>
+          <a:blip r:embed="rId4">
+            <a:extLst>
+              <a:ext uri="{28A0092B-C50C-407E-A947-70E740481C1C}">
+                <a14:useLocalDpi xmlns:a14="http://schemas.microsoft.com/office/drawing/2010/main" val="0"/>
+              </a:ext>
+            </a:extLst>
+          </a:blip>
+          <a:srcRect/>
+          <a:stretch>
+            <a:fillRect/>
+          </a:stretch>
+        </p:blipFill>
+        <p:spPr bwMode="auto">
+          <a:xfrm>
+            <a:off x="4066798" y="2514707"/>
+            <a:ext cx="588793" cy="572693"/>
+          </a:xfrm>
+          <a:prstGeom prst="rect">
+            <a:avLst/>
+          </a:prstGeom>
+          <a:noFill/>
+          <a:extLst>
+            <a:ext uri="{909E8E84-426E-40DD-AFC4-6F175D3DCCD1}">
+              <a14:hiddenFill xmlns:a14="http://schemas.microsoft.com/office/drawing/2010/main">
+                <a:solidFill>
+                  <a:srgbClr val="FFFFFF"/>
+                </a:solidFill>
+              </a14:hiddenFill>
+            </a:ext>
+          </a:extLst>
+        </p:spPr>
+      </p:pic>
+    </p:spTree>
+    <p:extLst>
+      <p:ext uri="{BB962C8B-B14F-4D97-AF65-F5344CB8AC3E}">
+        <p14:creationId xmlns:p14="http://schemas.microsoft.com/office/powerpoint/2010/main" val="2176232589"/>
       </p:ext>
     </p:extLst>
   </p:cSld>
@@ -7196,6 +8246,34 @@
 </file>
 
 <file path=customXml/item1.xml><?xml version="1.0" encoding="utf-8"?>
+<p:properties xmlns:p="http://schemas.microsoft.com/office/2006/metadata/properties" xmlns:xsi="http://www.w3.org/2001/XMLSchema-instance" xmlns:pc="http://schemas.microsoft.com/office/infopath/2007/PartnerControls">
+  <documentManagement>
+    <SharedWithUsers xmlns="03cb9dc2-e9ea-44ac-afed-001b6fad4f36">
+      <UserInfo>
+        <DisplayName>LEMARCHAND THOMAS</DisplayName>
+        <AccountId>16</AccountId>
+        <AccountType/>
+      </UserInfo>
+      <UserInfo>
+        <DisplayName>CHERVET Guillaume</DisplayName>
+        <AccountId>84</AccountId>
+        <AccountType/>
+      </UserInfo>
+    </SharedWithUsers>
+  </documentManagement>
+</p:properties>
+</file>
+
+<file path=customXml/item2.xml><?xml version="1.0" encoding="utf-8"?>
+<?mso-contentType ?>
+<FormTemplates xmlns="http://schemas.microsoft.com/sharepoint/v3/contenttype/forms">
+  <Display>DocumentLibraryForm</Display>
+  <Edit>DocumentLibraryForm</Edit>
+  <New>DocumentLibraryForm</New>
+</FormTemplates>
+</file>
+
+<file path=customXml/item3.xml><?xml version="1.0" encoding="utf-8"?>
 <ct:contentTypeSchema xmlns:ct="http://schemas.microsoft.com/office/2006/metadata/contentType" xmlns:ma="http://schemas.microsoft.com/office/2006/metadata/properties/metaAttributes" ct:_="" ma:_="" ma:contentTypeName="Document" ma:contentTypeID="0x0101003BE0F011240A094E827BA56BE9109944" ma:contentTypeVersion="13" ma:contentTypeDescription="Create a new document." ma:contentTypeScope="" ma:versionID="5dc1144dd420c1d8a9ebf51c7358c8f0">
   <xsd:schema xmlns:xsd="http://www.w3.org/2001/XMLSchema" xmlns:xs="http://www.w3.org/2001/XMLSchema" xmlns:p="http://schemas.microsoft.com/office/2006/metadata/properties" xmlns:ns3="03cb9dc2-e9ea-44ac-afed-001b6fad4f36" xmlns:ns4="d0879fa5-f2db-41a7-8861-4a44e7ee3b24" targetNamespace="http://schemas.microsoft.com/office/2006/metadata/properties" ma:root="true" ma:fieldsID="6dda18631f78ef64168f1da1c53d30ff" ns3:_="" ns4:_="">
     <xsd:import namespace="03cb9dc2-e9ea-44ac-afed-001b6fad4f36"/>
@@ -7418,35 +8496,32 @@
 </ct:contentTypeSchema>
 </file>
 
-<file path=customXml/item2.xml><?xml version="1.0" encoding="utf-8"?>
-<?mso-contentType ?>
-<FormTemplates xmlns="http://schemas.microsoft.com/sharepoint/v3/contenttype/forms">
-  <Display>DocumentLibraryForm</Display>
-  <Edit>DocumentLibraryForm</Edit>
-  <New>DocumentLibraryForm</New>
-</FormTemplates>
+<file path=customXml/itemProps1.xml><?xml version="1.0" encoding="utf-8"?>
+<ds:datastoreItem xmlns:ds="http://schemas.openxmlformats.org/officeDocument/2006/customXml" ds:itemID="{C522BBC0-3E7A-472B-9CC6-34C5EA434DEE}">
+  <ds:schemaRefs>
+    <ds:schemaRef ds:uri="http://purl.org/dc/terms/"/>
+    <ds:schemaRef ds:uri="http://schemas.openxmlformats.org/package/2006/metadata/core-properties"/>
+    <ds:schemaRef ds:uri="http://purl.org/dc/dcmitype/"/>
+    <ds:schemaRef ds:uri="http://schemas.microsoft.com/office/infopath/2007/PartnerControls"/>
+    <ds:schemaRef ds:uri="http://schemas.microsoft.com/office/2006/documentManagement/types"/>
+    <ds:schemaRef ds:uri="http://purl.org/dc/elements/1.1/"/>
+    <ds:schemaRef ds:uri="http://schemas.microsoft.com/office/2006/metadata/properties"/>
+    <ds:schemaRef ds:uri="d0879fa5-f2db-41a7-8861-4a44e7ee3b24"/>
+    <ds:schemaRef ds:uri="03cb9dc2-e9ea-44ac-afed-001b6fad4f36"/>
+    <ds:schemaRef ds:uri="http://www.w3.org/XML/1998/namespace"/>
+  </ds:schemaRefs>
+</ds:datastoreItem>
 </file>
 
-<file path=customXml/item3.xml><?xml version="1.0" encoding="utf-8"?>
-<p:properties xmlns:p="http://schemas.microsoft.com/office/2006/metadata/properties" xmlns:xsi="http://www.w3.org/2001/XMLSchema-instance" xmlns:pc="http://schemas.microsoft.com/office/infopath/2007/PartnerControls">
-  <documentManagement>
-    <SharedWithUsers xmlns="03cb9dc2-e9ea-44ac-afed-001b6fad4f36">
-      <UserInfo>
-        <DisplayName>LEMARCHAND THOMAS</DisplayName>
-        <AccountId>16</AccountId>
-        <AccountType/>
-      </UserInfo>
-      <UserInfo>
-        <DisplayName>CHERVET Guillaume</DisplayName>
-        <AccountId>84</AccountId>
-        <AccountType/>
-      </UserInfo>
-    </SharedWithUsers>
-  </documentManagement>
-</p:properties>
+<file path=customXml/itemProps2.xml><?xml version="1.0" encoding="utf-8"?>
+<ds:datastoreItem xmlns:ds="http://schemas.openxmlformats.org/officeDocument/2006/customXml" ds:itemID="{05D7AB42-0DA9-4407-9B22-92C435FE7C62}">
+  <ds:schemaRefs>
+    <ds:schemaRef ds:uri="http://schemas.microsoft.com/sharepoint/v3/contenttype/forms"/>
+  </ds:schemaRefs>
+</ds:datastoreItem>
 </file>
 
-<file path=customXml/itemProps1.xml><?xml version="1.0" encoding="utf-8"?>
+<file path=customXml/itemProps3.xml><?xml version="1.0" encoding="utf-8"?>
 <ds:datastoreItem xmlns:ds="http://schemas.openxmlformats.org/officeDocument/2006/customXml" ds:itemID="{C72C7657-97CD-4958-88DD-F8AC87258741}">
   <ds:schemaRefs>
     <ds:schemaRef ds:uri="http://schemas.microsoft.com/office/2006/metadata/contentType"/>
@@ -7463,29 +8538,4 @@
     <ds:schemaRef ds:uri="http://schemas.microsoft.com/internal/obd"/>
   </ds:schemaRefs>
 </ds:datastoreItem>
-</file>
-
-<file path=customXml/itemProps2.xml><?xml version="1.0" encoding="utf-8"?>
-<ds:datastoreItem xmlns:ds="http://schemas.openxmlformats.org/officeDocument/2006/customXml" ds:itemID="{05D7AB42-0DA9-4407-9B22-92C435FE7C62}">
-  <ds:schemaRefs>
-    <ds:schemaRef ds:uri="http://schemas.microsoft.com/sharepoint/v3/contenttype/forms"/>
-  </ds:schemaRefs>
-</ds:datastoreItem>
-</file>
-
-<file path=customXml/itemProps3.xml><?xml version="1.0" encoding="utf-8"?>
-<ds:datastoreItem xmlns:ds="http://schemas.openxmlformats.org/officeDocument/2006/customXml" ds:itemID="{C522BBC0-3E7A-472B-9CC6-34C5EA434DEE}">
-  <ds:schemaRefs>
-    <ds:schemaRef ds:uri="http://purl.org/dc/terms/"/>
-    <ds:schemaRef ds:uri="http://schemas.openxmlformats.org/package/2006/metadata/core-properties"/>
-    <ds:schemaRef ds:uri="http://purl.org/dc/dcmitype/"/>
-    <ds:schemaRef ds:uri="http://schemas.microsoft.com/office/infopath/2007/PartnerControls"/>
-    <ds:schemaRef ds:uri="http://schemas.microsoft.com/office/2006/documentManagement/types"/>
-    <ds:schemaRef ds:uri="http://purl.org/dc/elements/1.1/"/>
-    <ds:schemaRef ds:uri="http://schemas.microsoft.com/office/2006/metadata/properties"/>
-    <ds:schemaRef ds:uri="d0879fa5-f2db-41a7-8861-4a44e7ee3b24"/>
-    <ds:schemaRef ds:uri="03cb9dc2-e9ea-44ac-afed-001b6fad4f36"/>
-    <ds:schemaRef ds:uri="http://www.w3.org/XML/1998/namespace"/>
-  </ds:schemaRefs>
-</ds:datastoreItem>
 </file>
</xml_diff>

<commit_message>
feat(slimfaas): publish sync mode to all pods (#55)
* feat(slimfaas): publish sync mode to all pods

* test

* update

* update

* update docs

* update

* update

* update

* uupdate
</commit_message>
<xml_diff>
--- a/documentation/slimfaas.pptx
+++ b/documentation/slimfaas.pptx
@@ -5,14 +5,16 @@
     <p:sldMasterId id="2147483648" r:id="rId4"/>
   </p:sldMasterIdLst>
   <p:notesMasterIdLst>
-    <p:notesMasterId r:id="rId7"/>
+    <p:notesMasterId r:id="rId9"/>
   </p:notesMasterIdLst>
   <p:handoutMasterIdLst>
-    <p:handoutMasterId r:id="rId8"/>
+    <p:handoutMasterId r:id="rId10"/>
   </p:handoutMasterIdLst>
   <p:sldIdLst>
     <p:sldId id="891" r:id="rId5"/>
     <p:sldId id="892" r:id="rId6"/>
+    <p:sldId id="893" r:id="rId7"/>
+    <p:sldId id="894" r:id="rId8"/>
   </p:sldIdLst>
   <p:sldSz cx="12192000" cy="6858000"/>
   <p:notesSz cx="6858000" cy="9144000"/>
@@ -118,6 +120,8 @@
           <p14:sldIdLst>
             <p14:sldId id="891"/>
             <p14:sldId id="892"/>
+            <p14:sldId id="893"/>
+            <p14:sldId id="894"/>
           </p14:sldIdLst>
         </p14:section>
       </p14:sectionLst>
@@ -234,7 +238,7 @@
           <a:p>
             <a:fld id="{F60FFC85-34C0-4167-8801-71D65E4D986C}" type="datetimeFigureOut">
               <a:rPr lang="fr-FR" smtClean="0"/>
-              <a:t>06/12/2023</a:t>
+              <a:t>26/05/2024</a:t>
             </a:fld>
             <a:endParaRPr lang="fr-FR"/>
           </a:p>
@@ -411,7 +415,7 @@
           <a:p>
             <a:fld id="{F2EE8696-3B2B-7D49-B212-A8F746F3A84B}" type="datetimeFigureOut">
               <a:rPr lang="es-ES_tradnl" smtClean="0"/>
-              <a:t>06/12/2023</a:t>
+              <a:t>26/05/2024</a:t>
             </a:fld>
             <a:endParaRPr lang="es-ES_tradnl"/>
           </a:p>
@@ -1108,7 +1112,7 @@
           <a:p>
             <a:fld id="{80160E5B-2E24-B941-8DE0-C0A90C36B7C5}" type="datetimeFigureOut">
               <a:rPr lang="en-GB" smtClean="0"/>
-              <a:t>06/12/2023</a:t>
+              <a:t>26/05/2024</a:t>
             </a:fld>
             <a:endParaRPr lang="en-GB"/>
           </a:p>
@@ -1306,7 +1310,7 @@
           <a:p>
             <a:fld id="{80160E5B-2E24-B941-8DE0-C0A90C36B7C5}" type="datetimeFigureOut">
               <a:rPr lang="en-GB" smtClean="0"/>
-              <a:t>06/12/2023</a:t>
+              <a:t>26/05/2024</a:t>
             </a:fld>
             <a:endParaRPr lang="en-GB"/>
           </a:p>
@@ -1553,7 +1557,7 @@
           <a:p>
             <a:fld id="{80160E5B-2E24-B941-8DE0-C0A90C36B7C5}" type="datetimeFigureOut">
               <a:rPr lang="en-GB" smtClean="0"/>
-              <a:t>06/12/2023</a:t>
+              <a:t>26/05/2024</a:t>
             </a:fld>
             <a:endParaRPr lang="en-GB"/>
           </a:p>
@@ -1772,7 +1776,7 @@
           <a:p>
             <a:fld id="{80160E5B-2E24-B941-8DE0-C0A90C36B7C5}" type="datetimeFigureOut">
               <a:rPr lang="en-GB" smtClean="0"/>
-              <a:t>06/12/2023</a:t>
+              <a:t>26/05/2024</a:t>
             </a:fld>
             <a:endParaRPr lang="en-GB"/>
           </a:p>
@@ -2047,7 +2051,7 @@
           <a:p>
             <a:fld id="{80160E5B-2E24-B941-8DE0-C0A90C36B7C5}" type="datetimeFigureOut">
               <a:rPr lang="en-GB" smtClean="0"/>
-              <a:t>06/12/2023</a:t>
+              <a:t>26/05/2024</a:t>
             </a:fld>
             <a:endParaRPr lang="en-GB"/>
           </a:p>
@@ -2351,7 +2355,7 @@
           <a:p>
             <a:fld id="{80160E5B-2E24-B941-8DE0-C0A90C36B7C5}" type="datetimeFigureOut">
               <a:rPr lang="en-GB" smtClean="0"/>
-              <a:t>06/12/2023</a:t>
+              <a:t>26/05/2024</a:t>
             </a:fld>
             <a:endParaRPr lang="en-GB"/>
           </a:p>
@@ -2802,7 +2806,7 @@
           <a:p>
             <a:fld id="{80160E5B-2E24-B941-8DE0-C0A90C36B7C5}" type="datetimeFigureOut">
               <a:rPr lang="en-GB" smtClean="0"/>
-              <a:t>06/12/2023</a:t>
+              <a:t>26/05/2024</a:t>
             </a:fld>
             <a:endParaRPr lang="en-GB"/>
           </a:p>
@@ -2982,7 +2986,7 @@
           <a:p>
             <a:fld id="{80160E5B-2E24-B941-8DE0-C0A90C36B7C5}" type="datetimeFigureOut">
               <a:rPr lang="en-GB" smtClean="0"/>
-              <a:t>06/12/2023</a:t>
+              <a:t>26/05/2024</a:t>
             </a:fld>
             <a:endParaRPr lang="en-GB"/>
           </a:p>
@@ -3134,7 +3138,7 @@
           <a:p>
             <a:fld id="{80160E5B-2E24-B941-8DE0-C0A90C36B7C5}" type="datetimeFigureOut">
               <a:rPr lang="en-GB" smtClean="0"/>
-              <a:t>06/12/2023</a:t>
+              <a:t>26/05/2024</a:t>
             </a:fld>
             <a:endParaRPr lang="en-GB"/>
           </a:p>
@@ -3484,7 +3488,7 @@
           <a:p>
             <a:fld id="{80160E5B-2E24-B941-8DE0-C0A90C36B7C5}" type="datetimeFigureOut">
               <a:rPr lang="en-GB" smtClean="0"/>
-              <a:t>06/12/2023</a:t>
+              <a:t>26/05/2024</a:t>
             </a:fld>
             <a:endParaRPr lang="en-GB"/>
           </a:p>
@@ -3811,7 +3815,7 @@
           <a:p>
             <a:fld id="{80160E5B-2E24-B941-8DE0-C0A90C36B7C5}" type="datetimeFigureOut">
               <a:rPr lang="en-GB" smtClean="0"/>
-              <a:t>06/12/2023</a:t>
+              <a:t>26/05/2024</a:t>
             </a:fld>
             <a:endParaRPr lang="en-GB"/>
           </a:p>
@@ -4091,7 +4095,7 @@
           <a:p>
             <a:fld id="{80160E5B-2E24-B941-8DE0-C0A90C36B7C5}" type="datetimeFigureOut">
               <a:rPr lang="en-GB" smtClean="0"/>
-              <a:t>06/12/2023</a:t>
+              <a:t>26/05/2024</a:t>
             </a:fld>
             <a:endParaRPr lang="en-GB"/>
           </a:p>
@@ -6335,6 +6339,2018 @@
     <p:extLst>
       <p:ext uri="{BB962C8B-B14F-4D97-AF65-F5344CB8AC3E}">
         <p14:creationId xmlns:p14="http://schemas.microsoft.com/office/powerpoint/2010/main" val="129032465"/>
+      </p:ext>
+    </p:extLst>
+  </p:cSld>
+  <p:clrMapOvr>
+    <a:masterClrMapping/>
+  </p:clrMapOvr>
+</p:sld>
+</file>
+
+<file path=ppt/slides/slide3.xml><?xml version="1.0" encoding="utf-8"?>
+<p:sld xmlns:a="http://schemas.openxmlformats.org/drawingml/2006/main" xmlns:r="http://schemas.openxmlformats.org/officeDocument/2006/relationships" xmlns:p="http://schemas.openxmlformats.org/presentationml/2006/main">
+  <p:cSld>
+    <p:spTree>
+      <p:nvGrpSpPr>
+        <p:cNvPr id="1" name=""/>
+        <p:cNvGrpSpPr/>
+        <p:nvPr/>
+      </p:nvGrpSpPr>
+      <p:grpSpPr>
+        <a:xfrm>
+          <a:off x="0" y="0"/>
+          <a:ext cx="0" cy="0"/>
+          <a:chOff x="0" y="0"/>
+          <a:chExt cx="0" cy="0"/>
+        </a:xfrm>
+      </p:grpSpPr>
+      <p:sp>
+        <p:nvSpPr>
+          <p:cNvPr id="3" name="Espace réservé du contenu 2">
+            <a:extLst>
+              <a:ext uri="{FF2B5EF4-FFF2-40B4-BE49-F238E27FC236}">
+                <a16:creationId xmlns:a16="http://schemas.microsoft.com/office/drawing/2014/main" id="{FC72177F-6E5E-241E-BA74-8D91DC6E05F3}"/>
+              </a:ext>
+            </a:extLst>
+          </p:cNvPr>
+          <p:cNvSpPr>
+            <a:spLocks noGrp="1"/>
+          </p:cNvSpPr>
+          <p:nvPr>
+            <p:ph idx="1"/>
+          </p:nvPr>
+        </p:nvSpPr>
+        <p:spPr>
+          <a:xfrm>
+            <a:off x="0" y="6481822"/>
+            <a:ext cx="12192000" cy="376177"/>
+          </a:xfrm>
+        </p:spPr>
+        <p:txBody>
+          <a:bodyPr>
+            <a:normAutofit fontScale="92500" lnSpcReduction="20000"/>
+          </a:bodyPr>
+          <a:lstStyle/>
+          <a:p>
+            <a:endParaRPr lang="fr-FR" dirty="0"/>
+          </a:p>
+        </p:txBody>
+      </p:sp>
+      <p:sp>
+        <p:nvSpPr>
+          <p:cNvPr id="6" name="Rounded Rectangle 44">
+            <a:extLst>
+              <a:ext uri="{FF2B5EF4-FFF2-40B4-BE49-F238E27FC236}">
+                <a16:creationId xmlns:a16="http://schemas.microsoft.com/office/drawing/2014/main" id="{DDD08BA0-70BB-583F-312D-C1BE714A89E8}"/>
+              </a:ext>
+            </a:extLst>
+          </p:cNvPr>
+          <p:cNvSpPr/>
+          <p:nvPr/>
+        </p:nvSpPr>
+        <p:spPr>
+          <a:xfrm>
+            <a:off x="4495103" y="2785207"/>
+            <a:ext cx="2245224" cy="1125268"/>
+          </a:xfrm>
+          <a:prstGeom prst="roundRect">
+            <a:avLst/>
+          </a:prstGeom>
+          <a:solidFill>
+            <a:schemeClr val="bg2">
+              <a:lumMod val="25000"/>
+            </a:schemeClr>
+          </a:solidFill>
+          <a:ln>
+            <a:noFill/>
+          </a:ln>
+        </p:spPr>
+        <p:style>
+          <a:lnRef idx="2">
+            <a:schemeClr val="accent1">
+              <a:shade val="50000"/>
+            </a:schemeClr>
+          </a:lnRef>
+          <a:fillRef idx="1">
+            <a:schemeClr val="accent1"/>
+          </a:fillRef>
+          <a:effectRef idx="0">
+            <a:schemeClr val="accent1"/>
+          </a:effectRef>
+          <a:fontRef idx="minor">
+            <a:schemeClr val="lt1"/>
+          </a:fontRef>
+        </p:style>
+        <p:txBody>
+          <a:bodyPr rtlCol="0" anchor="ctr"/>
+          <a:lstStyle/>
+          <a:p>
+            <a:pPr algn="ctr"/>
+            <a:r>
+              <a:rPr lang="en-US" sz="2400" dirty="0">
+                <a:solidFill>
+                  <a:schemeClr val="bg1"/>
+                </a:solidFill>
+              </a:rPr>
+              <a:t>SlimFaas</a:t>
+            </a:r>
+          </a:p>
+        </p:txBody>
+      </p:sp>
+      <p:cxnSp>
+        <p:nvCxnSpPr>
+          <p:cNvPr id="7" name="Connecteur droit avec flèche 6">
+            <a:extLst>
+              <a:ext uri="{FF2B5EF4-FFF2-40B4-BE49-F238E27FC236}">
+                <a16:creationId xmlns:a16="http://schemas.microsoft.com/office/drawing/2014/main" id="{2846A4F1-5F1E-1B4A-EAEC-F51C758D93A6}"/>
+              </a:ext>
+            </a:extLst>
+          </p:cNvPr>
+          <p:cNvCxnSpPr>
+            <a:cxnSpLocks/>
+            <a:stCxn id="8" idx="3"/>
+            <a:endCxn id="6" idx="1"/>
+          </p:cNvCxnSpPr>
+          <p:nvPr/>
+        </p:nvCxnSpPr>
+        <p:spPr>
+          <a:xfrm>
+            <a:off x="3919040" y="3347841"/>
+            <a:ext cx="576063" cy="0"/>
+          </a:xfrm>
+          <a:prstGeom prst="straightConnector1">
+            <a:avLst/>
+          </a:prstGeom>
+          <a:ln w="127000">
+            <a:solidFill>
+              <a:schemeClr val="accent6">
+                <a:lumMod val="75000"/>
+              </a:schemeClr>
+            </a:solidFill>
+            <a:tailEnd type="triangle"/>
+          </a:ln>
+        </p:spPr>
+        <p:style>
+          <a:lnRef idx="1">
+            <a:schemeClr val="accent1"/>
+          </a:lnRef>
+          <a:fillRef idx="0">
+            <a:schemeClr val="accent1"/>
+          </a:fillRef>
+          <a:effectRef idx="0">
+            <a:schemeClr val="accent1"/>
+          </a:effectRef>
+          <a:fontRef idx="minor">
+            <a:schemeClr val="tx1"/>
+          </a:fontRef>
+        </p:style>
+      </p:cxnSp>
+      <p:sp>
+        <p:nvSpPr>
+          <p:cNvPr id="8" name="ZoneTexte 7">
+            <a:extLst>
+              <a:ext uri="{FF2B5EF4-FFF2-40B4-BE49-F238E27FC236}">
+                <a16:creationId xmlns:a16="http://schemas.microsoft.com/office/drawing/2014/main" id="{AC32730B-6D07-37BE-5E05-17826CC33CC8}"/>
+              </a:ext>
+            </a:extLst>
+          </p:cNvPr>
+          <p:cNvSpPr txBox="1"/>
+          <p:nvPr/>
+        </p:nvSpPr>
+        <p:spPr>
+          <a:xfrm>
+            <a:off x="67463" y="2932342"/>
+            <a:ext cx="3851577" cy="830997"/>
+          </a:xfrm>
+          <a:prstGeom prst="rect">
+            <a:avLst/>
+          </a:prstGeom>
+          <a:noFill/>
+        </p:spPr>
+        <p:txBody>
+          <a:bodyPr wrap="square" rtlCol="0">
+            <a:spAutoFit/>
+          </a:bodyPr>
+          <a:lstStyle/>
+          <a:p>
+            <a:r>
+              <a:rPr lang="fr-FR" sz="1600" dirty="0"/>
+              <a:t>HTTP POST</a:t>
+            </a:r>
+          </a:p>
+          <a:p>
+            <a:r>
+              <a:rPr lang="fr-FR" sz="1600" dirty="0">
+                <a:hlinkClick r:id="rId2"/>
+              </a:rPr>
+              <a:t>http://slimfaas/</a:t>
+            </a:r>
+            <a:r>
+              <a:rPr lang="fr-FR" sz="1600" dirty="0">
+                <a:highlight>
+                  <a:srgbClr val="FFFF00"/>
+                </a:highlight>
+                <a:hlinkClick r:id="rId2"/>
+              </a:rPr>
+              <a:t>publish-function</a:t>
+            </a:r>
+            <a:r>
+              <a:rPr lang="fr-FR" sz="1600" dirty="0">
+                <a:hlinkClick r:id="rId2"/>
+              </a:rPr>
+              <a:t>/fibonacci</a:t>
+            </a:r>
+            <a:endParaRPr lang="fr-FR" sz="1600" dirty="0"/>
+          </a:p>
+          <a:p>
+            <a:r>
+              <a:rPr lang="fr-FR" sz="1600" dirty="0"/>
+              <a:t>{</a:t>
+            </a:r>
+            <a:r>
+              <a:rPr lang="fr-FR" sz="1600" b="0" i="0" dirty="0">
+                <a:effectLst/>
+                <a:latin typeface="-apple-system"/>
+              </a:rPr>
+              <a:t>"</a:t>
+            </a:r>
+            <a:r>
+              <a:rPr lang="fr-FR" sz="1600" dirty="0"/>
+              <a:t>input</a:t>
+            </a:r>
+            <a:r>
+              <a:rPr lang="fr-FR" sz="1600" b="0" i="0" dirty="0">
+                <a:effectLst/>
+                <a:latin typeface="-apple-system"/>
+              </a:rPr>
+              <a:t>"</a:t>
+            </a:r>
+            <a:r>
+              <a:rPr lang="fr-FR" sz="1600" dirty="0"/>
+              <a:t>:42}</a:t>
+            </a:r>
+          </a:p>
+        </p:txBody>
+      </p:sp>
+      <p:sp>
+        <p:nvSpPr>
+          <p:cNvPr id="9" name="ZoneTexte 8">
+            <a:extLst>
+              <a:ext uri="{FF2B5EF4-FFF2-40B4-BE49-F238E27FC236}">
+                <a16:creationId xmlns:a16="http://schemas.microsoft.com/office/drawing/2014/main" id="{6611272C-28EE-7524-CD4D-AAE3B72A1A73}"/>
+              </a:ext>
+            </a:extLst>
+          </p:cNvPr>
+          <p:cNvSpPr txBox="1"/>
+          <p:nvPr/>
+        </p:nvSpPr>
+        <p:spPr>
+          <a:xfrm>
+            <a:off x="6542729" y="997387"/>
+            <a:ext cx="1659171" cy="830997"/>
+          </a:xfrm>
+          <a:prstGeom prst="rect">
+            <a:avLst/>
+          </a:prstGeom>
+          <a:noFill/>
+        </p:spPr>
+        <p:txBody>
+          <a:bodyPr wrap="square" rtlCol="0">
+            <a:spAutoFit/>
+          </a:bodyPr>
+          <a:lstStyle/>
+          <a:p>
+            <a:r>
+              <a:rPr lang="fr-FR" sz="1600" dirty="0"/>
+              <a:t>HTTP POST</a:t>
+            </a:r>
+          </a:p>
+          <a:p>
+            <a:r>
+              <a:rPr lang="fr-FR" sz="1600" dirty="0">
+                <a:hlinkClick r:id="rId3"/>
+              </a:rPr>
+              <a:t>http://fibonacci</a:t>
+            </a:r>
+            <a:r>
+              <a:rPr lang="fr-FR" sz="1600" dirty="0"/>
+              <a:t> </a:t>
+            </a:r>
+            <a:br>
+              <a:rPr lang="fr-FR" sz="1600" dirty="0"/>
+            </a:br>
+            <a:r>
+              <a:rPr lang="fr-FR" sz="1600" dirty="0"/>
+              <a:t>{</a:t>
+            </a:r>
+            <a:r>
+              <a:rPr lang="fr-FR" sz="1600" b="0" i="0" dirty="0">
+                <a:effectLst/>
+                <a:latin typeface="-apple-system"/>
+              </a:rPr>
+              <a:t>"</a:t>
+            </a:r>
+            <a:r>
+              <a:rPr lang="fr-FR" sz="1600" dirty="0"/>
+              <a:t>input</a:t>
+            </a:r>
+            <a:r>
+              <a:rPr lang="fr-FR" sz="1600" b="0" i="0" dirty="0">
+                <a:effectLst/>
+                <a:latin typeface="-apple-system"/>
+              </a:rPr>
+              <a:t>"</a:t>
+            </a:r>
+            <a:r>
+              <a:rPr lang="fr-FR" sz="1600" dirty="0"/>
+              <a:t>:42}</a:t>
+            </a:r>
+          </a:p>
+        </p:txBody>
+      </p:sp>
+      <p:sp>
+        <p:nvSpPr>
+          <p:cNvPr id="10" name="Rounded Rectangle 45">
+            <a:extLst>
+              <a:ext uri="{FF2B5EF4-FFF2-40B4-BE49-F238E27FC236}">
+                <a16:creationId xmlns:a16="http://schemas.microsoft.com/office/drawing/2014/main" id="{D79C9965-A2CD-C2C1-A01C-697EABB121C8}"/>
+              </a:ext>
+            </a:extLst>
+          </p:cNvPr>
+          <p:cNvSpPr/>
+          <p:nvPr/>
+        </p:nvSpPr>
+        <p:spPr>
+          <a:xfrm>
+            <a:off x="8812333" y="509182"/>
+            <a:ext cx="3040144" cy="1540322"/>
+          </a:xfrm>
+          <a:prstGeom prst="roundRect">
+            <a:avLst/>
+          </a:prstGeom>
+          <a:solidFill>
+            <a:schemeClr val="bg2">
+              <a:lumMod val="25000"/>
+            </a:schemeClr>
+          </a:solidFill>
+          <a:ln>
+            <a:noFill/>
+          </a:ln>
+        </p:spPr>
+        <p:style>
+          <a:lnRef idx="2">
+            <a:schemeClr val="accent1">
+              <a:shade val="50000"/>
+            </a:schemeClr>
+          </a:lnRef>
+          <a:fillRef idx="1">
+            <a:schemeClr val="accent1"/>
+          </a:fillRef>
+          <a:effectRef idx="0">
+            <a:schemeClr val="accent1"/>
+          </a:effectRef>
+          <a:fontRef idx="minor">
+            <a:schemeClr val="lt1"/>
+          </a:fontRef>
+        </p:style>
+        <p:txBody>
+          <a:bodyPr rtlCol="0" anchor="ctr"/>
+          <a:lstStyle/>
+          <a:p>
+            <a:pPr algn="ctr"/>
+            <a:r>
+              <a:rPr lang="fr-FR" sz="2400" dirty="0">
+                <a:solidFill>
+                  <a:schemeClr val="bg1"/>
+                </a:solidFill>
+              </a:rPr>
+              <a:t>function « fibonacci » replica 1</a:t>
+            </a:r>
+            <a:endParaRPr lang="en-FR" sz="2400" dirty="0">
+              <a:solidFill>
+                <a:schemeClr val="bg1"/>
+              </a:solidFill>
+            </a:endParaRPr>
+          </a:p>
+        </p:txBody>
+      </p:sp>
+      <p:pic>
+        <p:nvPicPr>
+          <p:cNvPr id="11" name="Picture 2" descr="Afficher l’image source">
+            <a:extLst>
+              <a:ext uri="{FF2B5EF4-FFF2-40B4-BE49-F238E27FC236}">
+                <a16:creationId xmlns:a16="http://schemas.microsoft.com/office/drawing/2014/main" id="{B80A9736-02F1-1190-8A3C-F71D0B8C1D08}"/>
+              </a:ext>
+            </a:extLst>
+          </p:cNvPr>
+          <p:cNvPicPr>
+            <a:picLocks noChangeAspect="1" noChangeArrowheads="1"/>
+          </p:cNvPicPr>
+          <p:nvPr/>
+        </p:nvPicPr>
+        <p:blipFill>
+          <a:blip r:embed="rId4">
+            <a:extLst>
+              <a:ext uri="{28A0092B-C50C-407E-A947-70E740481C1C}">
+                <a14:useLocalDpi xmlns:a14="http://schemas.microsoft.com/office/drawing/2010/main" val="0"/>
+              </a:ext>
+            </a:extLst>
+          </a:blip>
+          <a:srcRect/>
+          <a:stretch>
+            <a:fillRect/>
+          </a:stretch>
+        </p:blipFill>
+        <p:spPr bwMode="auto">
+          <a:xfrm>
+            <a:off x="8618142" y="206059"/>
+            <a:ext cx="588793" cy="572693"/>
+          </a:xfrm>
+          <a:prstGeom prst="rect">
+            <a:avLst/>
+          </a:prstGeom>
+          <a:noFill/>
+          <a:extLst>
+            <a:ext uri="{909E8E84-426E-40DD-AFC4-6F175D3DCCD1}">
+              <a14:hiddenFill xmlns:a14="http://schemas.microsoft.com/office/drawing/2010/main">
+                <a:solidFill>
+                  <a:srgbClr val="FFFFFF"/>
+                </a:solidFill>
+              </a14:hiddenFill>
+            </a:ext>
+          </a:extLst>
+        </p:spPr>
+      </p:pic>
+      <p:cxnSp>
+        <p:nvCxnSpPr>
+          <p:cNvPr id="12" name="Connecteur droit avec flèche 11">
+            <a:extLst>
+              <a:ext uri="{FF2B5EF4-FFF2-40B4-BE49-F238E27FC236}">
+                <a16:creationId xmlns:a16="http://schemas.microsoft.com/office/drawing/2014/main" id="{3AFE1186-6876-1E2D-BB90-BFA726C0ACA3}"/>
+              </a:ext>
+            </a:extLst>
+          </p:cNvPr>
+          <p:cNvCxnSpPr>
+            <a:cxnSpLocks/>
+            <a:stCxn id="6" idx="3"/>
+            <a:endCxn id="10" idx="1"/>
+          </p:cNvCxnSpPr>
+          <p:nvPr/>
+        </p:nvCxnSpPr>
+        <p:spPr>
+          <a:xfrm flipV="1">
+            <a:off x="6740327" y="1279343"/>
+            <a:ext cx="2072006" cy="2068498"/>
+          </a:xfrm>
+          <a:prstGeom prst="straightConnector1">
+            <a:avLst/>
+          </a:prstGeom>
+          <a:ln w="127000">
+            <a:solidFill>
+              <a:schemeClr val="accent6">
+                <a:lumMod val="75000"/>
+              </a:schemeClr>
+            </a:solidFill>
+            <a:tailEnd type="triangle"/>
+          </a:ln>
+        </p:spPr>
+        <p:style>
+          <a:lnRef idx="1">
+            <a:schemeClr val="accent1"/>
+          </a:lnRef>
+          <a:fillRef idx="0">
+            <a:schemeClr val="accent1"/>
+          </a:fillRef>
+          <a:effectRef idx="0">
+            <a:schemeClr val="accent1"/>
+          </a:effectRef>
+          <a:fontRef idx="minor">
+            <a:schemeClr val="tx1"/>
+          </a:fontRef>
+        </p:style>
+      </p:cxnSp>
+      <p:sp>
+        <p:nvSpPr>
+          <p:cNvPr id="22" name="ZoneTexte 21">
+            <a:extLst>
+              <a:ext uri="{FF2B5EF4-FFF2-40B4-BE49-F238E27FC236}">
+                <a16:creationId xmlns:a16="http://schemas.microsoft.com/office/drawing/2014/main" id="{B20F6461-EFC4-60A1-6479-F83792C4E189}"/>
+              </a:ext>
+            </a:extLst>
+          </p:cNvPr>
+          <p:cNvSpPr txBox="1"/>
+          <p:nvPr/>
+        </p:nvSpPr>
+        <p:spPr>
+          <a:xfrm>
+            <a:off x="7453427" y="3352032"/>
+            <a:ext cx="1659171" cy="830997"/>
+          </a:xfrm>
+          <a:prstGeom prst="rect">
+            <a:avLst/>
+          </a:prstGeom>
+          <a:noFill/>
+        </p:spPr>
+        <p:txBody>
+          <a:bodyPr wrap="square" rtlCol="0">
+            <a:spAutoFit/>
+          </a:bodyPr>
+          <a:lstStyle/>
+          <a:p>
+            <a:r>
+              <a:rPr lang="fr-FR" sz="1600" dirty="0"/>
+              <a:t>HTTP POST</a:t>
+            </a:r>
+          </a:p>
+          <a:p>
+            <a:r>
+              <a:rPr lang="fr-FR" sz="1600" dirty="0">
+                <a:hlinkClick r:id="rId3"/>
+              </a:rPr>
+              <a:t>http://fibonacci</a:t>
+            </a:r>
+            <a:r>
+              <a:rPr lang="fr-FR" sz="1600" dirty="0"/>
+              <a:t> </a:t>
+            </a:r>
+            <a:br>
+              <a:rPr lang="fr-FR" sz="1600" dirty="0"/>
+            </a:br>
+            <a:r>
+              <a:rPr lang="fr-FR" sz="1600" dirty="0"/>
+              <a:t>{</a:t>
+            </a:r>
+            <a:r>
+              <a:rPr lang="fr-FR" sz="1600" b="0" i="0" dirty="0">
+                <a:effectLst/>
+                <a:latin typeface="-apple-system"/>
+              </a:rPr>
+              <a:t>"</a:t>
+            </a:r>
+            <a:r>
+              <a:rPr lang="fr-FR" sz="1600" dirty="0"/>
+              <a:t>input</a:t>
+            </a:r>
+            <a:r>
+              <a:rPr lang="fr-FR" sz="1600" b="0" i="0" dirty="0">
+                <a:effectLst/>
+                <a:latin typeface="-apple-system"/>
+              </a:rPr>
+              <a:t>"</a:t>
+            </a:r>
+            <a:r>
+              <a:rPr lang="fr-FR" sz="1600" dirty="0"/>
+              <a:t>:42}</a:t>
+            </a:r>
+          </a:p>
+        </p:txBody>
+      </p:sp>
+      <p:sp>
+        <p:nvSpPr>
+          <p:cNvPr id="23" name="Rounded Rectangle 45">
+            <a:extLst>
+              <a:ext uri="{FF2B5EF4-FFF2-40B4-BE49-F238E27FC236}">
+                <a16:creationId xmlns:a16="http://schemas.microsoft.com/office/drawing/2014/main" id="{02CDF874-6617-192D-7FBF-DFCDF050DE8B}"/>
+              </a:ext>
+            </a:extLst>
+          </p:cNvPr>
+          <p:cNvSpPr/>
+          <p:nvPr/>
+        </p:nvSpPr>
+        <p:spPr>
+          <a:xfrm>
+            <a:off x="8858733" y="2401822"/>
+            <a:ext cx="3040144" cy="1540322"/>
+          </a:xfrm>
+          <a:prstGeom prst="roundRect">
+            <a:avLst/>
+          </a:prstGeom>
+          <a:solidFill>
+            <a:schemeClr val="bg2">
+              <a:lumMod val="25000"/>
+            </a:schemeClr>
+          </a:solidFill>
+          <a:ln>
+            <a:noFill/>
+          </a:ln>
+        </p:spPr>
+        <p:style>
+          <a:lnRef idx="2">
+            <a:schemeClr val="accent1">
+              <a:shade val="50000"/>
+            </a:schemeClr>
+          </a:lnRef>
+          <a:fillRef idx="1">
+            <a:schemeClr val="accent1"/>
+          </a:fillRef>
+          <a:effectRef idx="0">
+            <a:schemeClr val="accent1"/>
+          </a:effectRef>
+          <a:fontRef idx="minor">
+            <a:schemeClr val="lt1"/>
+          </a:fontRef>
+        </p:style>
+        <p:txBody>
+          <a:bodyPr rtlCol="0" anchor="ctr"/>
+          <a:lstStyle/>
+          <a:p>
+            <a:pPr algn="ctr"/>
+            <a:r>
+              <a:rPr lang="fr-FR" sz="2400" dirty="0">
+                <a:solidFill>
+                  <a:schemeClr val="bg1"/>
+                </a:solidFill>
+              </a:rPr>
+              <a:t>function « fibonacci » replica 2</a:t>
+            </a:r>
+          </a:p>
+        </p:txBody>
+      </p:sp>
+      <p:pic>
+        <p:nvPicPr>
+          <p:cNvPr id="24" name="Picture 2" descr="Afficher l’image source">
+            <a:extLst>
+              <a:ext uri="{FF2B5EF4-FFF2-40B4-BE49-F238E27FC236}">
+                <a16:creationId xmlns:a16="http://schemas.microsoft.com/office/drawing/2014/main" id="{6367FF6E-BE42-9237-982C-7249BC298201}"/>
+              </a:ext>
+            </a:extLst>
+          </p:cNvPr>
+          <p:cNvPicPr>
+            <a:picLocks noChangeAspect="1" noChangeArrowheads="1"/>
+          </p:cNvPicPr>
+          <p:nvPr/>
+        </p:nvPicPr>
+        <p:blipFill>
+          <a:blip r:embed="rId4">
+            <a:extLst>
+              <a:ext uri="{28A0092B-C50C-407E-A947-70E740481C1C}">
+                <a14:useLocalDpi xmlns:a14="http://schemas.microsoft.com/office/drawing/2010/main" val="0"/>
+              </a:ext>
+            </a:extLst>
+          </a:blip>
+          <a:srcRect/>
+          <a:stretch>
+            <a:fillRect/>
+          </a:stretch>
+        </p:blipFill>
+        <p:spPr bwMode="auto">
+          <a:xfrm>
+            <a:off x="8799603" y="2111546"/>
+            <a:ext cx="588793" cy="572693"/>
+          </a:xfrm>
+          <a:prstGeom prst="rect">
+            <a:avLst/>
+          </a:prstGeom>
+          <a:noFill/>
+          <a:extLst>
+            <a:ext uri="{909E8E84-426E-40DD-AFC4-6F175D3DCCD1}">
+              <a14:hiddenFill xmlns:a14="http://schemas.microsoft.com/office/drawing/2010/main">
+                <a:solidFill>
+                  <a:srgbClr val="FFFFFF"/>
+                </a:solidFill>
+              </a14:hiddenFill>
+            </a:ext>
+          </a:extLst>
+        </p:spPr>
+      </p:pic>
+      <p:cxnSp>
+        <p:nvCxnSpPr>
+          <p:cNvPr id="25" name="Connecteur droit avec flèche 24">
+            <a:extLst>
+              <a:ext uri="{FF2B5EF4-FFF2-40B4-BE49-F238E27FC236}">
+                <a16:creationId xmlns:a16="http://schemas.microsoft.com/office/drawing/2014/main" id="{47CCB34C-BDE9-83E6-DBE9-369CE229F27F}"/>
+              </a:ext>
+            </a:extLst>
+          </p:cNvPr>
+          <p:cNvCxnSpPr>
+            <a:cxnSpLocks/>
+            <a:stCxn id="6" idx="3"/>
+            <a:endCxn id="23" idx="1"/>
+          </p:cNvCxnSpPr>
+          <p:nvPr/>
+        </p:nvCxnSpPr>
+        <p:spPr>
+          <a:xfrm flipV="1">
+            <a:off x="6740327" y="3171983"/>
+            <a:ext cx="2118406" cy="175858"/>
+          </a:xfrm>
+          <a:prstGeom prst="straightConnector1">
+            <a:avLst/>
+          </a:prstGeom>
+          <a:ln w="127000">
+            <a:solidFill>
+              <a:schemeClr val="accent6">
+                <a:lumMod val="75000"/>
+              </a:schemeClr>
+            </a:solidFill>
+            <a:tailEnd type="triangle"/>
+          </a:ln>
+        </p:spPr>
+        <p:style>
+          <a:lnRef idx="1">
+            <a:schemeClr val="accent1"/>
+          </a:lnRef>
+          <a:fillRef idx="0">
+            <a:schemeClr val="accent1"/>
+          </a:fillRef>
+          <a:effectRef idx="0">
+            <a:schemeClr val="accent1"/>
+          </a:effectRef>
+          <a:fontRef idx="minor">
+            <a:schemeClr val="tx1"/>
+          </a:fontRef>
+        </p:style>
+      </p:cxnSp>
+      <p:sp>
+        <p:nvSpPr>
+          <p:cNvPr id="28" name="Rounded Rectangle 45">
+            <a:extLst>
+              <a:ext uri="{FF2B5EF4-FFF2-40B4-BE49-F238E27FC236}">
+                <a16:creationId xmlns:a16="http://schemas.microsoft.com/office/drawing/2014/main" id="{38FF5A4C-559C-1D52-9476-314AAD56BECB}"/>
+              </a:ext>
+            </a:extLst>
+          </p:cNvPr>
+          <p:cNvSpPr/>
+          <p:nvPr/>
+        </p:nvSpPr>
+        <p:spPr>
+          <a:xfrm>
+            <a:off x="8822212" y="4493355"/>
+            <a:ext cx="3040144" cy="1540322"/>
+          </a:xfrm>
+          <a:prstGeom prst="roundRect">
+            <a:avLst/>
+          </a:prstGeom>
+          <a:solidFill>
+            <a:schemeClr val="bg2">
+              <a:lumMod val="25000"/>
+            </a:schemeClr>
+          </a:solidFill>
+          <a:ln>
+            <a:noFill/>
+          </a:ln>
+        </p:spPr>
+        <p:style>
+          <a:lnRef idx="2">
+            <a:schemeClr val="accent1">
+              <a:shade val="50000"/>
+            </a:schemeClr>
+          </a:lnRef>
+          <a:fillRef idx="1">
+            <a:schemeClr val="accent1"/>
+          </a:fillRef>
+          <a:effectRef idx="0">
+            <a:schemeClr val="accent1"/>
+          </a:effectRef>
+          <a:fontRef idx="minor">
+            <a:schemeClr val="lt1"/>
+          </a:fontRef>
+        </p:style>
+        <p:txBody>
+          <a:bodyPr rtlCol="0" anchor="ctr"/>
+          <a:lstStyle/>
+          <a:p>
+            <a:pPr algn="ctr"/>
+            <a:r>
+              <a:rPr lang="fr-FR" sz="2400" dirty="0">
+                <a:solidFill>
+                  <a:schemeClr val="bg1"/>
+                </a:solidFill>
+              </a:rPr>
+              <a:t>function « fibonacci » replica 3</a:t>
+            </a:r>
+          </a:p>
+        </p:txBody>
+      </p:sp>
+      <p:pic>
+        <p:nvPicPr>
+          <p:cNvPr id="29" name="Picture 2" descr="Afficher l’image source">
+            <a:extLst>
+              <a:ext uri="{FF2B5EF4-FFF2-40B4-BE49-F238E27FC236}">
+                <a16:creationId xmlns:a16="http://schemas.microsoft.com/office/drawing/2014/main" id="{5C2C929B-DD3A-D402-D3D0-47B59BB4F807}"/>
+              </a:ext>
+            </a:extLst>
+          </p:cNvPr>
+          <p:cNvPicPr>
+            <a:picLocks noChangeAspect="1" noChangeArrowheads="1"/>
+          </p:cNvPicPr>
+          <p:nvPr/>
+        </p:nvPicPr>
+        <p:blipFill>
+          <a:blip r:embed="rId4">
+            <a:extLst>
+              <a:ext uri="{28A0092B-C50C-407E-A947-70E740481C1C}">
+                <a14:useLocalDpi xmlns:a14="http://schemas.microsoft.com/office/drawing/2010/main" val="0"/>
+              </a:ext>
+            </a:extLst>
+          </a:blip>
+          <a:srcRect/>
+          <a:stretch>
+            <a:fillRect/>
+          </a:stretch>
+        </p:blipFill>
+        <p:spPr bwMode="auto">
+          <a:xfrm>
+            <a:off x="8753203" y="4252319"/>
+            <a:ext cx="588793" cy="572693"/>
+          </a:xfrm>
+          <a:prstGeom prst="rect">
+            <a:avLst/>
+          </a:prstGeom>
+          <a:noFill/>
+          <a:extLst>
+            <a:ext uri="{909E8E84-426E-40DD-AFC4-6F175D3DCCD1}">
+              <a14:hiddenFill xmlns:a14="http://schemas.microsoft.com/office/drawing/2010/main">
+                <a:solidFill>
+                  <a:srgbClr val="FFFFFF"/>
+                </a:solidFill>
+              </a14:hiddenFill>
+            </a:ext>
+          </a:extLst>
+        </p:spPr>
+      </p:pic>
+      <p:cxnSp>
+        <p:nvCxnSpPr>
+          <p:cNvPr id="30" name="Connecteur droit avec flèche 29">
+            <a:extLst>
+              <a:ext uri="{FF2B5EF4-FFF2-40B4-BE49-F238E27FC236}">
+                <a16:creationId xmlns:a16="http://schemas.microsoft.com/office/drawing/2014/main" id="{3C17D7D9-AD0C-3CB9-E9C2-8FE52952EA0A}"/>
+              </a:ext>
+            </a:extLst>
+          </p:cNvPr>
+          <p:cNvCxnSpPr>
+            <a:cxnSpLocks/>
+            <a:stCxn id="6" idx="3"/>
+            <a:endCxn id="28" idx="1"/>
+          </p:cNvCxnSpPr>
+          <p:nvPr/>
+        </p:nvCxnSpPr>
+        <p:spPr>
+          <a:xfrm>
+            <a:off x="6740327" y="3347841"/>
+            <a:ext cx="2081885" cy="1915675"/>
+          </a:xfrm>
+          <a:prstGeom prst="straightConnector1">
+            <a:avLst/>
+          </a:prstGeom>
+          <a:ln w="127000">
+            <a:solidFill>
+              <a:schemeClr val="accent6">
+                <a:lumMod val="75000"/>
+              </a:schemeClr>
+            </a:solidFill>
+            <a:tailEnd type="triangle"/>
+          </a:ln>
+        </p:spPr>
+        <p:style>
+          <a:lnRef idx="1">
+            <a:schemeClr val="accent1"/>
+          </a:lnRef>
+          <a:fillRef idx="0">
+            <a:schemeClr val="accent1"/>
+          </a:fillRef>
+          <a:effectRef idx="0">
+            <a:schemeClr val="accent1"/>
+          </a:effectRef>
+          <a:fontRef idx="minor">
+            <a:schemeClr val="tx1"/>
+          </a:fontRef>
+        </p:style>
+      </p:cxnSp>
+      <p:sp>
+        <p:nvSpPr>
+          <p:cNvPr id="38" name="ZoneTexte 37">
+            <a:extLst>
+              <a:ext uri="{FF2B5EF4-FFF2-40B4-BE49-F238E27FC236}">
+                <a16:creationId xmlns:a16="http://schemas.microsoft.com/office/drawing/2014/main" id="{3E51368A-C3EC-DCF9-2D42-54C522F99A21}"/>
+              </a:ext>
+            </a:extLst>
+          </p:cNvPr>
+          <p:cNvSpPr txBox="1"/>
+          <p:nvPr/>
+        </p:nvSpPr>
+        <p:spPr>
+          <a:xfrm>
+            <a:off x="7218978" y="5412088"/>
+            <a:ext cx="1659171" cy="830997"/>
+          </a:xfrm>
+          <a:prstGeom prst="rect">
+            <a:avLst/>
+          </a:prstGeom>
+          <a:noFill/>
+        </p:spPr>
+        <p:txBody>
+          <a:bodyPr wrap="square" rtlCol="0">
+            <a:spAutoFit/>
+          </a:bodyPr>
+          <a:lstStyle/>
+          <a:p>
+            <a:r>
+              <a:rPr lang="fr-FR" sz="1600" dirty="0"/>
+              <a:t>HTTP POST</a:t>
+            </a:r>
+          </a:p>
+          <a:p>
+            <a:r>
+              <a:rPr lang="fr-FR" sz="1600" dirty="0">
+                <a:hlinkClick r:id="rId3"/>
+              </a:rPr>
+              <a:t>http://fibonacci</a:t>
+            </a:r>
+            <a:r>
+              <a:rPr lang="fr-FR" sz="1600" dirty="0"/>
+              <a:t> </a:t>
+            </a:r>
+            <a:br>
+              <a:rPr lang="fr-FR" sz="1600" dirty="0"/>
+            </a:br>
+            <a:r>
+              <a:rPr lang="fr-FR" sz="1600" dirty="0"/>
+              <a:t>{</a:t>
+            </a:r>
+            <a:r>
+              <a:rPr lang="fr-FR" sz="1600" b="0" i="0" dirty="0">
+                <a:effectLst/>
+                <a:latin typeface="-apple-system"/>
+              </a:rPr>
+              <a:t>"</a:t>
+            </a:r>
+            <a:r>
+              <a:rPr lang="fr-FR" sz="1600" dirty="0"/>
+              <a:t>input</a:t>
+            </a:r>
+            <a:r>
+              <a:rPr lang="fr-FR" sz="1600" b="0" i="0" dirty="0">
+                <a:effectLst/>
+                <a:latin typeface="-apple-system"/>
+              </a:rPr>
+              <a:t>"</a:t>
+            </a:r>
+            <a:r>
+              <a:rPr lang="fr-FR" sz="1600" dirty="0"/>
+              <a:t>:42}</a:t>
+            </a:r>
+          </a:p>
+        </p:txBody>
+      </p:sp>
+      <p:pic>
+        <p:nvPicPr>
+          <p:cNvPr id="5" name="Picture 2" descr="Afficher l’image source">
+            <a:extLst>
+              <a:ext uri="{FF2B5EF4-FFF2-40B4-BE49-F238E27FC236}">
+                <a16:creationId xmlns:a16="http://schemas.microsoft.com/office/drawing/2014/main" id="{9CF92849-9C7F-61C9-32C2-F99F37E01F43}"/>
+              </a:ext>
+            </a:extLst>
+          </p:cNvPr>
+          <p:cNvPicPr>
+            <a:picLocks noChangeAspect="1" noChangeArrowheads="1"/>
+          </p:cNvPicPr>
+          <p:nvPr/>
+        </p:nvPicPr>
+        <p:blipFill>
+          <a:blip r:embed="rId4">
+            <a:extLst>
+              <a:ext uri="{28A0092B-C50C-407E-A947-70E740481C1C}">
+                <a14:useLocalDpi xmlns:a14="http://schemas.microsoft.com/office/drawing/2010/main" val="0"/>
+              </a:ext>
+            </a:extLst>
+          </a:blip>
+          <a:srcRect/>
+          <a:stretch>
+            <a:fillRect/>
+          </a:stretch>
+        </p:blipFill>
+        <p:spPr bwMode="auto">
+          <a:xfrm>
+            <a:off x="4286719" y="2514707"/>
+            <a:ext cx="588793" cy="572693"/>
+          </a:xfrm>
+          <a:prstGeom prst="rect">
+            <a:avLst/>
+          </a:prstGeom>
+          <a:noFill/>
+          <a:extLst>
+            <a:ext uri="{909E8E84-426E-40DD-AFC4-6F175D3DCCD1}">
+              <a14:hiddenFill xmlns:a14="http://schemas.microsoft.com/office/drawing/2010/main">
+                <a:solidFill>
+                  <a:srgbClr val="FFFFFF"/>
+                </a:solidFill>
+              </a14:hiddenFill>
+            </a:ext>
+          </a:extLst>
+        </p:spPr>
+      </p:pic>
+    </p:spTree>
+    <p:extLst>
+      <p:ext uri="{BB962C8B-B14F-4D97-AF65-F5344CB8AC3E}">
+        <p14:creationId xmlns:p14="http://schemas.microsoft.com/office/powerpoint/2010/main" val="2176232589"/>
+      </p:ext>
+    </p:extLst>
+  </p:cSld>
+  <p:clrMapOvr>
+    <a:masterClrMapping/>
+  </p:clrMapOvr>
+</p:sld>
+</file>
+
+<file path=ppt/slides/slide4.xml><?xml version="1.0" encoding="utf-8"?>
+<p:sld xmlns:a="http://schemas.openxmlformats.org/drawingml/2006/main" xmlns:r="http://schemas.openxmlformats.org/officeDocument/2006/relationships" xmlns:p="http://schemas.openxmlformats.org/presentationml/2006/main">
+  <p:cSld>
+    <p:spTree>
+      <p:nvGrpSpPr>
+        <p:cNvPr id="1" name=""/>
+        <p:cNvGrpSpPr/>
+        <p:nvPr/>
+      </p:nvGrpSpPr>
+      <p:grpSpPr>
+        <a:xfrm>
+          <a:off x="0" y="0"/>
+          <a:ext cx="0" cy="0"/>
+          <a:chOff x="0" y="0"/>
+          <a:chExt cx="0" cy="0"/>
+        </a:xfrm>
+      </p:grpSpPr>
+      <p:sp>
+        <p:nvSpPr>
+          <p:cNvPr id="3" name="Espace réservé du contenu 2">
+            <a:extLst>
+              <a:ext uri="{FF2B5EF4-FFF2-40B4-BE49-F238E27FC236}">
+                <a16:creationId xmlns:a16="http://schemas.microsoft.com/office/drawing/2014/main" id="{FC72177F-6E5E-241E-BA74-8D91DC6E05F3}"/>
+              </a:ext>
+            </a:extLst>
+          </p:cNvPr>
+          <p:cNvSpPr>
+            <a:spLocks noGrp="1"/>
+          </p:cNvSpPr>
+          <p:nvPr>
+            <p:ph idx="1"/>
+          </p:nvPr>
+        </p:nvSpPr>
+        <p:spPr>
+          <a:xfrm>
+            <a:off x="0" y="6391656"/>
+            <a:ext cx="12192000" cy="466343"/>
+          </a:xfrm>
+        </p:spPr>
+        <p:txBody>
+          <a:bodyPr>
+            <a:normAutofit lnSpcReduction="10000"/>
+          </a:bodyPr>
+          <a:lstStyle/>
+          <a:p>
+            <a:endParaRPr lang="fr-FR" dirty="0"/>
+          </a:p>
+        </p:txBody>
+      </p:sp>
+      <p:sp>
+        <p:nvSpPr>
+          <p:cNvPr id="6" name="Rounded Rectangle 44">
+            <a:extLst>
+              <a:ext uri="{FF2B5EF4-FFF2-40B4-BE49-F238E27FC236}">
+                <a16:creationId xmlns:a16="http://schemas.microsoft.com/office/drawing/2014/main" id="{DDD08BA0-70BB-583F-312D-C1BE714A89E8}"/>
+              </a:ext>
+            </a:extLst>
+          </p:cNvPr>
+          <p:cNvSpPr/>
+          <p:nvPr/>
+        </p:nvSpPr>
+        <p:spPr>
+          <a:xfrm>
+            <a:off x="4275182" y="2785207"/>
+            <a:ext cx="2245224" cy="1125268"/>
+          </a:xfrm>
+          <a:prstGeom prst="roundRect">
+            <a:avLst/>
+          </a:prstGeom>
+          <a:solidFill>
+            <a:schemeClr val="bg2">
+              <a:lumMod val="25000"/>
+            </a:schemeClr>
+          </a:solidFill>
+          <a:ln>
+            <a:noFill/>
+          </a:ln>
+        </p:spPr>
+        <p:style>
+          <a:lnRef idx="2">
+            <a:schemeClr val="accent1">
+              <a:shade val="50000"/>
+            </a:schemeClr>
+          </a:lnRef>
+          <a:fillRef idx="1">
+            <a:schemeClr val="accent1"/>
+          </a:fillRef>
+          <a:effectRef idx="0">
+            <a:schemeClr val="accent1"/>
+          </a:effectRef>
+          <a:fontRef idx="minor">
+            <a:schemeClr val="lt1"/>
+          </a:fontRef>
+        </p:style>
+        <p:txBody>
+          <a:bodyPr rtlCol="0" anchor="ctr"/>
+          <a:lstStyle/>
+          <a:p>
+            <a:pPr algn="ctr"/>
+            <a:r>
+              <a:rPr lang="en-US" sz="2400" dirty="0">
+                <a:solidFill>
+                  <a:schemeClr val="bg1"/>
+                </a:solidFill>
+              </a:rPr>
+              <a:t>SlimFaas</a:t>
+            </a:r>
+          </a:p>
+        </p:txBody>
+      </p:sp>
+      <p:cxnSp>
+        <p:nvCxnSpPr>
+          <p:cNvPr id="7" name="Connecteur droit avec flèche 6">
+            <a:extLst>
+              <a:ext uri="{FF2B5EF4-FFF2-40B4-BE49-F238E27FC236}">
+                <a16:creationId xmlns:a16="http://schemas.microsoft.com/office/drawing/2014/main" id="{2846A4F1-5F1E-1B4A-EAEC-F51C758D93A6}"/>
+              </a:ext>
+            </a:extLst>
+          </p:cNvPr>
+          <p:cNvCxnSpPr>
+            <a:cxnSpLocks/>
+            <a:stCxn id="8" idx="3"/>
+            <a:endCxn id="6" idx="1"/>
+          </p:cNvCxnSpPr>
+          <p:nvPr/>
+        </p:nvCxnSpPr>
+        <p:spPr>
+          <a:xfrm flipV="1">
+            <a:off x="3699119" y="3347841"/>
+            <a:ext cx="576063" cy="4215"/>
+          </a:xfrm>
+          <a:prstGeom prst="straightConnector1">
+            <a:avLst/>
+          </a:prstGeom>
+          <a:ln w="127000">
+            <a:solidFill>
+              <a:schemeClr val="accent6">
+                <a:lumMod val="75000"/>
+              </a:schemeClr>
+            </a:solidFill>
+            <a:tailEnd type="triangle"/>
+          </a:ln>
+        </p:spPr>
+        <p:style>
+          <a:lnRef idx="1">
+            <a:schemeClr val="accent1"/>
+          </a:lnRef>
+          <a:fillRef idx="0">
+            <a:schemeClr val="accent1"/>
+          </a:fillRef>
+          <a:effectRef idx="0">
+            <a:schemeClr val="accent1"/>
+          </a:effectRef>
+          <a:fontRef idx="minor">
+            <a:schemeClr val="tx1"/>
+          </a:fontRef>
+        </p:style>
+      </p:cxnSp>
+      <p:sp>
+        <p:nvSpPr>
+          <p:cNvPr id="8" name="ZoneTexte 7">
+            <a:extLst>
+              <a:ext uri="{FF2B5EF4-FFF2-40B4-BE49-F238E27FC236}">
+                <a16:creationId xmlns:a16="http://schemas.microsoft.com/office/drawing/2014/main" id="{AC32730B-6D07-37BE-5E05-17826CC33CC8}"/>
+              </a:ext>
+            </a:extLst>
+          </p:cNvPr>
+          <p:cNvSpPr txBox="1"/>
+          <p:nvPr/>
+        </p:nvSpPr>
+        <p:spPr>
+          <a:xfrm>
+            <a:off x="61124" y="2936557"/>
+            <a:ext cx="3637995" cy="830997"/>
+          </a:xfrm>
+          <a:prstGeom prst="rect">
+            <a:avLst/>
+          </a:prstGeom>
+          <a:noFill/>
+        </p:spPr>
+        <p:txBody>
+          <a:bodyPr wrap="square" rtlCol="0">
+            <a:spAutoFit/>
+          </a:bodyPr>
+          <a:lstStyle/>
+          <a:p>
+            <a:r>
+              <a:rPr lang="fr-FR" sz="1600" dirty="0"/>
+              <a:t>HTTP POST</a:t>
+            </a:r>
+          </a:p>
+          <a:p>
+            <a:r>
+              <a:rPr lang="fr-FR" sz="1600" dirty="0">
+                <a:hlinkClick r:id="rId2"/>
+              </a:rPr>
+              <a:t>http://slimfaas/</a:t>
+            </a:r>
+            <a:r>
+              <a:rPr lang="fr-FR" sz="1600" dirty="0">
+                <a:highlight>
+                  <a:srgbClr val="FFFF00"/>
+                </a:highlight>
+                <a:hlinkClick r:id="rId2"/>
+              </a:rPr>
+              <a:t>async-publish</a:t>
+            </a:r>
+            <a:r>
+              <a:rPr lang="fr-FR" sz="1600" dirty="0">
+                <a:hlinkClick r:id="rId2"/>
+              </a:rPr>
+              <a:t>/fibonacci</a:t>
+            </a:r>
+            <a:endParaRPr lang="fr-FR" sz="1600" dirty="0"/>
+          </a:p>
+          <a:p>
+            <a:r>
+              <a:rPr lang="fr-FR" sz="1600" dirty="0"/>
+              <a:t>{</a:t>
+            </a:r>
+            <a:r>
+              <a:rPr lang="fr-FR" sz="1600" b="0" i="0" dirty="0">
+                <a:effectLst/>
+                <a:latin typeface="-apple-system"/>
+              </a:rPr>
+              <a:t>"</a:t>
+            </a:r>
+            <a:r>
+              <a:rPr lang="fr-FR" sz="1600" dirty="0"/>
+              <a:t>input</a:t>
+            </a:r>
+            <a:r>
+              <a:rPr lang="fr-FR" sz="1600" b="0" i="0" dirty="0">
+                <a:effectLst/>
+                <a:latin typeface="-apple-system"/>
+              </a:rPr>
+              <a:t>"</a:t>
+            </a:r>
+            <a:r>
+              <a:rPr lang="fr-FR" sz="1600" dirty="0"/>
+              <a:t>:42}</a:t>
+            </a:r>
+          </a:p>
+        </p:txBody>
+      </p:sp>
+      <p:sp>
+        <p:nvSpPr>
+          <p:cNvPr id="9" name="ZoneTexte 8">
+            <a:extLst>
+              <a:ext uri="{FF2B5EF4-FFF2-40B4-BE49-F238E27FC236}">
+                <a16:creationId xmlns:a16="http://schemas.microsoft.com/office/drawing/2014/main" id="{6611272C-28EE-7524-CD4D-AAE3B72A1A73}"/>
+              </a:ext>
+            </a:extLst>
+          </p:cNvPr>
+          <p:cNvSpPr txBox="1"/>
+          <p:nvPr/>
+        </p:nvSpPr>
+        <p:spPr>
+          <a:xfrm>
+            <a:off x="6542729" y="997387"/>
+            <a:ext cx="1659171" cy="830997"/>
+          </a:xfrm>
+          <a:prstGeom prst="rect">
+            <a:avLst/>
+          </a:prstGeom>
+          <a:noFill/>
+        </p:spPr>
+        <p:txBody>
+          <a:bodyPr wrap="square" rtlCol="0">
+            <a:spAutoFit/>
+          </a:bodyPr>
+          <a:lstStyle/>
+          <a:p>
+            <a:r>
+              <a:rPr lang="fr-FR" sz="1600" dirty="0"/>
+              <a:t>HTTP POST</a:t>
+            </a:r>
+          </a:p>
+          <a:p>
+            <a:r>
+              <a:rPr lang="fr-FR" sz="1600" dirty="0">
+                <a:hlinkClick r:id="rId3"/>
+              </a:rPr>
+              <a:t>http://fibonacci</a:t>
+            </a:r>
+            <a:r>
+              <a:rPr lang="fr-FR" sz="1600" dirty="0"/>
+              <a:t> </a:t>
+            </a:r>
+            <a:br>
+              <a:rPr lang="fr-FR" sz="1600" dirty="0"/>
+            </a:br>
+            <a:r>
+              <a:rPr lang="fr-FR" sz="1600" dirty="0"/>
+              <a:t>{</a:t>
+            </a:r>
+            <a:r>
+              <a:rPr lang="fr-FR" sz="1600" b="0" i="0" dirty="0">
+                <a:effectLst/>
+                <a:latin typeface="-apple-system"/>
+              </a:rPr>
+              <a:t>"</a:t>
+            </a:r>
+            <a:r>
+              <a:rPr lang="fr-FR" sz="1600" dirty="0"/>
+              <a:t>input</a:t>
+            </a:r>
+            <a:r>
+              <a:rPr lang="fr-FR" sz="1600" b="0" i="0" dirty="0">
+                <a:effectLst/>
+                <a:latin typeface="-apple-system"/>
+              </a:rPr>
+              <a:t>"</a:t>
+            </a:r>
+            <a:r>
+              <a:rPr lang="fr-FR" sz="1600" dirty="0"/>
+              <a:t>:42}</a:t>
+            </a:r>
+          </a:p>
+        </p:txBody>
+      </p:sp>
+      <p:sp>
+        <p:nvSpPr>
+          <p:cNvPr id="10" name="Rounded Rectangle 45">
+            <a:extLst>
+              <a:ext uri="{FF2B5EF4-FFF2-40B4-BE49-F238E27FC236}">
+                <a16:creationId xmlns:a16="http://schemas.microsoft.com/office/drawing/2014/main" id="{D79C9965-A2CD-C2C1-A01C-697EABB121C8}"/>
+              </a:ext>
+            </a:extLst>
+          </p:cNvPr>
+          <p:cNvSpPr/>
+          <p:nvPr/>
+        </p:nvSpPr>
+        <p:spPr>
+          <a:xfrm>
+            <a:off x="8812333" y="509182"/>
+            <a:ext cx="3040144" cy="1540322"/>
+          </a:xfrm>
+          <a:prstGeom prst="roundRect">
+            <a:avLst/>
+          </a:prstGeom>
+          <a:solidFill>
+            <a:schemeClr val="bg2">
+              <a:lumMod val="25000"/>
+            </a:schemeClr>
+          </a:solidFill>
+          <a:ln>
+            <a:noFill/>
+          </a:ln>
+        </p:spPr>
+        <p:style>
+          <a:lnRef idx="2">
+            <a:schemeClr val="accent1">
+              <a:shade val="50000"/>
+            </a:schemeClr>
+          </a:lnRef>
+          <a:fillRef idx="1">
+            <a:schemeClr val="accent1"/>
+          </a:fillRef>
+          <a:effectRef idx="0">
+            <a:schemeClr val="accent1"/>
+          </a:effectRef>
+          <a:fontRef idx="minor">
+            <a:schemeClr val="lt1"/>
+          </a:fontRef>
+        </p:style>
+        <p:txBody>
+          <a:bodyPr rtlCol="0" anchor="ctr"/>
+          <a:lstStyle/>
+          <a:p>
+            <a:pPr algn="ctr"/>
+            <a:r>
+              <a:rPr lang="fr-FR" sz="2400" dirty="0">
+                <a:solidFill>
+                  <a:schemeClr val="bg1"/>
+                </a:solidFill>
+              </a:rPr>
+              <a:t>function « fibonacci » instance 1</a:t>
+            </a:r>
+            <a:endParaRPr lang="en-FR" sz="2400" dirty="0">
+              <a:solidFill>
+                <a:schemeClr val="bg1"/>
+              </a:solidFill>
+            </a:endParaRPr>
+          </a:p>
+        </p:txBody>
+      </p:sp>
+      <p:pic>
+        <p:nvPicPr>
+          <p:cNvPr id="11" name="Picture 2" descr="Afficher l’image source">
+            <a:extLst>
+              <a:ext uri="{FF2B5EF4-FFF2-40B4-BE49-F238E27FC236}">
+                <a16:creationId xmlns:a16="http://schemas.microsoft.com/office/drawing/2014/main" id="{B80A9736-02F1-1190-8A3C-F71D0B8C1D08}"/>
+              </a:ext>
+            </a:extLst>
+          </p:cNvPr>
+          <p:cNvPicPr>
+            <a:picLocks noChangeAspect="1" noChangeArrowheads="1"/>
+          </p:cNvPicPr>
+          <p:nvPr/>
+        </p:nvPicPr>
+        <p:blipFill>
+          <a:blip r:embed="rId4">
+            <a:extLst>
+              <a:ext uri="{28A0092B-C50C-407E-A947-70E740481C1C}">
+                <a14:useLocalDpi xmlns:a14="http://schemas.microsoft.com/office/drawing/2010/main" val="0"/>
+              </a:ext>
+            </a:extLst>
+          </a:blip>
+          <a:srcRect/>
+          <a:stretch>
+            <a:fillRect/>
+          </a:stretch>
+        </p:blipFill>
+        <p:spPr bwMode="auto">
+          <a:xfrm>
+            <a:off x="8618142" y="206059"/>
+            <a:ext cx="588793" cy="572693"/>
+          </a:xfrm>
+          <a:prstGeom prst="rect">
+            <a:avLst/>
+          </a:prstGeom>
+          <a:noFill/>
+          <a:extLst>
+            <a:ext uri="{909E8E84-426E-40DD-AFC4-6F175D3DCCD1}">
+              <a14:hiddenFill xmlns:a14="http://schemas.microsoft.com/office/drawing/2010/main">
+                <a:solidFill>
+                  <a:srgbClr val="FFFFFF"/>
+                </a:solidFill>
+              </a14:hiddenFill>
+            </a:ext>
+          </a:extLst>
+        </p:spPr>
+      </p:pic>
+      <p:cxnSp>
+        <p:nvCxnSpPr>
+          <p:cNvPr id="12" name="Connecteur droit avec flèche 11">
+            <a:extLst>
+              <a:ext uri="{FF2B5EF4-FFF2-40B4-BE49-F238E27FC236}">
+                <a16:creationId xmlns:a16="http://schemas.microsoft.com/office/drawing/2014/main" id="{3AFE1186-6876-1E2D-BB90-BFA726C0ACA3}"/>
+              </a:ext>
+            </a:extLst>
+          </p:cNvPr>
+          <p:cNvCxnSpPr>
+            <a:cxnSpLocks/>
+            <a:stCxn id="6" idx="3"/>
+            <a:endCxn id="10" idx="1"/>
+          </p:cNvCxnSpPr>
+          <p:nvPr/>
+        </p:nvCxnSpPr>
+        <p:spPr>
+          <a:xfrm flipV="1">
+            <a:off x="6520406" y="1279343"/>
+            <a:ext cx="2291927" cy="2068498"/>
+          </a:xfrm>
+          <a:prstGeom prst="straightConnector1">
+            <a:avLst/>
+          </a:prstGeom>
+          <a:ln w="127000">
+            <a:solidFill>
+              <a:schemeClr val="accent6">
+                <a:lumMod val="75000"/>
+              </a:schemeClr>
+            </a:solidFill>
+            <a:tailEnd type="triangle"/>
+          </a:ln>
+        </p:spPr>
+        <p:style>
+          <a:lnRef idx="1">
+            <a:schemeClr val="accent1"/>
+          </a:lnRef>
+          <a:fillRef idx="0">
+            <a:schemeClr val="accent1"/>
+          </a:fillRef>
+          <a:effectRef idx="0">
+            <a:schemeClr val="accent1"/>
+          </a:effectRef>
+          <a:fontRef idx="minor">
+            <a:schemeClr val="tx1"/>
+          </a:fontRef>
+        </p:style>
+      </p:cxnSp>
+      <p:sp>
+        <p:nvSpPr>
+          <p:cNvPr id="22" name="ZoneTexte 21">
+            <a:extLst>
+              <a:ext uri="{FF2B5EF4-FFF2-40B4-BE49-F238E27FC236}">
+                <a16:creationId xmlns:a16="http://schemas.microsoft.com/office/drawing/2014/main" id="{B20F6461-EFC4-60A1-6479-F83792C4E189}"/>
+              </a:ext>
+            </a:extLst>
+          </p:cNvPr>
+          <p:cNvSpPr txBox="1"/>
+          <p:nvPr/>
+        </p:nvSpPr>
+        <p:spPr>
+          <a:xfrm>
+            <a:off x="7304194" y="3284661"/>
+            <a:ext cx="1659171" cy="830997"/>
+          </a:xfrm>
+          <a:prstGeom prst="rect">
+            <a:avLst/>
+          </a:prstGeom>
+          <a:noFill/>
+        </p:spPr>
+        <p:txBody>
+          <a:bodyPr wrap="square" rtlCol="0">
+            <a:spAutoFit/>
+          </a:bodyPr>
+          <a:lstStyle/>
+          <a:p>
+            <a:r>
+              <a:rPr lang="fr-FR" sz="1600" dirty="0"/>
+              <a:t>HTTP POST</a:t>
+            </a:r>
+          </a:p>
+          <a:p>
+            <a:r>
+              <a:rPr lang="fr-FR" sz="1600" dirty="0">
+                <a:hlinkClick r:id="rId3"/>
+              </a:rPr>
+              <a:t>http://fibonacci</a:t>
+            </a:r>
+            <a:r>
+              <a:rPr lang="fr-FR" sz="1600" dirty="0"/>
+              <a:t> </a:t>
+            </a:r>
+            <a:br>
+              <a:rPr lang="fr-FR" sz="1600" dirty="0"/>
+            </a:br>
+            <a:r>
+              <a:rPr lang="fr-FR" sz="1600" dirty="0"/>
+              <a:t>{</a:t>
+            </a:r>
+            <a:r>
+              <a:rPr lang="fr-FR" sz="1600" b="0" i="0" dirty="0">
+                <a:effectLst/>
+                <a:latin typeface="-apple-system"/>
+              </a:rPr>
+              <a:t>"</a:t>
+            </a:r>
+            <a:r>
+              <a:rPr lang="fr-FR" sz="1600" dirty="0"/>
+              <a:t>input</a:t>
+            </a:r>
+            <a:r>
+              <a:rPr lang="fr-FR" sz="1600" b="0" i="0" dirty="0">
+                <a:effectLst/>
+                <a:latin typeface="-apple-system"/>
+              </a:rPr>
+              <a:t>"</a:t>
+            </a:r>
+            <a:r>
+              <a:rPr lang="fr-FR" sz="1600" dirty="0"/>
+              <a:t>:42}</a:t>
+            </a:r>
+          </a:p>
+        </p:txBody>
+      </p:sp>
+      <p:sp>
+        <p:nvSpPr>
+          <p:cNvPr id="23" name="Rounded Rectangle 45">
+            <a:extLst>
+              <a:ext uri="{FF2B5EF4-FFF2-40B4-BE49-F238E27FC236}">
+                <a16:creationId xmlns:a16="http://schemas.microsoft.com/office/drawing/2014/main" id="{02CDF874-6617-192D-7FBF-DFCDF050DE8B}"/>
+              </a:ext>
+            </a:extLst>
+          </p:cNvPr>
+          <p:cNvSpPr/>
+          <p:nvPr/>
+        </p:nvSpPr>
+        <p:spPr>
+          <a:xfrm>
+            <a:off x="8858733" y="2401822"/>
+            <a:ext cx="3040144" cy="1540322"/>
+          </a:xfrm>
+          <a:prstGeom prst="roundRect">
+            <a:avLst/>
+          </a:prstGeom>
+          <a:solidFill>
+            <a:schemeClr val="bg2">
+              <a:lumMod val="25000"/>
+            </a:schemeClr>
+          </a:solidFill>
+          <a:ln>
+            <a:noFill/>
+          </a:ln>
+        </p:spPr>
+        <p:style>
+          <a:lnRef idx="2">
+            <a:schemeClr val="accent1">
+              <a:shade val="50000"/>
+            </a:schemeClr>
+          </a:lnRef>
+          <a:fillRef idx="1">
+            <a:schemeClr val="accent1"/>
+          </a:fillRef>
+          <a:effectRef idx="0">
+            <a:schemeClr val="accent1"/>
+          </a:effectRef>
+          <a:fontRef idx="minor">
+            <a:schemeClr val="lt1"/>
+          </a:fontRef>
+        </p:style>
+        <p:txBody>
+          <a:bodyPr rtlCol="0" anchor="ctr"/>
+          <a:lstStyle/>
+          <a:p>
+            <a:pPr algn="ctr"/>
+            <a:r>
+              <a:rPr lang="fr-FR" sz="2400" dirty="0">
+                <a:solidFill>
+                  <a:schemeClr val="bg1"/>
+                </a:solidFill>
+              </a:rPr>
+              <a:t>function « fibonacci » instance 2</a:t>
+            </a:r>
+          </a:p>
+        </p:txBody>
+      </p:sp>
+      <p:pic>
+        <p:nvPicPr>
+          <p:cNvPr id="24" name="Picture 2" descr="Afficher l’image source">
+            <a:extLst>
+              <a:ext uri="{FF2B5EF4-FFF2-40B4-BE49-F238E27FC236}">
+                <a16:creationId xmlns:a16="http://schemas.microsoft.com/office/drawing/2014/main" id="{6367FF6E-BE42-9237-982C-7249BC298201}"/>
+              </a:ext>
+            </a:extLst>
+          </p:cNvPr>
+          <p:cNvPicPr>
+            <a:picLocks noChangeAspect="1" noChangeArrowheads="1"/>
+          </p:cNvPicPr>
+          <p:nvPr/>
+        </p:nvPicPr>
+        <p:blipFill>
+          <a:blip r:embed="rId4">
+            <a:extLst>
+              <a:ext uri="{28A0092B-C50C-407E-A947-70E740481C1C}">
+                <a14:useLocalDpi xmlns:a14="http://schemas.microsoft.com/office/drawing/2010/main" val="0"/>
+              </a:ext>
+            </a:extLst>
+          </a:blip>
+          <a:srcRect/>
+          <a:stretch>
+            <a:fillRect/>
+          </a:stretch>
+        </p:blipFill>
+        <p:spPr bwMode="auto">
+          <a:xfrm>
+            <a:off x="8799603" y="2111546"/>
+            <a:ext cx="588793" cy="572693"/>
+          </a:xfrm>
+          <a:prstGeom prst="rect">
+            <a:avLst/>
+          </a:prstGeom>
+          <a:noFill/>
+          <a:extLst>
+            <a:ext uri="{909E8E84-426E-40DD-AFC4-6F175D3DCCD1}">
+              <a14:hiddenFill xmlns:a14="http://schemas.microsoft.com/office/drawing/2010/main">
+                <a:solidFill>
+                  <a:srgbClr val="FFFFFF"/>
+                </a:solidFill>
+              </a14:hiddenFill>
+            </a:ext>
+          </a:extLst>
+        </p:spPr>
+      </p:pic>
+      <p:cxnSp>
+        <p:nvCxnSpPr>
+          <p:cNvPr id="25" name="Connecteur droit avec flèche 24">
+            <a:extLst>
+              <a:ext uri="{FF2B5EF4-FFF2-40B4-BE49-F238E27FC236}">
+                <a16:creationId xmlns:a16="http://schemas.microsoft.com/office/drawing/2014/main" id="{47CCB34C-BDE9-83E6-DBE9-369CE229F27F}"/>
+              </a:ext>
+            </a:extLst>
+          </p:cNvPr>
+          <p:cNvCxnSpPr>
+            <a:cxnSpLocks/>
+            <a:stCxn id="6" idx="3"/>
+            <a:endCxn id="23" idx="1"/>
+          </p:cNvCxnSpPr>
+          <p:nvPr/>
+        </p:nvCxnSpPr>
+        <p:spPr>
+          <a:xfrm flipV="1">
+            <a:off x="6520406" y="3171983"/>
+            <a:ext cx="2338327" cy="175858"/>
+          </a:xfrm>
+          <a:prstGeom prst="straightConnector1">
+            <a:avLst/>
+          </a:prstGeom>
+          <a:ln w="127000">
+            <a:solidFill>
+              <a:schemeClr val="accent6">
+                <a:lumMod val="75000"/>
+              </a:schemeClr>
+            </a:solidFill>
+            <a:tailEnd type="triangle"/>
+          </a:ln>
+        </p:spPr>
+        <p:style>
+          <a:lnRef idx="1">
+            <a:schemeClr val="accent1"/>
+          </a:lnRef>
+          <a:fillRef idx="0">
+            <a:schemeClr val="accent1"/>
+          </a:fillRef>
+          <a:effectRef idx="0">
+            <a:schemeClr val="accent1"/>
+          </a:effectRef>
+          <a:fontRef idx="minor">
+            <a:schemeClr val="tx1"/>
+          </a:fontRef>
+        </p:style>
+      </p:cxnSp>
+      <p:sp>
+        <p:nvSpPr>
+          <p:cNvPr id="28" name="Rounded Rectangle 45">
+            <a:extLst>
+              <a:ext uri="{FF2B5EF4-FFF2-40B4-BE49-F238E27FC236}">
+                <a16:creationId xmlns:a16="http://schemas.microsoft.com/office/drawing/2014/main" id="{38FF5A4C-559C-1D52-9476-314AAD56BECB}"/>
+              </a:ext>
+            </a:extLst>
+          </p:cNvPr>
+          <p:cNvSpPr/>
+          <p:nvPr/>
+        </p:nvSpPr>
+        <p:spPr>
+          <a:xfrm>
+            <a:off x="8822212" y="4493355"/>
+            <a:ext cx="3040144" cy="1540322"/>
+          </a:xfrm>
+          <a:prstGeom prst="roundRect">
+            <a:avLst/>
+          </a:prstGeom>
+          <a:solidFill>
+            <a:schemeClr val="bg2">
+              <a:lumMod val="25000"/>
+            </a:schemeClr>
+          </a:solidFill>
+          <a:ln>
+            <a:noFill/>
+          </a:ln>
+        </p:spPr>
+        <p:style>
+          <a:lnRef idx="2">
+            <a:schemeClr val="accent1">
+              <a:shade val="50000"/>
+            </a:schemeClr>
+          </a:lnRef>
+          <a:fillRef idx="1">
+            <a:schemeClr val="accent1"/>
+          </a:fillRef>
+          <a:effectRef idx="0">
+            <a:schemeClr val="accent1"/>
+          </a:effectRef>
+          <a:fontRef idx="minor">
+            <a:schemeClr val="lt1"/>
+          </a:fontRef>
+        </p:style>
+        <p:txBody>
+          <a:bodyPr rtlCol="0" anchor="ctr"/>
+          <a:lstStyle/>
+          <a:p>
+            <a:pPr algn="ctr"/>
+            <a:r>
+              <a:rPr lang="fr-FR" sz="2400" dirty="0">
+                <a:solidFill>
+                  <a:schemeClr val="bg1"/>
+                </a:solidFill>
+              </a:rPr>
+              <a:t>function « fibonacci » instance 3</a:t>
+            </a:r>
+          </a:p>
+        </p:txBody>
+      </p:sp>
+      <p:pic>
+        <p:nvPicPr>
+          <p:cNvPr id="29" name="Picture 2" descr="Afficher l’image source">
+            <a:extLst>
+              <a:ext uri="{FF2B5EF4-FFF2-40B4-BE49-F238E27FC236}">
+                <a16:creationId xmlns:a16="http://schemas.microsoft.com/office/drawing/2014/main" id="{5C2C929B-DD3A-D402-D3D0-47B59BB4F807}"/>
+              </a:ext>
+            </a:extLst>
+          </p:cNvPr>
+          <p:cNvPicPr>
+            <a:picLocks noChangeAspect="1" noChangeArrowheads="1"/>
+          </p:cNvPicPr>
+          <p:nvPr/>
+        </p:nvPicPr>
+        <p:blipFill>
+          <a:blip r:embed="rId4">
+            <a:extLst>
+              <a:ext uri="{28A0092B-C50C-407E-A947-70E740481C1C}">
+                <a14:useLocalDpi xmlns:a14="http://schemas.microsoft.com/office/drawing/2010/main" val="0"/>
+              </a:ext>
+            </a:extLst>
+          </a:blip>
+          <a:srcRect/>
+          <a:stretch>
+            <a:fillRect/>
+          </a:stretch>
+        </p:blipFill>
+        <p:spPr bwMode="auto">
+          <a:xfrm>
+            <a:off x="8753203" y="4252319"/>
+            <a:ext cx="588793" cy="572693"/>
+          </a:xfrm>
+          <a:prstGeom prst="rect">
+            <a:avLst/>
+          </a:prstGeom>
+          <a:noFill/>
+          <a:extLst>
+            <a:ext uri="{909E8E84-426E-40DD-AFC4-6F175D3DCCD1}">
+              <a14:hiddenFill xmlns:a14="http://schemas.microsoft.com/office/drawing/2010/main">
+                <a:solidFill>
+                  <a:srgbClr val="FFFFFF"/>
+                </a:solidFill>
+              </a14:hiddenFill>
+            </a:ext>
+          </a:extLst>
+        </p:spPr>
+      </p:pic>
+      <p:cxnSp>
+        <p:nvCxnSpPr>
+          <p:cNvPr id="30" name="Connecteur droit avec flèche 29">
+            <a:extLst>
+              <a:ext uri="{FF2B5EF4-FFF2-40B4-BE49-F238E27FC236}">
+                <a16:creationId xmlns:a16="http://schemas.microsoft.com/office/drawing/2014/main" id="{3C17D7D9-AD0C-3CB9-E9C2-8FE52952EA0A}"/>
+              </a:ext>
+            </a:extLst>
+          </p:cNvPr>
+          <p:cNvCxnSpPr>
+            <a:cxnSpLocks/>
+            <a:stCxn id="6" idx="3"/>
+            <a:endCxn id="28" idx="1"/>
+          </p:cNvCxnSpPr>
+          <p:nvPr/>
+        </p:nvCxnSpPr>
+        <p:spPr>
+          <a:xfrm>
+            <a:off x="6520406" y="3347841"/>
+            <a:ext cx="2301806" cy="1915675"/>
+          </a:xfrm>
+          <a:prstGeom prst="straightConnector1">
+            <a:avLst/>
+          </a:prstGeom>
+          <a:ln w="127000">
+            <a:solidFill>
+              <a:schemeClr val="accent6">
+                <a:lumMod val="75000"/>
+              </a:schemeClr>
+            </a:solidFill>
+            <a:tailEnd type="triangle"/>
+          </a:ln>
+        </p:spPr>
+        <p:style>
+          <a:lnRef idx="1">
+            <a:schemeClr val="accent1"/>
+          </a:lnRef>
+          <a:fillRef idx="0">
+            <a:schemeClr val="accent1"/>
+          </a:fillRef>
+          <a:effectRef idx="0">
+            <a:schemeClr val="accent1"/>
+          </a:effectRef>
+          <a:fontRef idx="minor">
+            <a:schemeClr val="tx1"/>
+          </a:fontRef>
+        </p:style>
+      </p:cxnSp>
+      <p:sp>
+        <p:nvSpPr>
+          <p:cNvPr id="38" name="ZoneTexte 37">
+            <a:extLst>
+              <a:ext uri="{FF2B5EF4-FFF2-40B4-BE49-F238E27FC236}">
+                <a16:creationId xmlns:a16="http://schemas.microsoft.com/office/drawing/2014/main" id="{3E51368A-C3EC-DCF9-2D42-54C522F99A21}"/>
+              </a:ext>
+            </a:extLst>
+          </p:cNvPr>
+          <p:cNvSpPr txBox="1"/>
+          <p:nvPr/>
+        </p:nvSpPr>
+        <p:spPr>
+          <a:xfrm>
+            <a:off x="7218978" y="5412088"/>
+            <a:ext cx="1659171" cy="830997"/>
+          </a:xfrm>
+          <a:prstGeom prst="rect">
+            <a:avLst/>
+          </a:prstGeom>
+          <a:noFill/>
+        </p:spPr>
+        <p:txBody>
+          <a:bodyPr wrap="square" rtlCol="0">
+            <a:spAutoFit/>
+          </a:bodyPr>
+          <a:lstStyle/>
+          <a:p>
+            <a:r>
+              <a:rPr lang="fr-FR" sz="1600" dirty="0"/>
+              <a:t>HTTP POST</a:t>
+            </a:r>
+          </a:p>
+          <a:p>
+            <a:r>
+              <a:rPr lang="fr-FR" sz="1600" dirty="0">
+                <a:hlinkClick r:id="rId3"/>
+              </a:rPr>
+              <a:t>http://fibonacci</a:t>
+            </a:r>
+            <a:r>
+              <a:rPr lang="fr-FR" sz="1600" dirty="0"/>
+              <a:t> </a:t>
+            </a:r>
+            <a:br>
+              <a:rPr lang="fr-FR" sz="1600" dirty="0"/>
+            </a:br>
+            <a:r>
+              <a:rPr lang="fr-FR" sz="1600" dirty="0"/>
+              <a:t>{</a:t>
+            </a:r>
+            <a:r>
+              <a:rPr lang="fr-FR" sz="1600" b="0" i="0" dirty="0">
+                <a:effectLst/>
+                <a:latin typeface="-apple-system"/>
+              </a:rPr>
+              <a:t>"</a:t>
+            </a:r>
+            <a:r>
+              <a:rPr lang="fr-FR" sz="1600" dirty="0"/>
+              <a:t>input</a:t>
+            </a:r>
+            <a:r>
+              <a:rPr lang="fr-FR" sz="1600" b="0" i="0" dirty="0">
+                <a:effectLst/>
+                <a:latin typeface="-apple-system"/>
+              </a:rPr>
+              <a:t>"</a:t>
+            </a:r>
+            <a:r>
+              <a:rPr lang="fr-FR" sz="1600" dirty="0"/>
+              <a:t>:42}</a:t>
+            </a:r>
+          </a:p>
+        </p:txBody>
+      </p:sp>
+      <p:pic>
+        <p:nvPicPr>
+          <p:cNvPr id="5" name="Picture 2" descr="Afficher l’image source">
+            <a:extLst>
+              <a:ext uri="{FF2B5EF4-FFF2-40B4-BE49-F238E27FC236}">
+                <a16:creationId xmlns:a16="http://schemas.microsoft.com/office/drawing/2014/main" id="{9CF92849-9C7F-61C9-32C2-F99F37E01F43}"/>
+              </a:ext>
+            </a:extLst>
+          </p:cNvPr>
+          <p:cNvPicPr>
+            <a:picLocks noChangeAspect="1" noChangeArrowheads="1"/>
+          </p:cNvPicPr>
+          <p:nvPr/>
+        </p:nvPicPr>
+        <p:blipFill>
+          <a:blip r:embed="rId4">
+            <a:extLst>
+              <a:ext uri="{28A0092B-C50C-407E-A947-70E740481C1C}">
+                <a14:useLocalDpi xmlns:a14="http://schemas.microsoft.com/office/drawing/2010/main" val="0"/>
+              </a:ext>
+            </a:extLst>
+          </a:blip>
+          <a:srcRect/>
+          <a:stretch>
+            <a:fillRect/>
+          </a:stretch>
+        </p:blipFill>
+        <p:spPr bwMode="auto">
+          <a:xfrm>
+            <a:off x="4066798" y="2514707"/>
+            <a:ext cx="588793" cy="572693"/>
+          </a:xfrm>
+          <a:prstGeom prst="rect">
+            <a:avLst/>
+          </a:prstGeom>
+          <a:noFill/>
+          <a:extLst>
+            <a:ext uri="{909E8E84-426E-40DD-AFC4-6F175D3DCCD1}">
+              <a14:hiddenFill xmlns:a14="http://schemas.microsoft.com/office/drawing/2010/main">
+                <a:solidFill>
+                  <a:srgbClr val="FFFFFF"/>
+                </a:solidFill>
+              </a14:hiddenFill>
+            </a:ext>
+          </a:extLst>
+        </p:spPr>
+      </p:pic>
+    </p:spTree>
+    <p:extLst>
+      <p:ext uri="{BB962C8B-B14F-4D97-AF65-F5344CB8AC3E}">
+        <p14:creationId xmlns:p14="http://schemas.microsoft.com/office/powerpoint/2010/main" val="1816212992"/>
       </p:ext>
     </p:extLst>
   </p:cSld>
@@ -7196,6 +9212,34 @@
 </file>
 
 <file path=customXml/item1.xml><?xml version="1.0" encoding="utf-8"?>
+<p:properties xmlns:p="http://schemas.microsoft.com/office/2006/metadata/properties" xmlns:xsi="http://www.w3.org/2001/XMLSchema-instance" xmlns:pc="http://schemas.microsoft.com/office/infopath/2007/PartnerControls">
+  <documentManagement>
+    <SharedWithUsers xmlns="03cb9dc2-e9ea-44ac-afed-001b6fad4f36">
+      <UserInfo>
+        <DisplayName>LEMARCHAND THOMAS</DisplayName>
+        <AccountId>16</AccountId>
+        <AccountType/>
+      </UserInfo>
+      <UserInfo>
+        <DisplayName>CHERVET Guillaume</DisplayName>
+        <AccountId>84</AccountId>
+        <AccountType/>
+      </UserInfo>
+    </SharedWithUsers>
+  </documentManagement>
+</p:properties>
+</file>
+
+<file path=customXml/item2.xml><?xml version="1.0" encoding="utf-8"?>
+<?mso-contentType ?>
+<FormTemplates xmlns="http://schemas.microsoft.com/sharepoint/v3/contenttype/forms">
+  <Display>DocumentLibraryForm</Display>
+  <Edit>DocumentLibraryForm</Edit>
+  <New>DocumentLibraryForm</New>
+</FormTemplates>
+</file>
+
+<file path=customXml/item3.xml><?xml version="1.0" encoding="utf-8"?>
 <ct:contentTypeSchema xmlns:ct="http://schemas.microsoft.com/office/2006/metadata/contentType" xmlns:ma="http://schemas.microsoft.com/office/2006/metadata/properties/metaAttributes" ct:_="" ma:_="" ma:contentTypeName="Document" ma:contentTypeID="0x0101003BE0F011240A094E827BA56BE9109944" ma:contentTypeVersion="13" ma:contentTypeDescription="Create a new document." ma:contentTypeScope="" ma:versionID="5dc1144dd420c1d8a9ebf51c7358c8f0">
   <xsd:schema xmlns:xsd="http://www.w3.org/2001/XMLSchema" xmlns:xs="http://www.w3.org/2001/XMLSchema" xmlns:p="http://schemas.microsoft.com/office/2006/metadata/properties" xmlns:ns3="03cb9dc2-e9ea-44ac-afed-001b6fad4f36" xmlns:ns4="d0879fa5-f2db-41a7-8861-4a44e7ee3b24" targetNamespace="http://schemas.microsoft.com/office/2006/metadata/properties" ma:root="true" ma:fieldsID="6dda18631f78ef64168f1da1c53d30ff" ns3:_="" ns4:_="">
     <xsd:import namespace="03cb9dc2-e9ea-44ac-afed-001b6fad4f36"/>
@@ -7418,35 +9462,32 @@
 </ct:contentTypeSchema>
 </file>
 
-<file path=customXml/item2.xml><?xml version="1.0" encoding="utf-8"?>
-<?mso-contentType ?>
-<FormTemplates xmlns="http://schemas.microsoft.com/sharepoint/v3/contenttype/forms">
-  <Display>DocumentLibraryForm</Display>
-  <Edit>DocumentLibraryForm</Edit>
-  <New>DocumentLibraryForm</New>
-</FormTemplates>
+<file path=customXml/itemProps1.xml><?xml version="1.0" encoding="utf-8"?>
+<ds:datastoreItem xmlns:ds="http://schemas.openxmlformats.org/officeDocument/2006/customXml" ds:itemID="{C522BBC0-3E7A-472B-9CC6-34C5EA434DEE}">
+  <ds:schemaRefs>
+    <ds:schemaRef ds:uri="http://purl.org/dc/terms/"/>
+    <ds:schemaRef ds:uri="http://schemas.openxmlformats.org/package/2006/metadata/core-properties"/>
+    <ds:schemaRef ds:uri="http://purl.org/dc/dcmitype/"/>
+    <ds:schemaRef ds:uri="http://schemas.microsoft.com/office/infopath/2007/PartnerControls"/>
+    <ds:schemaRef ds:uri="http://schemas.microsoft.com/office/2006/documentManagement/types"/>
+    <ds:schemaRef ds:uri="http://purl.org/dc/elements/1.1/"/>
+    <ds:schemaRef ds:uri="http://schemas.microsoft.com/office/2006/metadata/properties"/>
+    <ds:schemaRef ds:uri="d0879fa5-f2db-41a7-8861-4a44e7ee3b24"/>
+    <ds:schemaRef ds:uri="03cb9dc2-e9ea-44ac-afed-001b6fad4f36"/>
+    <ds:schemaRef ds:uri="http://www.w3.org/XML/1998/namespace"/>
+  </ds:schemaRefs>
+</ds:datastoreItem>
 </file>
 
-<file path=customXml/item3.xml><?xml version="1.0" encoding="utf-8"?>
-<p:properties xmlns:p="http://schemas.microsoft.com/office/2006/metadata/properties" xmlns:xsi="http://www.w3.org/2001/XMLSchema-instance" xmlns:pc="http://schemas.microsoft.com/office/infopath/2007/PartnerControls">
-  <documentManagement>
-    <SharedWithUsers xmlns="03cb9dc2-e9ea-44ac-afed-001b6fad4f36">
-      <UserInfo>
-        <DisplayName>LEMARCHAND THOMAS</DisplayName>
-        <AccountId>16</AccountId>
-        <AccountType/>
-      </UserInfo>
-      <UserInfo>
-        <DisplayName>CHERVET Guillaume</DisplayName>
-        <AccountId>84</AccountId>
-        <AccountType/>
-      </UserInfo>
-    </SharedWithUsers>
-  </documentManagement>
-</p:properties>
+<file path=customXml/itemProps2.xml><?xml version="1.0" encoding="utf-8"?>
+<ds:datastoreItem xmlns:ds="http://schemas.openxmlformats.org/officeDocument/2006/customXml" ds:itemID="{05D7AB42-0DA9-4407-9B22-92C435FE7C62}">
+  <ds:schemaRefs>
+    <ds:schemaRef ds:uri="http://schemas.microsoft.com/sharepoint/v3/contenttype/forms"/>
+  </ds:schemaRefs>
+</ds:datastoreItem>
 </file>
 
-<file path=customXml/itemProps1.xml><?xml version="1.0" encoding="utf-8"?>
+<file path=customXml/itemProps3.xml><?xml version="1.0" encoding="utf-8"?>
 <ds:datastoreItem xmlns:ds="http://schemas.openxmlformats.org/officeDocument/2006/customXml" ds:itemID="{C72C7657-97CD-4958-88DD-F8AC87258741}">
   <ds:schemaRefs>
     <ds:schemaRef ds:uri="http://schemas.microsoft.com/office/2006/metadata/contentType"/>
@@ -7463,29 +9504,4 @@
     <ds:schemaRef ds:uri="http://schemas.microsoft.com/internal/obd"/>
   </ds:schemaRefs>
 </ds:datastoreItem>
-</file>
-
-<file path=customXml/itemProps2.xml><?xml version="1.0" encoding="utf-8"?>
-<ds:datastoreItem xmlns:ds="http://schemas.openxmlformats.org/officeDocument/2006/customXml" ds:itemID="{05D7AB42-0DA9-4407-9B22-92C435FE7C62}">
-  <ds:schemaRefs>
-    <ds:schemaRef ds:uri="http://schemas.microsoft.com/sharepoint/v3/contenttype/forms"/>
-  </ds:schemaRefs>
-</ds:datastoreItem>
-</file>
-
-<file path=customXml/itemProps3.xml><?xml version="1.0" encoding="utf-8"?>
-<ds:datastoreItem xmlns:ds="http://schemas.openxmlformats.org/officeDocument/2006/customXml" ds:itemID="{C522BBC0-3E7A-472B-9CC6-34C5EA434DEE}">
-  <ds:schemaRefs>
-    <ds:schemaRef ds:uri="http://purl.org/dc/terms/"/>
-    <ds:schemaRef ds:uri="http://schemas.openxmlformats.org/package/2006/metadata/core-properties"/>
-    <ds:schemaRef ds:uri="http://purl.org/dc/dcmitype/"/>
-    <ds:schemaRef ds:uri="http://schemas.microsoft.com/office/infopath/2007/PartnerControls"/>
-    <ds:schemaRef ds:uri="http://schemas.microsoft.com/office/2006/documentManagement/types"/>
-    <ds:schemaRef ds:uri="http://purl.org/dc/elements/1.1/"/>
-    <ds:schemaRef ds:uri="http://schemas.microsoft.com/office/2006/metadata/properties"/>
-    <ds:schemaRef ds:uri="d0879fa5-f2db-41a7-8861-4a44e7ee3b24"/>
-    <ds:schemaRef ds:uri="03cb9dc2-e9ea-44ac-afed-001b6fad4f36"/>
-    <ds:schemaRef ds:uri="http://www.w3.org/XML/1998/namespace"/>
-  </ds:schemaRefs>
-</ds:datastoreItem>
 </file>
</xml_diff>

<commit_message>
feat(slimfaas): publish event to multiple deployment
</commit_message>
<xml_diff>
--- a/documentation/slimfaas.pptx
+++ b/documentation/slimfaas.pptx
@@ -238,7 +238,7 @@
           <a:p>
             <a:fld id="{F60FFC85-34C0-4167-8801-71D65E4D986C}" type="datetimeFigureOut">
               <a:rPr lang="fr-FR" smtClean="0"/>
-              <a:t>26/05/2024</a:t>
+              <a:t>31/05/2024</a:t>
             </a:fld>
             <a:endParaRPr lang="fr-FR"/>
           </a:p>
@@ -415,7 +415,7 @@
           <a:p>
             <a:fld id="{F2EE8696-3B2B-7D49-B212-A8F746F3A84B}" type="datetimeFigureOut">
               <a:rPr lang="es-ES_tradnl" smtClean="0"/>
-              <a:t>26/05/2024</a:t>
+              <a:t>31/05/2024</a:t>
             </a:fld>
             <a:endParaRPr lang="es-ES_tradnl"/>
           </a:p>
@@ -1112,7 +1112,7 @@
           <a:p>
             <a:fld id="{80160E5B-2E24-B941-8DE0-C0A90C36B7C5}" type="datetimeFigureOut">
               <a:rPr lang="en-GB" smtClean="0"/>
-              <a:t>26/05/2024</a:t>
+              <a:t>31/05/2024</a:t>
             </a:fld>
             <a:endParaRPr lang="en-GB"/>
           </a:p>
@@ -1310,7 +1310,7 @@
           <a:p>
             <a:fld id="{80160E5B-2E24-B941-8DE0-C0A90C36B7C5}" type="datetimeFigureOut">
               <a:rPr lang="en-GB" smtClean="0"/>
-              <a:t>26/05/2024</a:t>
+              <a:t>31/05/2024</a:t>
             </a:fld>
             <a:endParaRPr lang="en-GB"/>
           </a:p>
@@ -1557,7 +1557,7 @@
           <a:p>
             <a:fld id="{80160E5B-2E24-B941-8DE0-C0A90C36B7C5}" type="datetimeFigureOut">
               <a:rPr lang="en-GB" smtClean="0"/>
-              <a:t>26/05/2024</a:t>
+              <a:t>31/05/2024</a:t>
             </a:fld>
             <a:endParaRPr lang="en-GB"/>
           </a:p>
@@ -1776,7 +1776,7 @@
           <a:p>
             <a:fld id="{80160E5B-2E24-B941-8DE0-C0A90C36B7C5}" type="datetimeFigureOut">
               <a:rPr lang="en-GB" smtClean="0"/>
-              <a:t>26/05/2024</a:t>
+              <a:t>31/05/2024</a:t>
             </a:fld>
             <a:endParaRPr lang="en-GB"/>
           </a:p>
@@ -2051,7 +2051,7 @@
           <a:p>
             <a:fld id="{80160E5B-2E24-B941-8DE0-C0A90C36B7C5}" type="datetimeFigureOut">
               <a:rPr lang="en-GB" smtClean="0"/>
-              <a:t>26/05/2024</a:t>
+              <a:t>31/05/2024</a:t>
             </a:fld>
             <a:endParaRPr lang="en-GB"/>
           </a:p>
@@ -2355,7 +2355,7 @@
           <a:p>
             <a:fld id="{80160E5B-2E24-B941-8DE0-C0A90C36B7C5}" type="datetimeFigureOut">
               <a:rPr lang="en-GB" smtClean="0"/>
-              <a:t>26/05/2024</a:t>
+              <a:t>31/05/2024</a:t>
             </a:fld>
             <a:endParaRPr lang="en-GB"/>
           </a:p>
@@ -2806,7 +2806,7 @@
           <a:p>
             <a:fld id="{80160E5B-2E24-B941-8DE0-C0A90C36B7C5}" type="datetimeFigureOut">
               <a:rPr lang="en-GB" smtClean="0"/>
-              <a:t>26/05/2024</a:t>
+              <a:t>31/05/2024</a:t>
             </a:fld>
             <a:endParaRPr lang="en-GB"/>
           </a:p>
@@ -2986,7 +2986,7 @@
           <a:p>
             <a:fld id="{80160E5B-2E24-B941-8DE0-C0A90C36B7C5}" type="datetimeFigureOut">
               <a:rPr lang="en-GB" smtClean="0"/>
-              <a:t>26/05/2024</a:t>
+              <a:t>31/05/2024</a:t>
             </a:fld>
             <a:endParaRPr lang="en-GB"/>
           </a:p>
@@ -3138,7 +3138,7 @@
           <a:p>
             <a:fld id="{80160E5B-2E24-B941-8DE0-C0A90C36B7C5}" type="datetimeFigureOut">
               <a:rPr lang="en-GB" smtClean="0"/>
-              <a:t>26/05/2024</a:t>
+              <a:t>31/05/2024</a:t>
             </a:fld>
             <a:endParaRPr lang="en-GB"/>
           </a:p>
@@ -3488,7 +3488,7 @@
           <a:p>
             <a:fld id="{80160E5B-2E24-B941-8DE0-C0A90C36B7C5}" type="datetimeFigureOut">
               <a:rPr lang="en-GB" smtClean="0"/>
-              <a:t>26/05/2024</a:t>
+              <a:t>31/05/2024</a:t>
             </a:fld>
             <a:endParaRPr lang="en-GB"/>
           </a:p>
@@ -3815,7 +3815,7 @@
           <a:p>
             <a:fld id="{80160E5B-2E24-B941-8DE0-C0A90C36B7C5}" type="datetimeFigureOut">
               <a:rPr lang="en-GB" smtClean="0"/>
-              <a:t>26/05/2024</a:t>
+              <a:t>31/05/2024</a:t>
             </a:fld>
             <a:endParaRPr lang="en-GB"/>
           </a:p>
@@ -4095,7 +4095,7 @@
           <a:p>
             <a:fld id="{80160E5B-2E24-B941-8DE0-C0A90C36B7C5}" type="datetimeFigureOut">
               <a:rPr lang="en-GB" smtClean="0"/>
-              <a:t>26/05/2024</a:t>
+              <a:t>31/05/2024</a:t>
             </a:fld>
             <a:endParaRPr lang="en-GB"/>
           </a:p>
@@ -6383,13 +6383,13 @@
         </p:nvSpPr>
         <p:spPr>
           <a:xfrm>
-            <a:off x="0" y="6481822"/>
-            <a:ext cx="12192000" cy="376177"/>
+            <a:off x="-1695" y="6578508"/>
+            <a:ext cx="12192000" cy="279492"/>
           </a:xfrm>
         </p:spPr>
         <p:txBody>
           <a:bodyPr>
-            <a:normAutofit fontScale="92500" lnSpcReduction="20000"/>
+            <a:normAutofit fontScale="55000" lnSpcReduction="20000"/>
           </a:bodyPr>
           <a:lstStyle/>
           <a:p>
@@ -6411,8 +6411,8 @@
         </p:nvSpPr>
         <p:spPr>
           <a:xfrm>
-            <a:off x="4495103" y="2785207"/>
-            <a:ext cx="2245224" cy="1125268"/>
+            <a:off x="4179398" y="4170279"/>
+            <a:ext cx="1659171" cy="543302"/>
           </a:xfrm>
           <a:prstGeom prst="roundRect">
             <a:avLst/>
@@ -6475,9 +6475,9 @@
           <p:nvPr/>
         </p:nvCxnSpPr>
         <p:spPr>
-          <a:xfrm>
-            <a:off x="3919040" y="3347841"/>
-            <a:ext cx="576063" cy="0"/>
+          <a:xfrm flipV="1">
+            <a:off x="3046235" y="4441930"/>
+            <a:ext cx="1133163" cy="3902"/>
           </a:xfrm>
           <a:prstGeom prst="straightConnector1">
             <a:avLst/>
@@ -6520,8 +6520,8 @@
         </p:nvSpPr>
         <p:spPr>
           <a:xfrm>
-            <a:off x="67463" y="2932342"/>
-            <a:ext cx="3851577" cy="830997"/>
+            <a:off x="140221" y="4122666"/>
+            <a:ext cx="2906014" cy="646331"/>
           </a:xfrm>
           <a:prstGeom prst="rect">
             <a:avLst/>
@@ -6535,35 +6535,124 @@
           <a:lstStyle/>
           <a:p>
             <a:r>
-              <a:rPr lang="fr-FR" sz="1600" dirty="0"/>
+              <a:rPr lang="fr-FR" sz="1200" dirty="0"/>
               <a:t>HTTP POST</a:t>
             </a:r>
           </a:p>
           <a:p>
             <a:r>
-              <a:rPr lang="fr-FR" sz="1600" dirty="0">
+              <a:rPr lang="fr-FR" sz="1200" dirty="0">
                 <a:hlinkClick r:id="rId2"/>
               </a:rPr>
               <a:t>http://slimfaas/</a:t>
             </a:r>
             <a:r>
-              <a:rPr lang="fr-FR" sz="1600" dirty="0">
+              <a:rPr lang="fr-FR" sz="1200" dirty="0">
                 <a:highlight>
                   <a:srgbClr val="FFFF00"/>
                 </a:highlight>
                 <a:hlinkClick r:id="rId2"/>
               </a:rPr>
-              <a:t>publish-function</a:t>
-            </a:r>
-            <a:r>
-              <a:rPr lang="fr-FR" sz="1600" dirty="0">
+              <a:t>publish-event</a:t>
+            </a:r>
+            <a:r>
+              <a:rPr lang="fr-FR" sz="1200" dirty="0">
                 <a:hlinkClick r:id="rId2"/>
               </a:rPr>
-              <a:t>/fibonacci</a:t>
-            </a:r>
-            <a:endParaRPr lang="fr-FR" sz="1600" dirty="0"/>
-          </a:p>
-          <a:p>
+              <a:t>/</a:t>
+            </a:r>
+            <a:r>
+              <a:rPr lang="fr-FR" sz="1200" dirty="0">
+                <a:highlight>
+                  <a:srgbClr val="7EBEFF"/>
+                </a:highlight>
+                <a:hlinkClick r:id="rId2"/>
+              </a:rPr>
+              <a:t>fib-event</a:t>
+            </a:r>
+            <a:endParaRPr lang="fr-FR" sz="1200" dirty="0">
+              <a:highlight>
+                <a:srgbClr val="7EBEFF"/>
+              </a:highlight>
+            </a:endParaRPr>
+          </a:p>
+          <a:p>
+            <a:r>
+              <a:rPr lang="fr-FR" sz="1200" dirty="0"/>
+              <a:t>{</a:t>
+            </a:r>
+            <a:r>
+              <a:rPr lang="fr-FR" sz="1200" b="0" i="0" dirty="0">
+                <a:effectLst/>
+                <a:latin typeface="-apple-system"/>
+              </a:rPr>
+              <a:t>"</a:t>
+            </a:r>
+            <a:r>
+              <a:rPr lang="fr-FR" sz="1200" dirty="0"/>
+              <a:t>input</a:t>
+            </a:r>
+            <a:r>
+              <a:rPr lang="fr-FR" sz="1200" b="0" i="0" dirty="0">
+                <a:effectLst/>
+                <a:latin typeface="-apple-system"/>
+              </a:rPr>
+              <a:t>"</a:t>
+            </a:r>
+            <a:r>
+              <a:rPr lang="fr-FR" sz="1200" dirty="0"/>
+              <a:t>:42}</a:t>
+            </a:r>
+          </a:p>
+        </p:txBody>
+      </p:sp>
+      <p:sp>
+        <p:nvSpPr>
+          <p:cNvPr id="9" name="ZoneTexte 8">
+            <a:extLst>
+              <a:ext uri="{FF2B5EF4-FFF2-40B4-BE49-F238E27FC236}">
+                <a16:creationId xmlns:a16="http://schemas.microsoft.com/office/drawing/2014/main" id="{6611272C-28EE-7524-CD4D-AAE3B72A1A73}"/>
+              </a:ext>
+            </a:extLst>
+          </p:cNvPr>
+          <p:cNvSpPr txBox="1"/>
+          <p:nvPr/>
+        </p:nvSpPr>
+        <p:spPr>
+          <a:xfrm>
+            <a:off x="7057603" y="3587533"/>
+            <a:ext cx="1659171" cy="830997"/>
+          </a:xfrm>
+          <a:prstGeom prst="rect">
+            <a:avLst/>
+          </a:prstGeom>
+          <a:noFill/>
+        </p:spPr>
+        <p:txBody>
+          <a:bodyPr wrap="square" rtlCol="0">
+            <a:spAutoFit/>
+          </a:bodyPr>
+          <a:lstStyle/>
+          <a:p>
+            <a:r>
+              <a:rPr lang="fr-FR" sz="1600" dirty="0"/>
+              <a:t>HTTP POST</a:t>
+            </a:r>
+          </a:p>
+          <a:p>
+            <a:r>
+              <a:rPr lang="fr-FR" sz="1600" dirty="0">
+                <a:hlinkClick r:id="rId3"/>
+              </a:rPr>
+              <a:t>http://fibonacci</a:t>
+            </a:r>
+            <a:r>
+              <a:rPr lang="fr-FR" sz="1600" dirty="0"/>
+              <a:t> </a:t>
+            </a:r>
+            <a:br>
+              <a:rPr lang="fr-FR" sz="1600" dirty="0"/>
+            </a:br>
             <a:r>
               <a:rPr lang="fr-FR" sz="1600" dirty="0"/>
               <a:t>{</a:t>
@@ -6595,82 +6684,6 @@
       </p:sp>
       <p:sp>
         <p:nvSpPr>
-          <p:cNvPr id="9" name="ZoneTexte 8">
-            <a:extLst>
-              <a:ext uri="{FF2B5EF4-FFF2-40B4-BE49-F238E27FC236}">
-                <a16:creationId xmlns:a16="http://schemas.microsoft.com/office/drawing/2014/main" id="{6611272C-28EE-7524-CD4D-AAE3B72A1A73}"/>
-              </a:ext>
-            </a:extLst>
-          </p:cNvPr>
-          <p:cNvSpPr txBox="1"/>
-          <p:nvPr/>
-        </p:nvSpPr>
-        <p:spPr>
-          <a:xfrm>
-            <a:off x="6542729" y="997387"/>
-            <a:ext cx="1659171" cy="830997"/>
-          </a:xfrm>
-          <a:prstGeom prst="rect">
-            <a:avLst/>
-          </a:prstGeom>
-          <a:noFill/>
-        </p:spPr>
-        <p:txBody>
-          <a:bodyPr wrap="square" rtlCol="0">
-            <a:spAutoFit/>
-          </a:bodyPr>
-          <a:lstStyle/>
-          <a:p>
-            <a:r>
-              <a:rPr lang="fr-FR" sz="1600" dirty="0"/>
-              <a:t>HTTP POST</a:t>
-            </a:r>
-          </a:p>
-          <a:p>
-            <a:r>
-              <a:rPr lang="fr-FR" sz="1600" dirty="0">
-                <a:hlinkClick r:id="rId3"/>
-              </a:rPr>
-              <a:t>http://fibonacci</a:t>
-            </a:r>
-            <a:r>
-              <a:rPr lang="fr-FR" sz="1600" dirty="0"/>
-              <a:t> </a:t>
-            </a:r>
-            <a:br>
-              <a:rPr lang="fr-FR" sz="1600" dirty="0"/>
-            </a:br>
-            <a:r>
-              <a:rPr lang="fr-FR" sz="1600" dirty="0"/>
-              <a:t>{</a:t>
-            </a:r>
-            <a:r>
-              <a:rPr lang="fr-FR" sz="1600" b="0" i="0" dirty="0">
-                <a:effectLst/>
-                <a:latin typeface="-apple-system"/>
-              </a:rPr>
-              <a:t>"</a:t>
-            </a:r>
-            <a:r>
-              <a:rPr lang="fr-FR" sz="1600" dirty="0"/>
-              <a:t>input</a:t>
-            </a:r>
-            <a:r>
-              <a:rPr lang="fr-FR" sz="1600" b="0" i="0" dirty="0">
-                <a:effectLst/>
-                <a:latin typeface="-apple-system"/>
-              </a:rPr>
-              <a:t>"</a:t>
-            </a:r>
-            <a:r>
-              <a:rPr lang="fr-FR" sz="1600" dirty="0"/>
-              <a:t>:42}</a:t>
-            </a:r>
-          </a:p>
-        </p:txBody>
-      </p:sp>
-      <p:sp>
-        <p:nvSpPr>
           <p:cNvPr id="10" name="Rounded Rectangle 45">
             <a:extLst>
               <a:ext uri="{FF2B5EF4-FFF2-40B4-BE49-F238E27FC236}">
@@ -6683,8 +6696,8 @@
         </p:nvSpPr>
         <p:spPr>
           <a:xfrm>
-            <a:off x="8812333" y="509182"/>
-            <a:ext cx="3040144" cy="1540322"/>
+            <a:off x="8812333" y="509183"/>
+            <a:ext cx="2484558" cy="856646"/>
           </a:xfrm>
           <a:prstGeom prst="roundRect">
             <a:avLst/>
@@ -6725,7 +6738,7 @@
                   <a:schemeClr val="bg1"/>
                 </a:solidFill>
               </a:rPr>
-              <a:t>function « fibonacci » replica 1</a:t>
+              <a:t> « fibonacci » replica 1</a:t>
             </a:r>
             <a:endParaRPr lang="en-FR" sz="2400" dirty="0">
               <a:solidFill>
@@ -6784,10 +6797,10 @@
       </p:pic>
       <p:cxnSp>
         <p:nvCxnSpPr>
-          <p:cNvPr id="12" name="Connecteur droit avec flèche 11">
-            <a:extLst>
-              <a:ext uri="{FF2B5EF4-FFF2-40B4-BE49-F238E27FC236}">
-                <a16:creationId xmlns:a16="http://schemas.microsoft.com/office/drawing/2014/main" id="{3AFE1186-6876-1E2D-BB90-BFA726C0ACA3}"/>
+          <p:cNvPr id="25" name="Connecteur droit avec flèche 24">
+            <a:extLst>
+              <a:ext uri="{FF2B5EF4-FFF2-40B4-BE49-F238E27FC236}">
+                <a16:creationId xmlns:a16="http://schemas.microsoft.com/office/drawing/2014/main" id="{47CCB34C-BDE9-83E6-DBE9-369CE229F27F}"/>
               </a:ext>
             </a:extLst>
           </p:cNvPr>
@@ -6800,8 +6813,8 @@
         </p:nvCxnSpPr>
         <p:spPr>
           <a:xfrm flipV="1">
-            <a:off x="6740327" y="1279343"/>
-            <a:ext cx="2072006" cy="2068498"/>
+            <a:off x="5838569" y="937506"/>
+            <a:ext cx="2973764" cy="3504424"/>
           </a:xfrm>
           <a:prstGeom prst="straightConnector1">
             <a:avLst/>
@@ -6830,88 +6843,60 @@
           </a:fontRef>
         </p:style>
       </p:cxnSp>
-      <p:sp>
-        <p:nvSpPr>
-          <p:cNvPr id="22" name="ZoneTexte 21">
-            <a:extLst>
-              <a:ext uri="{FF2B5EF4-FFF2-40B4-BE49-F238E27FC236}">
-                <a16:creationId xmlns:a16="http://schemas.microsoft.com/office/drawing/2014/main" id="{B20F6461-EFC4-60A1-6479-F83792C4E189}"/>
-              </a:ext>
-            </a:extLst>
-          </p:cNvPr>
-          <p:cNvSpPr txBox="1"/>
+      <p:cxnSp>
+        <p:nvCxnSpPr>
+          <p:cNvPr id="30" name="Connecteur droit avec flèche 29">
+            <a:extLst>
+              <a:ext uri="{FF2B5EF4-FFF2-40B4-BE49-F238E27FC236}">
+                <a16:creationId xmlns:a16="http://schemas.microsoft.com/office/drawing/2014/main" id="{3C17D7D9-AD0C-3CB9-E9C2-8FE52952EA0A}"/>
+              </a:ext>
+            </a:extLst>
+          </p:cNvPr>
+          <p:cNvCxnSpPr>
+            <a:cxnSpLocks/>
+            <a:stCxn id="6" idx="3"/>
+            <a:endCxn id="58" idx="1"/>
+          </p:cNvCxnSpPr>
           <p:nvPr/>
-        </p:nvSpPr>
-        <p:spPr>
-          <a:xfrm>
-            <a:off x="7453427" y="3352032"/>
-            <a:ext cx="1659171" cy="830997"/>
-          </a:xfrm>
-          <a:prstGeom prst="rect">
+        </p:nvCxnSpPr>
+        <p:spPr>
+          <a:xfrm flipV="1">
+            <a:off x="5838569" y="2360768"/>
+            <a:ext cx="2973764" cy="2081162"/>
+          </a:xfrm>
+          <a:prstGeom prst="straightConnector1">
             <a:avLst/>
           </a:prstGeom>
-          <a:noFill/>
-        </p:spPr>
-        <p:txBody>
-          <a:bodyPr wrap="square" rtlCol="0">
-            <a:spAutoFit/>
-          </a:bodyPr>
-          <a:lstStyle/>
-          <a:p>
-            <a:r>
-              <a:rPr lang="fr-FR" sz="1600" dirty="0"/>
-              <a:t>HTTP POST</a:t>
-            </a:r>
-          </a:p>
-          <a:p>
-            <a:r>
-              <a:rPr lang="fr-FR" sz="1600" dirty="0">
-                <a:hlinkClick r:id="rId3"/>
-              </a:rPr>
-              <a:t>http://fibonacci</a:t>
-            </a:r>
-            <a:r>
-              <a:rPr lang="fr-FR" sz="1600" dirty="0"/>
-              <a:t> </a:t>
-            </a:r>
-            <a:br>
-              <a:rPr lang="fr-FR" sz="1600" dirty="0"/>
-            </a:br>
-            <a:r>
-              <a:rPr lang="fr-FR" sz="1600" dirty="0"/>
-              <a:t>{</a:t>
-            </a:r>
-            <a:r>
-              <a:rPr lang="fr-FR" sz="1600" b="0" i="0" dirty="0">
-                <a:effectLst/>
-                <a:latin typeface="-apple-system"/>
-              </a:rPr>
-              <a:t>"</a:t>
-            </a:r>
-            <a:r>
-              <a:rPr lang="fr-FR" sz="1600" dirty="0"/>
-              <a:t>input</a:t>
-            </a:r>
-            <a:r>
-              <a:rPr lang="fr-FR" sz="1600" b="0" i="0" dirty="0">
-                <a:effectLst/>
-                <a:latin typeface="-apple-system"/>
-              </a:rPr>
-              <a:t>"</a:t>
-            </a:r>
-            <a:r>
-              <a:rPr lang="fr-FR" sz="1600" dirty="0"/>
-              <a:t>:42}</a:t>
-            </a:r>
-          </a:p>
-        </p:txBody>
-      </p:sp>
-      <p:sp>
-        <p:nvSpPr>
-          <p:cNvPr id="23" name="Rounded Rectangle 45">
-            <a:extLst>
-              <a:ext uri="{FF2B5EF4-FFF2-40B4-BE49-F238E27FC236}">
-                <a16:creationId xmlns:a16="http://schemas.microsoft.com/office/drawing/2014/main" id="{02CDF874-6617-192D-7FBF-DFCDF050DE8B}"/>
+          <a:ln w="127000">
+            <a:solidFill>
+              <a:schemeClr val="accent6">
+                <a:lumMod val="75000"/>
+              </a:schemeClr>
+            </a:solidFill>
+            <a:tailEnd type="triangle"/>
+          </a:ln>
+        </p:spPr>
+        <p:style>
+          <a:lnRef idx="1">
+            <a:schemeClr val="accent1"/>
+          </a:lnRef>
+          <a:fillRef idx="0">
+            <a:schemeClr val="accent1"/>
+          </a:fillRef>
+          <a:effectRef idx="0">
+            <a:schemeClr val="accent1"/>
+          </a:effectRef>
+          <a:fontRef idx="minor">
+            <a:schemeClr val="tx1"/>
+          </a:fontRef>
+        </p:style>
+      </p:cxnSp>
+      <p:sp>
+        <p:nvSpPr>
+          <p:cNvPr id="44" name="Rounded Rectangle 44">
+            <a:extLst>
+              <a:ext uri="{FF2B5EF4-FFF2-40B4-BE49-F238E27FC236}">
+                <a16:creationId xmlns:a16="http://schemas.microsoft.com/office/drawing/2014/main" id="{EC278673-044B-4B67-CC8B-460677466C2D}"/>
               </a:ext>
             </a:extLst>
           </p:cNvPr>
@@ -6920,16 +6905,14 @@
         </p:nvSpPr>
         <p:spPr>
           <a:xfrm>
-            <a:off x="8858733" y="2401822"/>
-            <a:ext cx="3040144" cy="1540322"/>
+            <a:off x="819054" y="522900"/>
+            <a:ext cx="4922420" cy="1227315"/>
           </a:xfrm>
           <a:prstGeom prst="roundRect">
             <a:avLst/>
           </a:prstGeom>
           <a:solidFill>
-            <a:schemeClr val="bg2">
-              <a:lumMod val="25000"/>
-            </a:schemeClr>
+            <a:srgbClr val="7030A0"/>
           </a:solidFill>
           <a:ln>
             <a:noFill/>
@@ -6957,117 +6940,63 @@
           <a:p>
             <a:pPr algn="ctr"/>
             <a:r>
-              <a:rPr lang="fr-FR" sz="2400" dirty="0">
+              <a:rPr lang="en-US" sz="2400" dirty="0">
                 <a:solidFill>
                   <a:schemeClr val="bg1"/>
                 </a:solidFill>
               </a:rPr>
-              <a:t>function « fibonacci » replica 2</a:t>
-            </a:r>
-          </a:p>
-        </p:txBody>
-      </p:sp>
-      <p:pic>
-        <p:nvPicPr>
-          <p:cNvPr id="24" name="Picture 2" descr="Afficher l’image source">
-            <a:extLst>
-              <a:ext uri="{FF2B5EF4-FFF2-40B4-BE49-F238E27FC236}">
-                <a16:creationId xmlns:a16="http://schemas.microsoft.com/office/drawing/2014/main" id="{6367FF6E-BE42-9237-982C-7249BC298201}"/>
-              </a:ext>
-            </a:extLst>
-          </p:cNvPr>
-          <p:cNvPicPr>
-            <a:picLocks noChangeAspect="1" noChangeArrowheads="1"/>
-          </p:cNvPicPr>
-          <p:nvPr/>
-        </p:nvPicPr>
-        <p:blipFill>
-          <a:blip r:embed="rId4">
-            <a:extLst>
-              <a:ext uri="{28A0092B-C50C-407E-A947-70E740481C1C}">
-                <a14:useLocalDpi xmlns:a14="http://schemas.microsoft.com/office/drawing/2010/main" val="0"/>
-              </a:ext>
-            </a:extLst>
-          </a:blip>
-          <a:srcRect/>
-          <a:stretch>
-            <a:fillRect/>
-          </a:stretch>
-        </p:blipFill>
-        <p:spPr bwMode="auto">
-          <a:xfrm>
-            <a:off x="8799603" y="2111546"/>
-            <a:ext cx="588793" cy="572693"/>
-          </a:xfrm>
-          <a:prstGeom prst="rect">
-            <a:avLst/>
-          </a:prstGeom>
-          <a:noFill/>
-          <a:extLst>
-            <a:ext uri="{909E8E84-426E-40DD-AFC4-6F175D3DCCD1}">
-              <a14:hiddenFill xmlns:a14="http://schemas.microsoft.com/office/drawing/2010/main">
+              <a:t>Deployment</a:t>
+            </a:r>
+          </a:p>
+          <a:p>
+            <a:pPr algn="ctr"/>
+            <a:r>
+              <a:rPr lang="en-US" sz="2400" dirty="0">
                 <a:solidFill>
-                  <a:srgbClr val="FFFFFF"/>
+                  <a:schemeClr val="bg1"/>
                 </a:solidFill>
-              </a14:hiddenFill>
-            </a:ext>
-          </a:extLst>
-        </p:spPr>
-      </p:pic>
-      <p:cxnSp>
-        <p:nvCxnSpPr>
-          <p:cNvPr id="25" name="Connecteur droit avec flèche 24">
-            <a:extLst>
-              <a:ext uri="{FF2B5EF4-FFF2-40B4-BE49-F238E27FC236}">
-                <a16:creationId xmlns:a16="http://schemas.microsoft.com/office/drawing/2014/main" id="{47CCB34C-BDE9-83E6-DBE9-369CE229F27F}"/>
-              </a:ext>
-            </a:extLst>
-          </p:cNvPr>
-          <p:cNvCxnSpPr>
-            <a:cxnSpLocks/>
-            <a:stCxn id="6" idx="3"/>
-            <a:endCxn id="23" idx="1"/>
-          </p:cNvCxnSpPr>
-          <p:nvPr/>
-        </p:nvCxnSpPr>
-        <p:spPr>
-          <a:xfrm flipV="1">
-            <a:off x="6740327" y="3171983"/>
-            <a:ext cx="2118406" cy="175858"/>
-          </a:xfrm>
-          <a:prstGeom prst="straightConnector1">
-            <a:avLst/>
-          </a:prstGeom>
-          <a:ln w="127000">
-            <a:solidFill>
-              <a:schemeClr val="accent6">
-                <a:lumMod val="75000"/>
-              </a:schemeClr>
-            </a:solidFill>
-            <a:tailEnd type="triangle"/>
-          </a:ln>
-        </p:spPr>
-        <p:style>
-          <a:lnRef idx="1">
-            <a:schemeClr val="accent1"/>
-          </a:lnRef>
-          <a:fillRef idx="0">
-            <a:schemeClr val="accent1"/>
-          </a:fillRef>
-          <a:effectRef idx="0">
-            <a:schemeClr val="accent1"/>
-          </a:effectRef>
-          <a:fontRef idx="minor">
-            <a:schemeClr val="tx1"/>
-          </a:fontRef>
-        </p:style>
-      </p:cxnSp>
-      <p:sp>
-        <p:nvSpPr>
-          <p:cNvPr id="28" name="Rounded Rectangle 45">
-            <a:extLst>
-              <a:ext uri="{FF2B5EF4-FFF2-40B4-BE49-F238E27FC236}">
-                <a16:creationId xmlns:a16="http://schemas.microsoft.com/office/drawing/2014/main" id="{38FF5A4C-559C-1D52-9476-314AAD56BECB}"/>
+              </a:rPr>
+              <a:t>other</a:t>
+            </a:r>
+          </a:p>
+          <a:p>
+            <a:pPr algn="ctr"/>
+            <a:r>
+              <a:rPr lang="en-US" sz="1600" dirty="0">
+                <a:solidFill>
+                  <a:schemeClr val="bg1"/>
+                </a:solidFill>
+              </a:rPr>
+              <a:t>SlimFaas/SubscribeEvents:"</a:t>
+            </a:r>
+            <a:r>
+              <a:rPr lang="en-US" sz="1600" dirty="0">
+                <a:solidFill>
+                  <a:schemeClr val="bg1"/>
+                </a:solidFill>
+                <a:highlight>
+                  <a:srgbClr val="7EBEFF"/>
+                </a:highlight>
+              </a:rPr>
+              <a:t>fib-event</a:t>
+            </a:r>
+            <a:r>
+              <a:rPr lang="en-US" sz="1600" dirty="0">
+                <a:solidFill>
+                  <a:schemeClr val="bg1"/>
+                </a:solidFill>
+              </a:rPr>
+              <a:t>"</a:t>
+            </a:r>
+          </a:p>
+        </p:txBody>
+      </p:sp>
+      <p:sp>
+        <p:nvSpPr>
+          <p:cNvPr id="58" name="Rounded Rectangle 45">
+            <a:extLst>
+              <a:ext uri="{FF2B5EF4-FFF2-40B4-BE49-F238E27FC236}">
+                <a16:creationId xmlns:a16="http://schemas.microsoft.com/office/drawing/2014/main" id="{B3D6B054-351A-AB9F-D7F3-32674286B965}"/>
               </a:ext>
             </a:extLst>
           </p:cNvPr>
@@ -7076,8 +7005,8 @@
         </p:nvSpPr>
         <p:spPr>
           <a:xfrm>
-            <a:off x="8822212" y="4493355"/>
-            <a:ext cx="3040144" cy="1540322"/>
+            <a:off x="8812333" y="1932445"/>
+            <a:ext cx="2484558" cy="856646"/>
           </a:xfrm>
           <a:prstGeom prst="roundRect">
             <a:avLst/>
@@ -7118,17 +7047,22 @@
                   <a:schemeClr val="bg1"/>
                 </a:solidFill>
               </a:rPr>
-              <a:t>function « fibonacci » replica 3</a:t>
-            </a:r>
+              <a:t> « fibonacci » replica 2</a:t>
+            </a:r>
+            <a:endParaRPr lang="en-FR" sz="2400" dirty="0">
+              <a:solidFill>
+                <a:schemeClr val="bg1"/>
+              </a:solidFill>
+            </a:endParaRPr>
           </a:p>
         </p:txBody>
       </p:sp>
       <p:pic>
         <p:nvPicPr>
-          <p:cNvPr id="29" name="Picture 2" descr="Afficher l’image source">
-            <a:extLst>
-              <a:ext uri="{FF2B5EF4-FFF2-40B4-BE49-F238E27FC236}">
-                <a16:creationId xmlns:a16="http://schemas.microsoft.com/office/drawing/2014/main" id="{5C2C929B-DD3A-D402-D3D0-47B59BB4F807}"/>
+          <p:cNvPr id="59" name="Picture 2" descr="Afficher l’image source">
+            <a:extLst>
+              <a:ext uri="{FF2B5EF4-FFF2-40B4-BE49-F238E27FC236}">
+                <a16:creationId xmlns:a16="http://schemas.microsoft.com/office/drawing/2014/main" id="{47F04D32-578D-6B6C-2A28-059763E81EF0}"/>
               </a:ext>
             </a:extLst>
           </p:cNvPr>
@@ -7152,7 +7086,7 @@
         </p:blipFill>
         <p:spPr bwMode="auto">
           <a:xfrm>
-            <a:off x="8753203" y="4252319"/>
+            <a:off x="8618142" y="1629321"/>
             <a:ext cx="588793" cy="572693"/>
           </a:xfrm>
           <a:prstGeom prst="rect">
@@ -7170,26 +7104,282 @@
           </a:extLst>
         </p:spPr>
       </p:pic>
+      <p:sp>
+        <p:nvSpPr>
+          <p:cNvPr id="60" name="Rounded Rectangle 45">
+            <a:extLst>
+              <a:ext uri="{FF2B5EF4-FFF2-40B4-BE49-F238E27FC236}">
+                <a16:creationId xmlns:a16="http://schemas.microsoft.com/office/drawing/2014/main" id="{16DB633F-AB44-B4DC-3548-26B85071E24C}"/>
+              </a:ext>
+            </a:extLst>
+          </p:cNvPr>
+          <p:cNvSpPr/>
+          <p:nvPr/>
+        </p:nvSpPr>
+        <p:spPr>
+          <a:xfrm>
+            <a:off x="8812333" y="4173601"/>
+            <a:ext cx="2484558" cy="856646"/>
+          </a:xfrm>
+          <a:prstGeom prst="roundRect">
+            <a:avLst/>
+          </a:prstGeom>
+          <a:solidFill>
+            <a:schemeClr val="bg2">
+              <a:lumMod val="25000"/>
+            </a:schemeClr>
+          </a:solidFill>
+          <a:ln>
+            <a:noFill/>
+          </a:ln>
+        </p:spPr>
+        <p:style>
+          <a:lnRef idx="2">
+            <a:schemeClr val="accent1">
+              <a:shade val="50000"/>
+            </a:schemeClr>
+          </a:lnRef>
+          <a:fillRef idx="1">
+            <a:schemeClr val="accent1"/>
+          </a:fillRef>
+          <a:effectRef idx="0">
+            <a:schemeClr val="accent1"/>
+          </a:effectRef>
+          <a:fontRef idx="minor">
+            <a:schemeClr val="lt1"/>
+          </a:fontRef>
+        </p:style>
+        <p:txBody>
+          <a:bodyPr rtlCol="0" anchor="ctr"/>
+          <a:lstStyle/>
+          <a:p>
+            <a:pPr algn="ctr"/>
+            <a:r>
+              <a:rPr lang="fr-FR" sz="2400" dirty="0">
+                <a:solidFill>
+                  <a:schemeClr val="bg1"/>
+                </a:solidFill>
+              </a:rPr>
+              <a:t> « other » </a:t>
+            </a:r>
+            <a:br>
+              <a:rPr lang="fr-FR" sz="2400" dirty="0">
+                <a:solidFill>
+                  <a:schemeClr val="bg1"/>
+                </a:solidFill>
+              </a:rPr>
+            </a:br>
+            <a:r>
+              <a:rPr lang="fr-FR" sz="2400" dirty="0">
+                <a:solidFill>
+                  <a:schemeClr val="bg1"/>
+                </a:solidFill>
+              </a:rPr>
+              <a:t>replica 1</a:t>
+            </a:r>
+            <a:endParaRPr lang="en-FR" sz="2400" dirty="0">
+              <a:solidFill>
+                <a:schemeClr val="bg1"/>
+              </a:solidFill>
+            </a:endParaRPr>
+          </a:p>
+        </p:txBody>
+      </p:sp>
+      <p:pic>
+        <p:nvPicPr>
+          <p:cNvPr id="61" name="Picture 2" descr="Afficher l’image source">
+            <a:extLst>
+              <a:ext uri="{FF2B5EF4-FFF2-40B4-BE49-F238E27FC236}">
+                <a16:creationId xmlns:a16="http://schemas.microsoft.com/office/drawing/2014/main" id="{B596EC77-9AE7-9E46-04A6-90E9C956D010}"/>
+              </a:ext>
+            </a:extLst>
+          </p:cNvPr>
+          <p:cNvPicPr>
+            <a:picLocks noChangeAspect="1" noChangeArrowheads="1"/>
+          </p:cNvPicPr>
+          <p:nvPr/>
+        </p:nvPicPr>
+        <p:blipFill>
+          <a:blip r:embed="rId4">
+            <a:extLst>
+              <a:ext uri="{28A0092B-C50C-407E-A947-70E740481C1C}">
+                <a14:useLocalDpi xmlns:a14="http://schemas.microsoft.com/office/drawing/2010/main" val="0"/>
+              </a:ext>
+            </a:extLst>
+          </a:blip>
+          <a:srcRect/>
+          <a:stretch>
+            <a:fillRect/>
+          </a:stretch>
+        </p:blipFill>
+        <p:spPr bwMode="auto">
+          <a:xfrm>
+            <a:off x="8618142" y="3870477"/>
+            <a:ext cx="588793" cy="572693"/>
+          </a:xfrm>
+          <a:prstGeom prst="rect">
+            <a:avLst/>
+          </a:prstGeom>
+          <a:noFill/>
+          <a:extLst>
+            <a:ext uri="{909E8E84-426E-40DD-AFC4-6F175D3DCCD1}">
+              <a14:hiddenFill xmlns:a14="http://schemas.microsoft.com/office/drawing/2010/main">
+                <a:solidFill>
+                  <a:srgbClr val="FFFFFF"/>
+                </a:solidFill>
+              </a14:hiddenFill>
+            </a:ext>
+          </a:extLst>
+        </p:spPr>
+      </p:pic>
+      <p:sp>
+        <p:nvSpPr>
+          <p:cNvPr id="62" name="Rounded Rectangle 45">
+            <a:extLst>
+              <a:ext uri="{FF2B5EF4-FFF2-40B4-BE49-F238E27FC236}">
+                <a16:creationId xmlns:a16="http://schemas.microsoft.com/office/drawing/2014/main" id="{41E26270-5F17-40B5-E026-D7BB7ED7B4A6}"/>
+              </a:ext>
+            </a:extLst>
+          </p:cNvPr>
+          <p:cNvSpPr/>
+          <p:nvPr/>
+        </p:nvSpPr>
+        <p:spPr>
+          <a:xfrm>
+            <a:off x="8812333" y="5601700"/>
+            <a:ext cx="2484558" cy="856646"/>
+          </a:xfrm>
+          <a:prstGeom prst="roundRect">
+            <a:avLst/>
+          </a:prstGeom>
+          <a:solidFill>
+            <a:schemeClr val="bg2">
+              <a:lumMod val="25000"/>
+            </a:schemeClr>
+          </a:solidFill>
+          <a:ln>
+            <a:noFill/>
+          </a:ln>
+        </p:spPr>
+        <p:style>
+          <a:lnRef idx="2">
+            <a:schemeClr val="accent1">
+              <a:shade val="50000"/>
+            </a:schemeClr>
+          </a:lnRef>
+          <a:fillRef idx="1">
+            <a:schemeClr val="accent1"/>
+          </a:fillRef>
+          <a:effectRef idx="0">
+            <a:schemeClr val="accent1"/>
+          </a:effectRef>
+          <a:fontRef idx="minor">
+            <a:schemeClr val="lt1"/>
+          </a:fontRef>
+        </p:style>
+        <p:txBody>
+          <a:bodyPr rtlCol="0" anchor="ctr"/>
+          <a:lstStyle/>
+          <a:p>
+            <a:pPr algn="ctr"/>
+            <a:r>
+              <a:rPr lang="fr-FR" sz="2400" dirty="0">
+                <a:solidFill>
+                  <a:schemeClr val="bg1"/>
+                </a:solidFill>
+              </a:rPr>
+              <a:t> «  other » </a:t>
+            </a:r>
+            <a:br>
+              <a:rPr lang="fr-FR" sz="2400" dirty="0">
+                <a:solidFill>
+                  <a:schemeClr val="bg1"/>
+                </a:solidFill>
+              </a:rPr>
+            </a:br>
+            <a:r>
+              <a:rPr lang="fr-FR" sz="2400" dirty="0">
+                <a:solidFill>
+                  <a:schemeClr val="bg1"/>
+                </a:solidFill>
+              </a:rPr>
+              <a:t>replica 2</a:t>
+            </a:r>
+            <a:endParaRPr lang="en-FR" sz="2400" dirty="0">
+              <a:solidFill>
+                <a:schemeClr val="bg1"/>
+              </a:solidFill>
+            </a:endParaRPr>
+          </a:p>
+        </p:txBody>
+      </p:sp>
+      <p:pic>
+        <p:nvPicPr>
+          <p:cNvPr id="63" name="Picture 2" descr="Afficher l’image source">
+            <a:extLst>
+              <a:ext uri="{FF2B5EF4-FFF2-40B4-BE49-F238E27FC236}">
+                <a16:creationId xmlns:a16="http://schemas.microsoft.com/office/drawing/2014/main" id="{F2DEFC11-D557-79E0-2E61-06A08755FEED}"/>
+              </a:ext>
+            </a:extLst>
+          </p:cNvPr>
+          <p:cNvPicPr>
+            <a:picLocks noChangeAspect="1" noChangeArrowheads="1"/>
+          </p:cNvPicPr>
+          <p:nvPr/>
+        </p:nvPicPr>
+        <p:blipFill>
+          <a:blip r:embed="rId4">
+            <a:extLst>
+              <a:ext uri="{28A0092B-C50C-407E-A947-70E740481C1C}">
+                <a14:useLocalDpi xmlns:a14="http://schemas.microsoft.com/office/drawing/2010/main" val="0"/>
+              </a:ext>
+            </a:extLst>
+          </a:blip>
+          <a:srcRect/>
+          <a:stretch>
+            <a:fillRect/>
+          </a:stretch>
+        </p:blipFill>
+        <p:spPr bwMode="auto">
+          <a:xfrm>
+            <a:off x="8618142" y="5298576"/>
+            <a:ext cx="588793" cy="572693"/>
+          </a:xfrm>
+          <a:prstGeom prst="rect">
+            <a:avLst/>
+          </a:prstGeom>
+          <a:noFill/>
+          <a:extLst>
+            <a:ext uri="{909E8E84-426E-40DD-AFC4-6F175D3DCCD1}">
+              <a14:hiddenFill xmlns:a14="http://schemas.microsoft.com/office/drawing/2010/main">
+                <a:solidFill>
+                  <a:srgbClr val="FFFFFF"/>
+                </a:solidFill>
+              </a14:hiddenFill>
+            </a:ext>
+          </a:extLst>
+        </p:spPr>
+      </p:pic>
       <p:cxnSp>
         <p:nvCxnSpPr>
-          <p:cNvPr id="30" name="Connecteur droit avec flèche 29">
-            <a:extLst>
-              <a:ext uri="{FF2B5EF4-FFF2-40B4-BE49-F238E27FC236}">
-                <a16:creationId xmlns:a16="http://schemas.microsoft.com/office/drawing/2014/main" id="{3C17D7D9-AD0C-3CB9-E9C2-8FE52952EA0A}"/>
+          <p:cNvPr id="71" name="Connecteur droit avec flèche 70">
+            <a:extLst>
+              <a:ext uri="{FF2B5EF4-FFF2-40B4-BE49-F238E27FC236}">
+                <a16:creationId xmlns:a16="http://schemas.microsoft.com/office/drawing/2014/main" id="{221856EB-F24D-AE01-6253-E5B3BEF1DDDD}"/>
               </a:ext>
             </a:extLst>
           </p:cNvPr>
           <p:cNvCxnSpPr>
             <a:cxnSpLocks/>
             <a:stCxn id="6" idx="3"/>
-            <a:endCxn id="28" idx="1"/>
+            <a:endCxn id="60" idx="1"/>
           </p:cNvCxnSpPr>
           <p:nvPr/>
         </p:nvCxnSpPr>
         <p:spPr>
           <a:xfrm>
-            <a:off x="6740327" y="3347841"/>
-            <a:ext cx="2081885" cy="1915675"/>
+            <a:off x="5838569" y="4441930"/>
+            <a:ext cx="2973764" cy="159994"/>
           </a:xfrm>
           <a:prstGeom prst="straightConnector1">
             <a:avLst/>
@@ -7218,129 +7408,154 @@
           </a:fontRef>
         </p:style>
       </p:cxnSp>
-      <p:sp>
-        <p:nvSpPr>
-          <p:cNvPr id="38" name="ZoneTexte 37">
-            <a:extLst>
-              <a:ext uri="{FF2B5EF4-FFF2-40B4-BE49-F238E27FC236}">
-                <a16:creationId xmlns:a16="http://schemas.microsoft.com/office/drawing/2014/main" id="{3E51368A-C3EC-DCF9-2D42-54C522F99A21}"/>
-              </a:ext>
-            </a:extLst>
-          </p:cNvPr>
-          <p:cNvSpPr txBox="1"/>
+      <p:cxnSp>
+        <p:nvCxnSpPr>
+          <p:cNvPr id="74" name="Connecteur droit avec flèche 73">
+            <a:extLst>
+              <a:ext uri="{FF2B5EF4-FFF2-40B4-BE49-F238E27FC236}">
+                <a16:creationId xmlns:a16="http://schemas.microsoft.com/office/drawing/2014/main" id="{F5E291B3-5B31-6DB2-EF1C-980547F78F0B}"/>
+              </a:ext>
+            </a:extLst>
+          </p:cNvPr>
+          <p:cNvCxnSpPr>
+            <a:cxnSpLocks/>
+            <a:stCxn id="6" idx="3"/>
+            <a:endCxn id="62" idx="1"/>
+          </p:cNvCxnSpPr>
           <p:nvPr/>
-        </p:nvSpPr>
-        <p:spPr>
-          <a:xfrm>
-            <a:off x="7218978" y="5412088"/>
-            <a:ext cx="1659171" cy="830997"/>
-          </a:xfrm>
-          <a:prstGeom prst="rect">
+        </p:nvCxnSpPr>
+        <p:spPr>
+          <a:xfrm>
+            <a:off x="5838569" y="4441930"/>
+            <a:ext cx="2973764" cy="1588093"/>
+          </a:xfrm>
+          <a:prstGeom prst="straightConnector1">
             <a:avLst/>
           </a:prstGeom>
-          <a:noFill/>
-        </p:spPr>
-        <p:txBody>
-          <a:bodyPr wrap="square" rtlCol="0">
-            <a:spAutoFit/>
-          </a:bodyPr>
+          <a:ln w="127000">
+            <a:solidFill>
+              <a:schemeClr val="accent6">
+                <a:lumMod val="75000"/>
+              </a:schemeClr>
+            </a:solidFill>
+            <a:tailEnd type="triangle"/>
+          </a:ln>
+        </p:spPr>
+        <p:style>
+          <a:lnRef idx="1">
+            <a:schemeClr val="accent1"/>
+          </a:lnRef>
+          <a:fillRef idx="0">
+            <a:schemeClr val="accent1"/>
+          </a:fillRef>
+          <a:effectRef idx="0">
+            <a:schemeClr val="accent1"/>
+          </a:effectRef>
+          <a:fontRef idx="minor">
+            <a:schemeClr val="tx1"/>
+          </a:fontRef>
+        </p:style>
+      </p:cxnSp>
+      <p:sp>
+        <p:nvSpPr>
+          <p:cNvPr id="109" name="Rounded Rectangle 44">
+            <a:extLst>
+              <a:ext uri="{FF2B5EF4-FFF2-40B4-BE49-F238E27FC236}">
+                <a16:creationId xmlns:a16="http://schemas.microsoft.com/office/drawing/2014/main" id="{EE55AAF1-171C-F780-90D3-7A2304D74CF3}"/>
+              </a:ext>
+            </a:extLst>
+          </p:cNvPr>
+          <p:cNvSpPr/>
+          <p:nvPr/>
+        </p:nvSpPr>
+        <p:spPr>
+          <a:xfrm>
+            <a:off x="819054" y="1999049"/>
+            <a:ext cx="4922420" cy="1227314"/>
+          </a:xfrm>
+          <a:prstGeom prst="roundRect">
+            <a:avLst/>
+          </a:prstGeom>
+          <a:solidFill>
+            <a:srgbClr val="7030A0"/>
+          </a:solidFill>
+          <a:ln>
+            <a:noFill/>
+          </a:ln>
+        </p:spPr>
+        <p:style>
+          <a:lnRef idx="2">
+            <a:schemeClr val="accent1">
+              <a:shade val="50000"/>
+            </a:schemeClr>
+          </a:lnRef>
+          <a:fillRef idx="1">
+            <a:schemeClr val="accent1"/>
+          </a:fillRef>
+          <a:effectRef idx="0">
+            <a:schemeClr val="accent1"/>
+          </a:effectRef>
+          <a:fontRef idx="minor">
+            <a:schemeClr val="lt1"/>
+          </a:fontRef>
+        </p:style>
+        <p:txBody>
+          <a:bodyPr rtlCol="0" anchor="ctr"/>
           <a:lstStyle/>
           <a:p>
-            <a:r>
-              <a:rPr lang="fr-FR" sz="1600" dirty="0"/>
-              <a:t>HTTP POST</a:t>
-            </a:r>
-          </a:p>
-          <a:p>
-            <a:r>
-              <a:rPr lang="fr-FR" sz="1600" dirty="0">
-                <a:hlinkClick r:id="rId3"/>
+            <a:pPr algn="ctr"/>
+            <a:r>
+              <a:rPr lang="en-US" sz="2400" dirty="0">
+                <a:solidFill>
+                  <a:schemeClr val="bg1"/>
+                </a:solidFill>
               </a:rPr>
-              <a:t>http://fibonacci</a:t>
-            </a:r>
-            <a:r>
-              <a:rPr lang="fr-FR" sz="1600" dirty="0"/>
-              <a:t> </a:t>
-            </a:r>
-            <a:br>
-              <a:rPr lang="fr-FR" sz="1600" dirty="0"/>
-            </a:br>
-            <a:r>
-              <a:rPr lang="fr-FR" sz="1600" dirty="0"/>
-              <a:t>{</a:t>
-            </a:r>
-            <a:r>
-              <a:rPr lang="fr-FR" sz="1600" b="0" i="0" dirty="0">
-                <a:effectLst/>
-                <a:latin typeface="-apple-system"/>
+              <a:t>Deployment</a:t>
+            </a:r>
+          </a:p>
+          <a:p>
+            <a:pPr algn="ctr"/>
+            <a:r>
+              <a:rPr lang="en-US" sz="2400" dirty="0">
+                <a:solidFill>
+                  <a:schemeClr val="bg1"/>
+                </a:solidFill>
+              </a:rPr>
+              <a:t>other</a:t>
+            </a:r>
+          </a:p>
+          <a:p>
+            <a:pPr algn="ctr"/>
+            <a:r>
+              <a:rPr lang="en-US" sz="1600" dirty="0">
+                <a:solidFill>
+                  <a:schemeClr val="bg1"/>
+                </a:solidFill>
+              </a:rPr>
+              <a:t>SlimFaas/SubscribeEvents:"</a:t>
+            </a:r>
+            <a:r>
+              <a:rPr lang="en-US" sz="1600" dirty="0">
+                <a:solidFill>
+                  <a:schemeClr val="bg1"/>
+                </a:solidFill>
+                <a:highlight>
+                  <a:srgbClr val="7EBEFF"/>
+                </a:highlight>
+              </a:rPr>
+              <a:t>fib-event</a:t>
+            </a:r>
+            <a:r>
+              <a:rPr lang="en-US" sz="1600" dirty="0">
+                <a:solidFill>
+                  <a:schemeClr val="bg1"/>
+                </a:solidFill>
               </a:rPr>
               <a:t>"</a:t>
             </a:r>
-            <a:r>
-              <a:rPr lang="fr-FR" sz="1600" dirty="0"/>
-              <a:t>input</a:t>
-            </a:r>
-            <a:r>
-              <a:rPr lang="fr-FR" sz="1600" b="0" i="0" dirty="0">
-                <a:effectLst/>
-                <a:latin typeface="-apple-system"/>
-              </a:rPr>
-              <a:t>"</a:t>
-            </a:r>
-            <a:r>
-              <a:rPr lang="fr-FR" sz="1600" dirty="0"/>
-              <a:t>:42}</a:t>
-            </a:r>
-          </a:p>
-        </p:txBody>
-      </p:sp>
-      <p:pic>
-        <p:nvPicPr>
-          <p:cNvPr id="5" name="Picture 2" descr="Afficher l’image source">
-            <a:extLst>
-              <a:ext uri="{FF2B5EF4-FFF2-40B4-BE49-F238E27FC236}">
-                <a16:creationId xmlns:a16="http://schemas.microsoft.com/office/drawing/2014/main" id="{9CF92849-9C7F-61C9-32C2-F99F37E01F43}"/>
-              </a:ext>
-            </a:extLst>
-          </p:cNvPr>
-          <p:cNvPicPr>
-            <a:picLocks noChangeAspect="1" noChangeArrowheads="1"/>
-          </p:cNvPicPr>
-          <p:nvPr/>
-        </p:nvPicPr>
-        <p:blipFill>
-          <a:blip r:embed="rId4">
-            <a:extLst>
-              <a:ext uri="{28A0092B-C50C-407E-A947-70E740481C1C}">
-                <a14:useLocalDpi xmlns:a14="http://schemas.microsoft.com/office/drawing/2010/main" val="0"/>
-              </a:ext>
-            </a:extLst>
-          </a:blip>
-          <a:srcRect/>
-          <a:stretch>
-            <a:fillRect/>
-          </a:stretch>
-        </p:blipFill>
-        <p:spPr bwMode="auto">
-          <a:xfrm>
-            <a:off x="4286719" y="2514707"/>
-            <a:ext cx="588793" cy="572693"/>
-          </a:xfrm>
-          <a:prstGeom prst="rect">
-            <a:avLst/>
-          </a:prstGeom>
-          <a:noFill/>
-          <a:extLst>
-            <a:ext uri="{909E8E84-426E-40DD-AFC4-6F175D3DCCD1}">
-              <a14:hiddenFill xmlns:a14="http://schemas.microsoft.com/office/drawing/2010/main">
-                <a:solidFill>
-                  <a:srgbClr val="FFFFFF"/>
-                </a:solidFill>
-              </a14:hiddenFill>
-            </a:ext>
-          </a:extLst>
-        </p:spPr>
-      </p:pic>
+          </a:p>
+        </p:txBody>
+      </p:sp>
     </p:spTree>
     <p:extLst>
       <p:ext uri="{BB962C8B-B14F-4D97-AF65-F5344CB8AC3E}">
@@ -9212,34 +9427,6 @@
 </file>
 
 <file path=customXml/item1.xml><?xml version="1.0" encoding="utf-8"?>
-<p:properties xmlns:p="http://schemas.microsoft.com/office/2006/metadata/properties" xmlns:xsi="http://www.w3.org/2001/XMLSchema-instance" xmlns:pc="http://schemas.microsoft.com/office/infopath/2007/PartnerControls">
-  <documentManagement>
-    <SharedWithUsers xmlns="03cb9dc2-e9ea-44ac-afed-001b6fad4f36">
-      <UserInfo>
-        <DisplayName>LEMARCHAND THOMAS</DisplayName>
-        <AccountId>16</AccountId>
-        <AccountType/>
-      </UserInfo>
-      <UserInfo>
-        <DisplayName>CHERVET Guillaume</DisplayName>
-        <AccountId>84</AccountId>
-        <AccountType/>
-      </UserInfo>
-    </SharedWithUsers>
-  </documentManagement>
-</p:properties>
-</file>
-
-<file path=customXml/item2.xml><?xml version="1.0" encoding="utf-8"?>
-<?mso-contentType ?>
-<FormTemplates xmlns="http://schemas.microsoft.com/sharepoint/v3/contenttype/forms">
-  <Display>DocumentLibraryForm</Display>
-  <Edit>DocumentLibraryForm</Edit>
-  <New>DocumentLibraryForm</New>
-</FormTemplates>
-</file>
-
-<file path=customXml/item3.xml><?xml version="1.0" encoding="utf-8"?>
 <ct:contentTypeSchema xmlns:ct="http://schemas.microsoft.com/office/2006/metadata/contentType" xmlns:ma="http://schemas.microsoft.com/office/2006/metadata/properties/metaAttributes" ct:_="" ma:_="" ma:contentTypeName="Document" ma:contentTypeID="0x0101003BE0F011240A094E827BA56BE9109944" ma:contentTypeVersion="13" ma:contentTypeDescription="Create a new document." ma:contentTypeScope="" ma:versionID="5dc1144dd420c1d8a9ebf51c7358c8f0">
   <xsd:schema xmlns:xsd="http://www.w3.org/2001/XMLSchema" xmlns:xs="http://www.w3.org/2001/XMLSchema" xmlns:p="http://schemas.microsoft.com/office/2006/metadata/properties" xmlns:ns3="03cb9dc2-e9ea-44ac-afed-001b6fad4f36" xmlns:ns4="d0879fa5-f2db-41a7-8861-4a44e7ee3b24" targetNamespace="http://schemas.microsoft.com/office/2006/metadata/properties" ma:root="true" ma:fieldsID="6dda18631f78ef64168f1da1c53d30ff" ns3:_="" ns4:_="">
     <xsd:import namespace="03cb9dc2-e9ea-44ac-afed-001b6fad4f36"/>
@@ -9462,32 +9649,35 @@
 </ct:contentTypeSchema>
 </file>
 
-<file path=customXml/itemProps1.xml><?xml version="1.0" encoding="utf-8"?>
-<ds:datastoreItem xmlns:ds="http://schemas.openxmlformats.org/officeDocument/2006/customXml" ds:itemID="{C522BBC0-3E7A-472B-9CC6-34C5EA434DEE}">
-  <ds:schemaRefs>
-    <ds:schemaRef ds:uri="http://purl.org/dc/terms/"/>
-    <ds:schemaRef ds:uri="http://schemas.openxmlformats.org/package/2006/metadata/core-properties"/>
-    <ds:schemaRef ds:uri="http://purl.org/dc/dcmitype/"/>
-    <ds:schemaRef ds:uri="http://schemas.microsoft.com/office/infopath/2007/PartnerControls"/>
-    <ds:schemaRef ds:uri="http://schemas.microsoft.com/office/2006/documentManagement/types"/>
-    <ds:schemaRef ds:uri="http://purl.org/dc/elements/1.1/"/>
-    <ds:schemaRef ds:uri="http://schemas.microsoft.com/office/2006/metadata/properties"/>
-    <ds:schemaRef ds:uri="d0879fa5-f2db-41a7-8861-4a44e7ee3b24"/>
-    <ds:schemaRef ds:uri="03cb9dc2-e9ea-44ac-afed-001b6fad4f36"/>
-    <ds:schemaRef ds:uri="http://www.w3.org/XML/1998/namespace"/>
-  </ds:schemaRefs>
-</ds:datastoreItem>
+<file path=customXml/item2.xml><?xml version="1.0" encoding="utf-8"?>
+<?mso-contentType ?>
+<FormTemplates xmlns="http://schemas.microsoft.com/sharepoint/v3/contenttype/forms">
+  <Display>DocumentLibraryForm</Display>
+  <Edit>DocumentLibraryForm</Edit>
+  <New>DocumentLibraryForm</New>
+</FormTemplates>
 </file>
 
-<file path=customXml/itemProps2.xml><?xml version="1.0" encoding="utf-8"?>
-<ds:datastoreItem xmlns:ds="http://schemas.openxmlformats.org/officeDocument/2006/customXml" ds:itemID="{05D7AB42-0DA9-4407-9B22-92C435FE7C62}">
-  <ds:schemaRefs>
-    <ds:schemaRef ds:uri="http://schemas.microsoft.com/sharepoint/v3/contenttype/forms"/>
-  </ds:schemaRefs>
-</ds:datastoreItem>
+<file path=customXml/item3.xml><?xml version="1.0" encoding="utf-8"?>
+<p:properties xmlns:p="http://schemas.microsoft.com/office/2006/metadata/properties" xmlns:xsi="http://www.w3.org/2001/XMLSchema-instance" xmlns:pc="http://schemas.microsoft.com/office/infopath/2007/PartnerControls">
+  <documentManagement>
+    <SharedWithUsers xmlns="03cb9dc2-e9ea-44ac-afed-001b6fad4f36">
+      <UserInfo>
+        <DisplayName>LEMARCHAND THOMAS</DisplayName>
+        <AccountId>16</AccountId>
+        <AccountType/>
+      </UserInfo>
+      <UserInfo>
+        <DisplayName>CHERVET Guillaume</DisplayName>
+        <AccountId>84</AccountId>
+        <AccountType/>
+      </UserInfo>
+    </SharedWithUsers>
+  </documentManagement>
+</p:properties>
 </file>
 
-<file path=customXml/itemProps3.xml><?xml version="1.0" encoding="utf-8"?>
+<file path=customXml/itemProps1.xml><?xml version="1.0" encoding="utf-8"?>
 <ds:datastoreItem xmlns:ds="http://schemas.openxmlformats.org/officeDocument/2006/customXml" ds:itemID="{C72C7657-97CD-4958-88DD-F8AC87258741}">
   <ds:schemaRefs>
     <ds:schemaRef ds:uri="http://schemas.microsoft.com/office/2006/metadata/contentType"/>
@@ -9504,4 +9694,29 @@
     <ds:schemaRef ds:uri="http://schemas.microsoft.com/internal/obd"/>
   </ds:schemaRefs>
 </ds:datastoreItem>
+</file>
+
+<file path=customXml/itemProps2.xml><?xml version="1.0" encoding="utf-8"?>
+<ds:datastoreItem xmlns:ds="http://schemas.openxmlformats.org/officeDocument/2006/customXml" ds:itemID="{05D7AB42-0DA9-4407-9B22-92C435FE7C62}">
+  <ds:schemaRefs>
+    <ds:schemaRef ds:uri="http://schemas.microsoft.com/sharepoint/v3/contenttype/forms"/>
+  </ds:schemaRefs>
+</ds:datastoreItem>
+</file>
+
+<file path=customXml/itemProps3.xml><?xml version="1.0" encoding="utf-8"?>
+<ds:datastoreItem xmlns:ds="http://schemas.openxmlformats.org/officeDocument/2006/customXml" ds:itemID="{C522BBC0-3E7A-472B-9CC6-34C5EA434DEE}">
+  <ds:schemaRefs>
+    <ds:schemaRef ds:uri="http://purl.org/dc/terms/"/>
+    <ds:schemaRef ds:uri="http://schemas.openxmlformats.org/package/2006/metadata/core-properties"/>
+    <ds:schemaRef ds:uri="http://purl.org/dc/dcmitype/"/>
+    <ds:schemaRef ds:uri="http://schemas.microsoft.com/office/infopath/2007/PartnerControls"/>
+    <ds:schemaRef ds:uri="http://schemas.microsoft.com/office/2006/documentManagement/types"/>
+    <ds:schemaRef ds:uri="http://purl.org/dc/elements/1.1/"/>
+    <ds:schemaRef ds:uri="http://schemas.microsoft.com/office/2006/metadata/properties"/>
+    <ds:schemaRef ds:uri="d0879fa5-f2db-41a7-8861-4a44e7ee3b24"/>
+    <ds:schemaRef ds:uri="03cb9dc2-e9ea-44ac-afed-001b6fad4f36"/>
+    <ds:schemaRef ds:uri="http://www.w3.org/XML/1998/namespace"/>
+  </ds:schemaRefs>
+</ds:datastoreItem>
 </file>
</xml_diff>

<commit_message>
feat(slimfaas): publish event to multiple deployments (#57)
</commit_message>
<xml_diff>
--- a/documentation/slimfaas.pptx
+++ b/documentation/slimfaas.pptx
@@ -238,7 +238,7 @@
           <a:p>
             <a:fld id="{F60FFC85-34C0-4167-8801-71D65E4D986C}" type="datetimeFigureOut">
               <a:rPr lang="fr-FR" smtClean="0"/>
-              <a:t>26/05/2024</a:t>
+              <a:t>31/05/2024</a:t>
             </a:fld>
             <a:endParaRPr lang="fr-FR"/>
           </a:p>
@@ -415,7 +415,7 @@
           <a:p>
             <a:fld id="{F2EE8696-3B2B-7D49-B212-A8F746F3A84B}" type="datetimeFigureOut">
               <a:rPr lang="es-ES_tradnl" smtClean="0"/>
-              <a:t>26/05/2024</a:t>
+              <a:t>31/05/2024</a:t>
             </a:fld>
             <a:endParaRPr lang="es-ES_tradnl"/>
           </a:p>
@@ -1112,7 +1112,7 @@
           <a:p>
             <a:fld id="{80160E5B-2E24-B941-8DE0-C0A90C36B7C5}" type="datetimeFigureOut">
               <a:rPr lang="en-GB" smtClean="0"/>
-              <a:t>26/05/2024</a:t>
+              <a:t>31/05/2024</a:t>
             </a:fld>
             <a:endParaRPr lang="en-GB"/>
           </a:p>
@@ -1310,7 +1310,7 @@
           <a:p>
             <a:fld id="{80160E5B-2E24-B941-8DE0-C0A90C36B7C5}" type="datetimeFigureOut">
               <a:rPr lang="en-GB" smtClean="0"/>
-              <a:t>26/05/2024</a:t>
+              <a:t>31/05/2024</a:t>
             </a:fld>
             <a:endParaRPr lang="en-GB"/>
           </a:p>
@@ -1557,7 +1557,7 @@
           <a:p>
             <a:fld id="{80160E5B-2E24-B941-8DE0-C0A90C36B7C5}" type="datetimeFigureOut">
               <a:rPr lang="en-GB" smtClean="0"/>
-              <a:t>26/05/2024</a:t>
+              <a:t>31/05/2024</a:t>
             </a:fld>
             <a:endParaRPr lang="en-GB"/>
           </a:p>
@@ -1776,7 +1776,7 @@
           <a:p>
             <a:fld id="{80160E5B-2E24-B941-8DE0-C0A90C36B7C5}" type="datetimeFigureOut">
               <a:rPr lang="en-GB" smtClean="0"/>
-              <a:t>26/05/2024</a:t>
+              <a:t>31/05/2024</a:t>
             </a:fld>
             <a:endParaRPr lang="en-GB"/>
           </a:p>
@@ -2051,7 +2051,7 @@
           <a:p>
             <a:fld id="{80160E5B-2E24-B941-8DE0-C0A90C36B7C5}" type="datetimeFigureOut">
               <a:rPr lang="en-GB" smtClean="0"/>
-              <a:t>26/05/2024</a:t>
+              <a:t>31/05/2024</a:t>
             </a:fld>
             <a:endParaRPr lang="en-GB"/>
           </a:p>
@@ -2355,7 +2355,7 @@
           <a:p>
             <a:fld id="{80160E5B-2E24-B941-8DE0-C0A90C36B7C5}" type="datetimeFigureOut">
               <a:rPr lang="en-GB" smtClean="0"/>
-              <a:t>26/05/2024</a:t>
+              <a:t>31/05/2024</a:t>
             </a:fld>
             <a:endParaRPr lang="en-GB"/>
           </a:p>
@@ -2806,7 +2806,7 @@
           <a:p>
             <a:fld id="{80160E5B-2E24-B941-8DE0-C0A90C36B7C5}" type="datetimeFigureOut">
               <a:rPr lang="en-GB" smtClean="0"/>
-              <a:t>26/05/2024</a:t>
+              <a:t>31/05/2024</a:t>
             </a:fld>
             <a:endParaRPr lang="en-GB"/>
           </a:p>
@@ -2986,7 +2986,7 @@
           <a:p>
             <a:fld id="{80160E5B-2E24-B941-8DE0-C0A90C36B7C5}" type="datetimeFigureOut">
               <a:rPr lang="en-GB" smtClean="0"/>
-              <a:t>26/05/2024</a:t>
+              <a:t>31/05/2024</a:t>
             </a:fld>
             <a:endParaRPr lang="en-GB"/>
           </a:p>
@@ -3138,7 +3138,7 @@
           <a:p>
             <a:fld id="{80160E5B-2E24-B941-8DE0-C0A90C36B7C5}" type="datetimeFigureOut">
               <a:rPr lang="en-GB" smtClean="0"/>
-              <a:t>26/05/2024</a:t>
+              <a:t>31/05/2024</a:t>
             </a:fld>
             <a:endParaRPr lang="en-GB"/>
           </a:p>
@@ -3488,7 +3488,7 @@
           <a:p>
             <a:fld id="{80160E5B-2E24-B941-8DE0-C0A90C36B7C5}" type="datetimeFigureOut">
               <a:rPr lang="en-GB" smtClean="0"/>
-              <a:t>26/05/2024</a:t>
+              <a:t>31/05/2024</a:t>
             </a:fld>
             <a:endParaRPr lang="en-GB"/>
           </a:p>
@@ -3815,7 +3815,7 @@
           <a:p>
             <a:fld id="{80160E5B-2E24-B941-8DE0-C0A90C36B7C5}" type="datetimeFigureOut">
               <a:rPr lang="en-GB" smtClean="0"/>
-              <a:t>26/05/2024</a:t>
+              <a:t>31/05/2024</a:t>
             </a:fld>
             <a:endParaRPr lang="en-GB"/>
           </a:p>
@@ -4095,7 +4095,7 @@
           <a:p>
             <a:fld id="{80160E5B-2E24-B941-8DE0-C0A90C36B7C5}" type="datetimeFigureOut">
               <a:rPr lang="en-GB" smtClean="0"/>
-              <a:t>26/05/2024</a:t>
+              <a:t>31/05/2024</a:t>
             </a:fld>
             <a:endParaRPr lang="en-GB"/>
           </a:p>
@@ -6383,13 +6383,13 @@
         </p:nvSpPr>
         <p:spPr>
           <a:xfrm>
-            <a:off x="0" y="6481822"/>
-            <a:ext cx="12192000" cy="376177"/>
+            <a:off x="-1695" y="6578508"/>
+            <a:ext cx="12192000" cy="279492"/>
           </a:xfrm>
         </p:spPr>
         <p:txBody>
           <a:bodyPr>
-            <a:normAutofit fontScale="92500" lnSpcReduction="20000"/>
+            <a:normAutofit fontScale="55000" lnSpcReduction="20000"/>
           </a:bodyPr>
           <a:lstStyle/>
           <a:p>
@@ -6411,8 +6411,8 @@
         </p:nvSpPr>
         <p:spPr>
           <a:xfrm>
-            <a:off x="4495103" y="2785207"/>
-            <a:ext cx="2245224" cy="1125268"/>
+            <a:off x="4179398" y="4170279"/>
+            <a:ext cx="1659171" cy="543302"/>
           </a:xfrm>
           <a:prstGeom prst="roundRect">
             <a:avLst/>
@@ -6475,9 +6475,9 @@
           <p:nvPr/>
         </p:nvCxnSpPr>
         <p:spPr>
-          <a:xfrm>
-            <a:off x="3919040" y="3347841"/>
-            <a:ext cx="576063" cy="0"/>
+          <a:xfrm flipV="1">
+            <a:off x="3046235" y="4441930"/>
+            <a:ext cx="1133163" cy="3902"/>
           </a:xfrm>
           <a:prstGeom prst="straightConnector1">
             <a:avLst/>
@@ -6520,8 +6520,8 @@
         </p:nvSpPr>
         <p:spPr>
           <a:xfrm>
-            <a:off x="67463" y="2932342"/>
-            <a:ext cx="3851577" cy="830997"/>
+            <a:off x="140221" y="4122666"/>
+            <a:ext cx="2906014" cy="646331"/>
           </a:xfrm>
           <a:prstGeom prst="rect">
             <a:avLst/>
@@ -6535,35 +6535,124 @@
           <a:lstStyle/>
           <a:p>
             <a:r>
-              <a:rPr lang="fr-FR" sz="1600" dirty="0"/>
+              <a:rPr lang="fr-FR" sz="1200" dirty="0"/>
               <a:t>HTTP POST</a:t>
             </a:r>
           </a:p>
           <a:p>
             <a:r>
-              <a:rPr lang="fr-FR" sz="1600" dirty="0">
+              <a:rPr lang="fr-FR" sz="1200" dirty="0">
                 <a:hlinkClick r:id="rId2"/>
               </a:rPr>
               <a:t>http://slimfaas/</a:t>
             </a:r>
             <a:r>
-              <a:rPr lang="fr-FR" sz="1600" dirty="0">
+              <a:rPr lang="fr-FR" sz="1200" dirty="0">
                 <a:highlight>
                   <a:srgbClr val="FFFF00"/>
                 </a:highlight>
                 <a:hlinkClick r:id="rId2"/>
               </a:rPr>
-              <a:t>publish-function</a:t>
-            </a:r>
-            <a:r>
-              <a:rPr lang="fr-FR" sz="1600" dirty="0">
+              <a:t>publish-event</a:t>
+            </a:r>
+            <a:r>
+              <a:rPr lang="fr-FR" sz="1200" dirty="0">
                 <a:hlinkClick r:id="rId2"/>
               </a:rPr>
-              <a:t>/fibonacci</a:t>
-            </a:r>
-            <a:endParaRPr lang="fr-FR" sz="1600" dirty="0"/>
-          </a:p>
-          <a:p>
+              <a:t>/</a:t>
+            </a:r>
+            <a:r>
+              <a:rPr lang="fr-FR" sz="1200" dirty="0">
+                <a:highlight>
+                  <a:srgbClr val="7EBEFF"/>
+                </a:highlight>
+                <a:hlinkClick r:id="rId2"/>
+              </a:rPr>
+              <a:t>fib-event</a:t>
+            </a:r>
+            <a:endParaRPr lang="fr-FR" sz="1200" dirty="0">
+              <a:highlight>
+                <a:srgbClr val="7EBEFF"/>
+              </a:highlight>
+            </a:endParaRPr>
+          </a:p>
+          <a:p>
+            <a:r>
+              <a:rPr lang="fr-FR" sz="1200" dirty="0"/>
+              <a:t>{</a:t>
+            </a:r>
+            <a:r>
+              <a:rPr lang="fr-FR" sz="1200" b="0" i="0" dirty="0">
+                <a:effectLst/>
+                <a:latin typeface="-apple-system"/>
+              </a:rPr>
+              <a:t>"</a:t>
+            </a:r>
+            <a:r>
+              <a:rPr lang="fr-FR" sz="1200" dirty="0"/>
+              <a:t>input</a:t>
+            </a:r>
+            <a:r>
+              <a:rPr lang="fr-FR" sz="1200" b="0" i="0" dirty="0">
+                <a:effectLst/>
+                <a:latin typeface="-apple-system"/>
+              </a:rPr>
+              <a:t>"</a:t>
+            </a:r>
+            <a:r>
+              <a:rPr lang="fr-FR" sz="1200" dirty="0"/>
+              <a:t>:42}</a:t>
+            </a:r>
+          </a:p>
+        </p:txBody>
+      </p:sp>
+      <p:sp>
+        <p:nvSpPr>
+          <p:cNvPr id="9" name="ZoneTexte 8">
+            <a:extLst>
+              <a:ext uri="{FF2B5EF4-FFF2-40B4-BE49-F238E27FC236}">
+                <a16:creationId xmlns:a16="http://schemas.microsoft.com/office/drawing/2014/main" id="{6611272C-28EE-7524-CD4D-AAE3B72A1A73}"/>
+              </a:ext>
+            </a:extLst>
+          </p:cNvPr>
+          <p:cNvSpPr txBox="1"/>
+          <p:nvPr/>
+        </p:nvSpPr>
+        <p:spPr>
+          <a:xfrm>
+            <a:off x="7057603" y="3587533"/>
+            <a:ext cx="1659171" cy="830997"/>
+          </a:xfrm>
+          <a:prstGeom prst="rect">
+            <a:avLst/>
+          </a:prstGeom>
+          <a:noFill/>
+        </p:spPr>
+        <p:txBody>
+          <a:bodyPr wrap="square" rtlCol="0">
+            <a:spAutoFit/>
+          </a:bodyPr>
+          <a:lstStyle/>
+          <a:p>
+            <a:r>
+              <a:rPr lang="fr-FR" sz="1600" dirty="0"/>
+              <a:t>HTTP POST</a:t>
+            </a:r>
+          </a:p>
+          <a:p>
+            <a:r>
+              <a:rPr lang="fr-FR" sz="1600" dirty="0">
+                <a:hlinkClick r:id="rId3"/>
+              </a:rPr>
+              <a:t>http://fibonacci</a:t>
+            </a:r>
+            <a:r>
+              <a:rPr lang="fr-FR" sz="1600" dirty="0"/>
+              <a:t> </a:t>
+            </a:r>
+            <a:br>
+              <a:rPr lang="fr-FR" sz="1600" dirty="0"/>
+            </a:br>
             <a:r>
               <a:rPr lang="fr-FR" sz="1600" dirty="0"/>
               <a:t>{</a:t>
@@ -6595,82 +6684,6 @@
       </p:sp>
       <p:sp>
         <p:nvSpPr>
-          <p:cNvPr id="9" name="ZoneTexte 8">
-            <a:extLst>
-              <a:ext uri="{FF2B5EF4-FFF2-40B4-BE49-F238E27FC236}">
-                <a16:creationId xmlns:a16="http://schemas.microsoft.com/office/drawing/2014/main" id="{6611272C-28EE-7524-CD4D-AAE3B72A1A73}"/>
-              </a:ext>
-            </a:extLst>
-          </p:cNvPr>
-          <p:cNvSpPr txBox="1"/>
-          <p:nvPr/>
-        </p:nvSpPr>
-        <p:spPr>
-          <a:xfrm>
-            <a:off x="6542729" y="997387"/>
-            <a:ext cx="1659171" cy="830997"/>
-          </a:xfrm>
-          <a:prstGeom prst="rect">
-            <a:avLst/>
-          </a:prstGeom>
-          <a:noFill/>
-        </p:spPr>
-        <p:txBody>
-          <a:bodyPr wrap="square" rtlCol="0">
-            <a:spAutoFit/>
-          </a:bodyPr>
-          <a:lstStyle/>
-          <a:p>
-            <a:r>
-              <a:rPr lang="fr-FR" sz="1600" dirty="0"/>
-              <a:t>HTTP POST</a:t>
-            </a:r>
-          </a:p>
-          <a:p>
-            <a:r>
-              <a:rPr lang="fr-FR" sz="1600" dirty="0">
-                <a:hlinkClick r:id="rId3"/>
-              </a:rPr>
-              <a:t>http://fibonacci</a:t>
-            </a:r>
-            <a:r>
-              <a:rPr lang="fr-FR" sz="1600" dirty="0"/>
-              <a:t> </a:t>
-            </a:r>
-            <a:br>
-              <a:rPr lang="fr-FR" sz="1600" dirty="0"/>
-            </a:br>
-            <a:r>
-              <a:rPr lang="fr-FR" sz="1600" dirty="0"/>
-              <a:t>{</a:t>
-            </a:r>
-            <a:r>
-              <a:rPr lang="fr-FR" sz="1600" b="0" i="0" dirty="0">
-                <a:effectLst/>
-                <a:latin typeface="-apple-system"/>
-              </a:rPr>
-              <a:t>"</a:t>
-            </a:r>
-            <a:r>
-              <a:rPr lang="fr-FR" sz="1600" dirty="0"/>
-              <a:t>input</a:t>
-            </a:r>
-            <a:r>
-              <a:rPr lang="fr-FR" sz="1600" b="0" i="0" dirty="0">
-                <a:effectLst/>
-                <a:latin typeface="-apple-system"/>
-              </a:rPr>
-              <a:t>"</a:t>
-            </a:r>
-            <a:r>
-              <a:rPr lang="fr-FR" sz="1600" dirty="0"/>
-              <a:t>:42}</a:t>
-            </a:r>
-          </a:p>
-        </p:txBody>
-      </p:sp>
-      <p:sp>
-        <p:nvSpPr>
           <p:cNvPr id="10" name="Rounded Rectangle 45">
             <a:extLst>
               <a:ext uri="{FF2B5EF4-FFF2-40B4-BE49-F238E27FC236}">
@@ -6683,8 +6696,8 @@
         </p:nvSpPr>
         <p:spPr>
           <a:xfrm>
-            <a:off x="8812333" y="509182"/>
-            <a:ext cx="3040144" cy="1540322"/>
+            <a:off x="8812333" y="509183"/>
+            <a:ext cx="2484558" cy="856646"/>
           </a:xfrm>
           <a:prstGeom prst="roundRect">
             <a:avLst/>
@@ -6725,7 +6738,7 @@
                   <a:schemeClr val="bg1"/>
                 </a:solidFill>
               </a:rPr>
-              <a:t>function « fibonacci » replica 1</a:t>
+              <a:t> « fibonacci » replica 1</a:t>
             </a:r>
             <a:endParaRPr lang="en-FR" sz="2400" dirty="0">
               <a:solidFill>
@@ -6784,10 +6797,10 @@
       </p:pic>
       <p:cxnSp>
         <p:nvCxnSpPr>
-          <p:cNvPr id="12" name="Connecteur droit avec flèche 11">
-            <a:extLst>
-              <a:ext uri="{FF2B5EF4-FFF2-40B4-BE49-F238E27FC236}">
-                <a16:creationId xmlns:a16="http://schemas.microsoft.com/office/drawing/2014/main" id="{3AFE1186-6876-1E2D-BB90-BFA726C0ACA3}"/>
+          <p:cNvPr id="25" name="Connecteur droit avec flèche 24">
+            <a:extLst>
+              <a:ext uri="{FF2B5EF4-FFF2-40B4-BE49-F238E27FC236}">
+                <a16:creationId xmlns:a16="http://schemas.microsoft.com/office/drawing/2014/main" id="{47CCB34C-BDE9-83E6-DBE9-369CE229F27F}"/>
               </a:ext>
             </a:extLst>
           </p:cNvPr>
@@ -6800,8 +6813,8 @@
         </p:nvCxnSpPr>
         <p:spPr>
           <a:xfrm flipV="1">
-            <a:off x="6740327" y="1279343"/>
-            <a:ext cx="2072006" cy="2068498"/>
+            <a:off x="5838569" y="937506"/>
+            <a:ext cx="2973764" cy="3504424"/>
           </a:xfrm>
           <a:prstGeom prst="straightConnector1">
             <a:avLst/>
@@ -6830,88 +6843,60 @@
           </a:fontRef>
         </p:style>
       </p:cxnSp>
-      <p:sp>
-        <p:nvSpPr>
-          <p:cNvPr id="22" name="ZoneTexte 21">
-            <a:extLst>
-              <a:ext uri="{FF2B5EF4-FFF2-40B4-BE49-F238E27FC236}">
-                <a16:creationId xmlns:a16="http://schemas.microsoft.com/office/drawing/2014/main" id="{B20F6461-EFC4-60A1-6479-F83792C4E189}"/>
-              </a:ext>
-            </a:extLst>
-          </p:cNvPr>
-          <p:cNvSpPr txBox="1"/>
+      <p:cxnSp>
+        <p:nvCxnSpPr>
+          <p:cNvPr id="30" name="Connecteur droit avec flèche 29">
+            <a:extLst>
+              <a:ext uri="{FF2B5EF4-FFF2-40B4-BE49-F238E27FC236}">
+                <a16:creationId xmlns:a16="http://schemas.microsoft.com/office/drawing/2014/main" id="{3C17D7D9-AD0C-3CB9-E9C2-8FE52952EA0A}"/>
+              </a:ext>
+            </a:extLst>
+          </p:cNvPr>
+          <p:cNvCxnSpPr>
+            <a:cxnSpLocks/>
+            <a:stCxn id="6" idx="3"/>
+            <a:endCxn id="58" idx="1"/>
+          </p:cNvCxnSpPr>
           <p:nvPr/>
-        </p:nvSpPr>
-        <p:spPr>
-          <a:xfrm>
-            <a:off x="7453427" y="3352032"/>
-            <a:ext cx="1659171" cy="830997"/>
-          </a:xfrm>
-          <a:prstGeom prst="rect">
+        </p:nvCxnSpPr>
+        <p:spPr>
+          <a:xfrm flipV="1">
+            <a:off x="5838569" y="2360768"/>
+            <a:ext cx="2973764" cy="2081162"/>
+          </a:xfrm>
+          <a:prstGeom prst="straightConnector1">
             <a:avLst/>
           </a:prstGeom>
-          <a:noFill/>
-        </p:spPr>
-        <p:txBody>
-          <a:bodyPr wrap="square" rtlCol="0">
-            <a:spAutoFit/>
-          </a:bodyPr>
-          <a:lstStyle/>
-          <a:p>
-            <a:r>
-              <a:rPr lang="fr-FR" sz="1600" dirty="0"/>
-              <a:t>HTTP POST</a:t>
-            </a:r>
-          </a:p>
-          <a:p>
-            <a:r>
-              <a:rPr lang="fr-FR" sz="1600" dirty="0">
-                <a:hlinkClick r:id="rId3"/>
-              </a:rPr>
-              <a:t>http://fibonacci</a:t>
-            </a:r>
-            <a:r>
-              <a:rPr lang="fr-FR" sz="1600" dirty="0"/>
-              <a:t> </a:t>
-            </a:r>
-            <a:br>
-              <a:rPr lang="fr-FR" sz="1600" dirty="0"/>
-            </a:br>
-            <a:r>
-              <a:rPr lang="fr-FR" sz="1600" dirty="0"/>
-              <a:t>{</a:t>
-            </a:r>
-            <a:r>
-              <a:rPr lang="fr-FR" sz="1600" b="0" i="0" dirty="0">
-                <a:effectLst/>
-                <a:latin typeface="-apple-system"/>
-              </a:rPr>
-              <a:t>"</a:t>
-            </a:r>
-            <a:r>
-              <a:rPr lang="fr-FR" sz="1600" dirty="0"/>
-              <a:t>input</a:t>
-            </a:r>
-            <a:r>
-              <a:rPr lang="fr-FR" sz="1600" b="0" i="0" dirty="0">
-                <a:effectLst/>
-                <a:latin typeface="-apple-system"/>
-              </a:rPr>
-              <a:t>"</a:t>
-            </a:r>
-            <a:r>
-              <a:rPr lang="fr-FR" sz="1600" dirty="0"/>
-              <a:t>:42}</a:t>
-            </a:r>
-          </a:p>
-        </p:txBody>
-      </p:sp>
-      <p:sp>
-        <p:nvSpPr>
-          <p:cNvPr id="23" name="Rounded Rectangle 45">
-            <a:extLst>
-              <a:ext uri="{FF2B5EF4-FFF2-40B4-BE49-F238E27FC236}">
-                <a16:creationId xmlns:a16="http://schemas.microsoft.com/office/drawing/2014/main" id="{02CDF874-6617-192D-7FBF-DFCDF050DE8B}"/>
+          <a:ln w="127000">
+            <a:solidFill>
+              <a:schemeClr val="accent6">
+                <a:lumMod val="75000"/>
+              </a:schemeClr>
+            </a:solidFill>
+            <a:tailEnd type="triangle"/>
+          </a:ln>
+        </p:spPr>
+        <p:style>
+          <a:lnRef idx="1">
+            <a:schemeClr val="accent1"/>
+          </a:lnRef>
+          <a:fillRef idx="0">
+            <a:schemeClr val="accent1"/>
+          </a:fillRef>
+          <a:effectRef idx="0">
+            <a:schemeClr val="accent1"/>
+          </a:effectRef>
+          <a:fontRef idx="minor">
+            <a:schemeClr val="tx1"/>
+          </a:fontRef>
+        </p:style>
+      </p:cxnSp>
+      <p:sp>
+        <p:nvSpPr>
+          <p:cNvPr id="44" name="Rounded Rectangle 44">
+            <a:extLst>
+              <a:ext uri="{FF2B5EF4-FFF2-40B4-BE49-F238E27FC236}">
+                <a16:creationId xmlns:a16="http://schemas.microsoft.com/office/drawing/2014/main" id="{EC278673-044B-4B67-CC8B-460677466C2D}"/>
               </a:ext>
             </a:extLst>
           </p:cNvPr>
@@ -6920,16 +6905,14 @@
         </p:nvSpPr>
         <p:spPr>
           <a:xfrm>
-            <a:off x="8858733" y="2401822"/>
-            <a:ext cx="3040144" cy="1540322"/>
+            <a:off x="819054" y="522900"/>
+            <a:ext cx="4922420" cy="1227315"/>
           </a:xfrm>
           <a:prstGeom prst="roundRect">
             <a:avLst/>
           </a:prstGeom>
           <a:solidFill>
-            <a:schemeClr val="bg2">
-              <a:lumMod val="25000"/>
-            </a:schemeClr>
+            <a:srgbClr val="7030A0"/>
           </a:solidFill>
           <a:ln>
             <a:noFill/>
@@ -6957,117 +6940,63 @@
           <a:p>
             <a:pPr algn="ctr"/>
             <a:r>
-              <a:rPr lang="fr-FR" sz="2400" dirty="0">
+              <a:rPr lang="en-US" sz="2400" dirty="0">
                 <a:solidFill>
                   <a:schemeClr val="bg1"/>
                 </a:solidFill>
               </a:rPr>
-              <a:t>function « fibonacci » replica 2</a:t>
-            </a:r>
-          </a:p>
-        </p:txBody>
-      </p:sp>
-      <p:pic>
-        <p:nvPicPr>
-          <p:cNvPr id="24" name="Picture 2" descr="Afficher l’image source">
-            <a:extLst>
-              <a:ext uri="{FF2B5EF4-FFF2-40B4-BE49-F238E27FC236}">
-                <a16:creationId xmlns:a16="http://schemas.microsoft.com/office/drawing/2014/main" id="{6367FF6E-BE42-9237-982C-7249BC298201}"/>
-              </a:ext>
-            </a:extLst>
-          </p:cNvPr>
-          <p:cNvPicPr>
-            <a:picLocks noChangeAspect="1" noChangeArrowheads="1"/>
-          </p:cNvPicPr>
-          <p:nvPr/>
-        </p:nvPicPr>
-        <p:blipFill>
-          <a:blip r:embed="rId4">
-            <a:extLst>
-              <a:ext uri="{28A0092B-C50C-407E-A947-70E740481C1C}">
-                <a14:useLocalDpi xmlns:a14="http://schemas.microsoft.com/office/drawing/2010/main" val="0"/>
-              </a:ext>
-            </a:extLst>
-          </a:blip>
-          <a:srcRect/>
-          <a:stretch>
-            <a:fillRect/>
-          </a:stretch>
-        </p:blipFill>
-        <p:spPr bwMode="auto">
-          <a:xfrm>
-            <a:off x="8799603" y="2111546"/>
-            <a:ext cx="588793" cy="572693"/>
-          </a:xfrm>
-          <a:prstGeom prst="rect">
-            <a:avLst/>
-          </a:prstGeom>
-          <a:noFill/>
-          <a:extLst>
-            <a:ext uri="{909E8E84-426E-40DD-AFC4-6F175D3DCCD1}">
-              <a14:hiddenFill xmlns:a14="http://schemas.microsoft.com/office/drawing/2010/main">
+              <a:t>Deployment</a:t>
+            </a:r>
+          </a:p>
+          <a:p>
+            <a:pPr algn="ctr"/>
+            <a:r>
+              <a:rPr lang="en-US" sz="2400" dirty="0">
                 <a:solidFill>
-                  <a:srgbClr val="FFFFFF"/>
+                  <a:schemeClr val="bg1"/>
                 </a:solidFill>
-              </a14:hiddenFill>
-            </a:ext>
-          </a:extLst>
-        </p:spPr>
-      </p:pic>
-      <p:cxnSp>
-        <p:nvCxnSpPr>
-          <p:cNvPr id="25" name="Connecteur droit avec flèche 24">
-            <a:extLst>
-              <a:ext uri="{FF2B5EF4-FFF2-40B4-BE49-F238E27FC236}">
-                <a16:creationId xmlns:a16="http://schemas.microsoft.com/office/drawing/2014/main" id="{47CCB34C-BDE9-83E6-DBE9-369CE229F27F}"/>
-              </a:ext>
-            </a:extLst>
-          </p:cNvPr>
-          <p:cNvCxnSpPr>
-            <a:cxnSpLocks/>
-            <a:stCxn id="6" idx="3"/>
-            <a:endCxn id="23" idx="1"/>
-          </p:cNvCxnSpPr>
-          <p:nvPr/>
-        </p:nvCxnSpPr>
-        <p:spPr>
-          <a:xfrm flipV="1">
-            <a:off x="6740327" y="3171983"/>
-            <a:ext cx="2118406" cy="175858"/>
-          </a:xfrm>
-          <a:prstGeom prst="straightConnector1">
-            <a:avLst/>
-          </a:prstGeom>
-          <a:ln w="127000">
-            <a:solidFill>
-              <a:schemeClr val="accent6">
-                <a:lumMod val="75000"/>
-              </a:schemeClr>
-            </a:solidFill>
-            <a:tailEnd type="triangle"/>
-          </a:ln>
-        </p:spPr>
-        <p:style>
-          <a:lnRef idx="1">
-            <a:schemeClr val="accent1"/>
-          </a:lnRef>
-          <a:fillRef idx="0">
-            <a:schemeClr val="accent1"/>
-          </a:fillRef>
-          <a:effectRef idx="0">
-            <a:schemeClr val="accent1"/>
-          </a:effectRef>
-          <a:fontRef idx="minor">
-            <a:schemeClr val="tx1"/>
-          </a:fontRef>
-        </p:style>
-      </p:cxnSp>
-      <p:sp>
-        <p:nvSpPr>
-          <p:cNvPr id="28" name="Rounded Rectangle 45">
-            <a:extLst>
-              <a:ext uri="{FF2B5EF4-FFF2-40B4-BE49-F238E27FC236}">
-                <a16:creationId xmlns:a16="http://schemas.microsoft.com/office/drawing/2014/main" id="{38FF5A4C-559C-1D52-9476-314AAD56BECB}"/>
+              </a:rPr>
+              <a:t>other</a:t>
+            </a:r>
+          </a:p>
+          <a:p>
+            <a:pPr algn="ctr"/>
+            <a:r>
+              <a:rPr lang="en-US" sz="1600" dirty="0">
+                <a:solidFill>
+                  <a:schemeClr val="bg1"/>
+                </a:solidFill>
+              </a:rPr>
+              <a:t>SlimFaas/SubscribeEvents:"</a:t>
+            </a:r>
+            <a:r>
+              <a:rPr lang="en-US" sz="1600" dirty="0">
+                <a:solidFill>
+                  <a:schemeClr val="bg1"/>
+                </a:solidFill>
+                <a:highlight>
+                  <a:srgbClr val="7EBEFF"/>
+                </a:highlight>
+              </a:rPr>
+              <a:t>fib-event</a:t>
+            </a:r>
+            <a:r>
+              <a:rPr lang="en-US" sz="1600" dirty="0">
+                <a:solidFill>
+                  <a:schemeClr val="bg1"/>
+                </a:solidFill>
+              </a:rPr>
+              <a:t>"</a:t>
+            </a:r>
+          </a:p>
+        </p:txBody>
+      </p:sp>
+      <p:sp>
+        <p:nvSpPr>
+          <p:cNvPr id="58" name="Rounded Rectangle 45">
+            <a:extLst>
+              <a:ext uri="{FF2B5EF4-FFF2-40B4-BE49-F238E27FC236}">
+                <a16:creationId xmlns:a16="http://schemas.microsoft.com/office/drawing/2014/main" id="{B3D6B054-351A-AB9F-D7F3-32674286B965}"/>
               </a:ext>
             </a:extLst>
           </p:cNvPr>
@@ -7076,8 +7005,8 @@
         </p:nvSpPr>
         <p:spPr>
           <a:xfrm>
-            <a:off x="8822212" y="4493355"/>
-            <a:ext cx="3040144" cy="1540322"/>
+            <a:off x="8812333" y="1932445"/>
+            <a:ext cx="2484558" cy="856646"/>
           </a:xfrm>
           <a:prstGeom prst="roundRect">
             <a:avLst/>
@@ -7118,17 +7047,22 @@
                   <a:schemeClr val="bg1"/>
                 </a:solidFill>
               </a:rPr>
-              <a:t>function « fibonacci » replica 3</a:t>
-            </a:r>
+              <a:t> « fibonacci » replica 2</a:t>
+            </a:r>
+            <a:endParaRPr lang="en-FR" sz="2400" dirty="0">
+              <a:solidFill>
+                <a:schemeClr val="bg1"/>
+              </a:solidFill>
+            </a:endParaRPr>
           </a:p>
         </p:txBody>
       </p:sp>
       <p:pic>
         <p:nvPicPr>
-          <p:cNvPr id="29" name="Picture 2" descr="Afficher l’image source">
-            <a:extLst>
-              <a:ext uri="{FF2B5EF4-FFF2-40B4-BE49-F238E27FC236}">
-                <a16:creationId xmlns:a16="http://schemas.microsoft.com/office/drawing/2014/main" id="{5C2C929B-DD3A-D402-D3D0-47B59BB4F807}"/>
+          <p:cNvPr id="59" name="Picture 2" descr="Afficher l’image source">
+            <a:extLst>
+              <a:ext uri="{FF2B5EF4-FFF2-40B4-BE49-F238E27FC236}">
+                <a16:creationId xmlns:a16="http://schemas.microsoft.com/office/drawing/2014/main" id="{47F04D32-578D-6B6C-2A28-059763E81EF0}"/>
               </a:ext>
             </a:extLst>
           </p:cNvPr>
@@ -7152,7 +7086,7 @@
         </p:blipFill>
         <p:spPr bwMode="auto">
           <a:xfrm>
-            <a:off x="8753203" y="4252319"/>
+            <a:off x="8618142" y="1629321"/>
             <a:ext cx="588793" cy="572693"/>
           </a:xfrm>
           <a:prstGeom prst="rect">
@@ -7170,26 +7104,282 @@
           </a:extLst>
         </p:spPr>
       </p:pic>
+      <p:sp>
+        <p:nvSpPr>
+          <p:cNvPr id="60" name="Rounded Rectangle 45">
+            <a:extLst>
+              <a:ext uri="{FF2B5EF4-FFF2-40B4-BE49-F238E27FC236}">
+                <a16:creationId xmlns:a16="http://schemas.microsoft.com/office/drawing/2014/main" id="{16DB633F-AB44-B4DC-3548-26B85071E24C}"/>
+              </a:ext>
+            </a:extLst>
+          </p:cNvPr>
+          <p:cNvSpPr/>
+          <p:nvPr/>
+        </p:nvSpPr>
+        <p:spPr>
+          <a:xfrm>
+            <a:off x="8812333" y="4173601"/>
+            <a:ext cx="2484558" cy="856646"/>
+          </a:xfrm>
+          <a:prstGeom prst="roundRect">
+            <a:avLst/>
+          </a:prstGeom>
+          <a:solidFill>
+            <a:schemeClr val="bg2">
+              <a:lumMod val="25000"/>
+            </a:schemeClr>
+          </a:solidFill>
+          <a:ln>
+            <a:noFill/>
+          </a:ln>
+        </p:spPr>
+        <p:style>
+          <a:lnRef idx="2">
+            <a:schemeClr val="accent1">
+              <a:shade val="50000"/>
+            </a:schemeClr>
+          </a:lnRef>
+          <a:fillRef idx="1">
+            <a:schemeClr val="accent1"/>
+          </a:fillRef>
+          <a:effectRef idx="0">
+            <a:schemeClr val="accent1"/>
+          </a:effectRef>
+          <a:fontRef idx="minor">
+            <a:schemeClr val="lt1"/>
+          </a:fontRef>
+        </p:style>
+        <p:txBody>
+          <a:bodyPr rtlCol="0" anchor="ctr"/>
+          <a:lstStyle/>
+          <a:p>
+            <a:pPr algn="ctr"/>
+            <a:r>
+              <a:rPr lang="fr-FR" sz="2400" dirty="0">
+                <a:solidFill>
+                  <a:schemeClr val="bg1"/>
+                </a:solidFill>
+              </a:rPr>
+              <a:t> « other » </a:t>
+            </a:r>
+            <a:br>
+              <a:rPr lang="fr-FR" sz="2400" dirty="0">
+                <a:solidFill>
+                  <a:schemeClr val="bg1"/>
+                </a:solidFill>
+              </a:rPr>
+            </a:br>
+            <a:r>
+              <a:rPr lang="fr-FR" sz="2400" dirty="0">
+                <a:solidFill>
+                  <a:schemeClr val="bg1"/>
+                </a:solidFill>
+              </a:rPr>
+              <a:t>replica 1</a:t>
+            </a:r>
+            <a:endParaRPr lang="en-FR" sz="2400" dirty="0">
+              <a:solidFill>
+                <a:schemeClr val="bg1"/>
+              </a:solidFill>
+            </a:endParaRPr>
+          </a:p>
+        </p:txBody>
+      </p:sp>
+      <p:pic>
+        <p:nvPicPr>
+          <p:cNvPr id="61" name="Picture 2" descr="Afficher l’image source">
+            <a:extLst>
+              <a:ext uri="{FF2B5EF4-FFF2-40B4-BE49-F238E27FC236}">
+                <a16:creationId xmlns:a16="http://schemas.microsoft.com/office/drawing/2014/main" id="{B596EC77-9AE7-9E46-04A6-90E9C956D010}"/>
+              </a:ext>
+            </a:extLst>
+          </p:cNvPr>
+          <p:cNvPicPr>
+            <a:picLocks noChangeAspect="1" noChangeArrowheads="1"/>
+          </p:cNvPicPr>
+          <p:nvPr/>
+        </p:nvPicPr>
+        <p:blipFill>
+          <a:blip r:embed="rId4">
+            <a:extLst>
+              <a:ext uri="{28A0092B-C50C-407E-A947-70E740481C1C}">
+                <a14:useLocalDpi xmlns:a14="http://schemas.microsoft.com/office/drawing/2010/main" val="0"/>
+              </a:ext>
+            </a:extLst>
+          </a:blip>
+          <a:srcRect/>
+          <a:stretch>
+            <a:fillRect/>
+          </a:stretch>
+        </p:blipFill>
+        <p:spPr bwMode="auto">
+          <a:xfrm>
+            <a:off x="8618142" y="3870477"/>
+            <a:ext cx="588793" cy="572693"/>
+          </a:xfrm>
+          <a:prstGeom prst="rect">
+            <a:avLst/>
+          </a:prstGeom>
+          <a:noFill/>
+          <a:extLst>
+            <a:ext uri="{909E8E84-426E-40DD-AFC4-6F175D3DCCD1}">
+              <a14:hiddenFill xmlns:a14="http://schemas.microsoft.com/office/drawing/2010/main">
+                <a:solidFill>
+                  <a:srgbClr val="FFFFFF"/>
+                </a:solidFill>
+              </a14:hiddenFill>
+            </a:ext>
+          </a:extLst>
+        </p:spPr>
+      </p:pic>
+      <p:sp>
+        <p:nvSpPr>
+          <p:cNvPr id="62" name="Rounded Rectangle 45">
+            <a:extLst>
+              <a:ext uri="{FF2B5EF4-FFF2-40B4-BE49-F238E27FC236}">
+                <a16:creationId xmlns:a16="http://schemas.microsoft.com/office/drawing/2014/main" id="{41E26270-5F17-40B5-E026-D7BB7ED7B4A6}"/>
+              </a:ext>
+            </a:extLst>
+          </p:cNvPr>
+          <p:cNvSpPr/>
+          <p:nvPr/>
+        </p:nvSpPr>
+        <p:spPr>
+          <a:xfrm>
+            <a:off x="8812333" y="5601700"/>
+            <a:ext cx="2484558" cy="856646"/>
+          </a:xfrm>
+          <a:prstGeom prst="roundRect">
+            <a:avLst/>
+          </a:prstGeom>
+          <a:solidFill>
+            <a:schemeClr val="bg2">
+              <a:lumMod val="25000"/>
+            </a:schemeClr>
+          </a:solidFill>
+          <a:ln>
+            <a:noFill/>
+          </a:ln>
+        </p:spPr>
+        <p:style>
+          <a:lnRef idx="2">
+            <a:schemeClr val="accent1">
+              <a:shade val="50000"/>
+            </a:schemeClr>
+          </a:lnRef>
+          <a:fillRef idx="1">
+            <a:schemeClr val="accent1"/>
+          </a:fillRef>
+          <a:effectRef idx="0">
+            <a:schemeClr val="accent1"/>
+          </a:effectRef>
+          <a:fontRef idx="minor">
+            <a:schemeClr val="lt1"/>
+          </a:fontRef>
+        </p:style>
+        <p:txBody>
+          <a:bodyPr rtlCol="0" anchor="ctr"/>
+          <a:lstStyle/>
+          <a:p>
+            <a:pPr algn="ctr"/>
+            <a:r>
+              <a:rPr lang="fr-FR" sz="2400" dirty="0">
+                <a:solidFill>
+                  <a:schemeClr val="bg1"/>
+                </a:solidFill>
+              </a:rPr>
+              <a:t> «  other » </a:t>
+            </a:r>
+            <a:br>
+              <a:rPr lang="fr-FR" sz="2400" dirty="0">
+                <a:solidFill>
+                  <a:schemeClr val="bg1"/>
+                </a:solidFill>
+              </a:rPr>
+            </a:br>
+            <a:r>
+              <a:rPr lang="fr-FR" sz="2400" dirty="0">
+                <a:solidFill>
+                  <a:schemeClr val="bg1"/>
+                </a:solidFill>
+              </a:rPr>
+              <a:t>replica 2</a:t>
+            </a:r>
+            <a:endParaRPr lang="en-FR" sz="2400" dirty="0">
+              <a:solidFill>
+                <a:schemeClr val="bg1"/>
+              </a:solidFill>
+            </a:endParaRPr>
+          </a:p>
+        </p:txBody>
+      </p:sp>
+      <p:pic>
+        <p:nvPicPr>
+          <p:cNvPr id="63" name="Picture 2" descr="Afficher l’image source">
+            <a:extLst>
+              <a:ext uri="{FF2B5EF4-FFF2-40B4-BE49-F238E27FC236}">
+                <a16:creationId xmlns:a16="http://schemas.microsoft.com/office/drawing/2014/main" id="{F2DEFC11-D557-79E0-2E61-06A08755FEED}"/>
+              </a:ext>
+            </a:extLst>
+          </p:cNvPr>
+          <p:cNvPicPr>
+            <a:picLocks noChangeAspect="1" noChangeArrowheads="1"/>
+          </p:cNvPicPr>
+          <p:nvPr/>
+        </p:nvPicPr>
+        <p:blipFill>
+          <a:blip r:embed="rId4">
+            <a:extLst>
+              <a:ext uri="{28A0092B-C50C-407E-A947-70E740481C1C}">
+                <a14:useLocalDpi xmlns:a14="http://schemas.microsoft.com/office/drawing/2010/main" val="0"/>
+              </a:ext>
+            </a:extLst>
+          </a:blip>
+          <a:srcRect/>
+          <a:stretch>
+            <a:fillRect/>
+          </a:stretch>
+        </p:blipFill>
+        <p:spPr bwMode="auto">
+          <a:xfrm>
+            <a:off x="8618142" y="5298576"/>
+            <a:ext cx="588793" cy="572693"/>
+          </a:xfrm>
+          <a:prstGeom prst="rect">
+            <a:avLst/>
+          </a:prstGeom>
+          <a:noFill/>
+          <a:extLst>
+            <a:ext uri="{909E8E84-426E-40DD-AFC4-6F175D3DCCD1}">
+              <a14:hiddenFill xmlns:a14="http://schemas.microsoft.com/office/drawing/2010/main">
+                <a:solidFill>
+                  <a:srgbClr val="FFFFFF"/>
+                </a:solidFill>
+              </a14:hiddenFill>
+            </a:ext>
+          </a:extLst>
+        </p:spPr>
+      </p:pic>
       <p:cxnSp>
         <p:nvCxnSpPr>
-          <p:cNvPr id="30" name="Connecteur droit avec flèche 29">
-            <a:extLst>
-              <a:ext uri="{FF2B5EF4-FFF2-40B4-BE49-F238E27FC236}">
-                <a16:creationId xmlns:a16="http://schemas.microsoft.com/office/drawing/2014/main" id="{3C17D7D9-AD0C-3CB9-E9C2-8FE52952EA0A}"/>
+          <p:cNvPr id="71" name="Connecteur droit avec flèche 70">
+            <a:extLst>
+              <a:ext uri="{FF2B5EF4-FFF2-40B4-BE49-F238E27FC236}">
+                <a16:creationId xmlns:a16="http://schemas.microsoft.com/office/drawing/2014/main" id="{221856EB-F24D-AE01-6253-E5B3BEF1DDDD}"/>
               </a:ext>
             </a:extLst>
           </p:cNvPr>
           <p:cNvCxnSpPr>
             <a:cxnSpLocks/>
             <a:stCxn id="6" idx="3"/>
-            <a:endCxn id="28" idx="1"/>
+            <a:endCxn id="60" idx="1"/>
           </p:cNvCxnSpPr>
           <p:nvPr/>
         </p:nvCxnSpPr>
         <p:spPr>
           <a:xfrm>
-            <a:off x="6740327" y="3347841"/>
-            <a:ext cx="2081885" cy="1915675"/>
+            <a:off x="5838569" y="4441930"/>
+            <a:ext cx="2973764" cy="159994"/>
           </a:xfrm>
           <a:prstGeom prst="straightConnector1">
             <a:avLst/>
@@ -7218,129 +7408,154 @@
           </a:fontRef>
         </p:style>
       </p:cxnSp>
-      <p:sp>
-        <p:nvSpPr>
-          <p:cNvPr id="38" name="ZoneTexte 37">
-            <a:extLst>
-              <a:ext uri="{FF2B5EF4-FFF2-40B4-BE49-F238E27FC236}">
-                <a16:creationId xmlns:a16="http://schemas.microsoft.com/office/drawing/2014/main" id="{3E51368A-C3EC-DCF9-2D42-54C522F99A21}"/>
-              </a:ext>
-            </a:extLst>
-          </p:cNvPr>
-          <p:cNvSpPr txBox="1"/>
+      <p:cxnSp>
+        <p:nvCxnSpPr>
+          <p:cNvPr id="74" name="Connecteur droit avec flèche 73">
+            <a:extLst>
+              <a:ext uri="{FF2B5EF4-FFF2-40B4-BE49-F238E27FC236}">
+                <a16:creationId xmlns:a16="http://schemas.microsoft.com/office/drawing/2014/main" id="{F5E291B3-5B31-6DB2-EF1C-980547F78F0B}"/>
+              </a:ext>
+            </a:extLst>
+          </p:cNvPr>
+          <p:cNvCxnSpPr>
+            <a:cxnSpLocks/>
+            <a:stCxn id="6" idx="3"/>
+            <a:endCxn id="62" idx="1"/>
+          </p:cNvCxnSpPr>
           <p:nvPr/>
-        </p:nvSpPr>
-        <p:spPr>
-          <a:xfrm>
-            <a:off x="7218978" y="5412088"/>
-            <a:ext cx="1659171" cy="830997"/>
-          </a:xfrm>
-          <a:prstGeom prst="rect">
+        </p:nvCxnSpPr>
+        <p:spPr>
+          <a:xfrm>
+            <a:off x="5838569" y="4441930"/>
+            <a:ext cx="2973764" cy="1588093"/>
+          </a:xfrm>
+          <a:prstGeom prst="straightConnector1">
             <a:avLst/>
           </a:prstGeom>
-          <a:noFill/>
-        </p:spPr>
-        <p:txBody>
-          <a:bodyPr wrap="square" rtlCol="0">
-            <a:spAutoFit/>
-          </a:bodyPr>
+          <a:ln w="127000">
+            <a:solidFill>
+              <a:schemeClr val="accent6">
+                <a:lumMod val="75000"/>
+              </a:schemeClr>
+            </a:solidFill>
+            <a:tailEnd type="triangle"/>
+          </a:ln>
+        </p:spPr>
+        <p:style>
+          <a:lnRef idx="1">
+            <a:schemeClr val="accent1"/>
+          </a:lnRef>
+          <a:fillRef idx="0">
+            <a:schemeClr val="accent1"/>
+          </a:fillRef>
+          <a:effectRef idx="0">
+            <a:schemeClr val="accent1"/>
+          </a:effectRef>
+          <a:fontRef idx="minor">
+            <a:schemeClr val="tx1"/>
+          </a:fontRef>
+        </p:style>
+      </p:cxnSp>
+      <p:sp>
+        <p:nvSpPr>
+          <p:cNvPr id="109" name="Rounded Rectangle 44">
+            <a:extLst>
+              <a:ext uri="{FF2B5EF4-FFF2-40B4-BE49-F238E27FC236}">
+                <a16:creationId xmlns:a16="http://schemas.microsoft.com/office/drawing/2014/main" id="{EE55AAF1-171C-F780-90D3-7A2304D74CF3}"/>
+              </a:ext>
+            </a:extLst>
+          </p:cNvPr>
+          <p:cNvSpPr/>
+          <p:nvPr/>
+        </p:nvSpPr>
+        <p:spPr>
+          <a:xfrm>
+            <a:off x="819054" y="1999049"/>
+            <a:ext cx="4922420" cy="1227314"/>
+          </a:xfrm>
+          <a:prstGeom prst="roundRect">
+            <a:avLst/>
+          </a:prstGeom>
+          <a:solidFill>
+            <a:srgbClr val="7030A0"/>
+          </a:solidFill>
+          <a:ln>
+            <a:noFill/>
+          </a:ln>
+        </p:spPr>
+        <p:style>
+          <a:lnRef idx="2">
+            <a:schemeClr val="accent1">
+              <a:shade val="50000"/>
+            </a:schemeClr>
+          </a:lnRef>
+          <a:fillRef idx="1">
+            <a:schemeClr val="accent1"/>
+          </a:fillRef>
+          <a:effectRef idx="0">
+            <a:schemeClr val="accent1"/>
+          </a:effectRef>
+          <a:fontRef idx="minor">
+            <a:schemeClr val="lt1"/>
+          </a:fontRef>
+        </p:style>
+        <p:txBody>
+          <a:bodyPr rtlCol="0" anchor="ctr"/>
           <a:lstStyle/>
           <a:p>
-            <a:r>
-              <a:rPr lang="fr-FR" sz="1600" dirty="0"/>
-              <a:t>HTTP POST</a:t>
-            </a:r>
-          </a:p>
-          <a:p>
-            <a:r>
-              <a:rPr lang="fr-FR" sz="1600" dirty="0">
-                <a:hlinkClick r:id="rId3"/>
+            <a:pPr algn="ctr"/>
+            <a:r>
+              <a:rPr lang="en-US" sz="2400" dirty="0">
+                <a:solidFill>
+                  <a:schemeClr val="bg1"/>
+                </a:solidFill>
               </a:rPr>
-              <a:t>http://fibonacci</a:t>
-            </a:r>
-            <a:r>
-              <a:rPr lang="fr-FR" sz="1600" dirty="0"/>
-              <a:t> </a:t>
-            </a:r>
-            <a:br>
-              <a:rPr lang="fr-FR" sz="1600" dirty="0"/>
-            </a:br>
-            <a:r>
-              <a:rPr lang="fr-FR" sz="1600" dirty="0"/>
-              <a:t>{</a:t>
-            </a:r>
-            <a:r>
-              <a:rPr lang="fr-FR" sz="1600" b="0" i="0" dirty="0">
-                <a:effectLst/>
-                <a:latin typeface="-apple-system"/>
+              <a:t>Deployment</a:t>
+            </a:r>
+          </a:p>
+          <a:p>
+            <a:pPr algn="ctr"/>
+            <a:r>
+              <a:rPr lang="en-US" sz="2400" dirty="0">
+                <a:solidFill>
+                  <a:schemeClr val="bg1"/>
+                </a:solidFill>
+              </a:rPr>
+              <a:t>other</a:t>
+            </a:r>
+          </a:p>
+          <a:p>
+            <a:pPr algn="ctr"/>
+            <a:r>
+              <a:rPr lang="en-US" sz="1600" dirty="0">
+                <a:solidFill>
+                  <a:schemeClr val="bg1"/>
+                </a:solidFill>
+              </a:rPr>
+              <a:t>SlimFaas/SubscribeEvents:"</a:t>
+            </a:r>
+            <a:r>
+              <a:rPr lang="en-US" sz="1600" dirty="0">
+                <a:solidFill>
+                  <a:schemeClr val="bg1"/>
+                </a:solidFill>
+                <a:highlight>
+                  <a:srgbClr val="7EBEFF"/>
+                </a:highlight>
+              </a:rPr>
+              <a:t>fib-event</a:t>
+            </a:r>
+            <a:r>
+              <a:rPr lang="en-US" sz="1600" dirty="0">
+                <a:solidFill>
+                  <a:schemeClr val="bg1"/>
+                </a:solidFill>
               </a:rPr>
               <a:t>"</a:t>
             </a:r>
-            <a:r>
-              <a:rPr lang="fr-FR" sz="1600" dirty="0"/>
-              <a:t>input</a:t>
-            </a:r>
-            <a:r>
-              <a:rPr lang="fr-FR" sz="1600" b="0" i="0" dirty="0">
-                <a:effectLst/>
-                <a:latin typeface="-apple-system"/>
-              </a:rPr>
-              <a:t>"</a:t>
-            </a:r>
-            <a:r>
-              <a:rPr lang="fr-FR" sz="1600" dirty="0"/>
-              <a:t>:42}</a:t>
-            </a:r>
-          </a:p>
-        </p:txBody>
-      </p:sp>
-      <p:pic>
-        <p:nvPicPr>
-          <p:cNvPr id="5" name="Picture 2" descr="Afficher l’image source">
-            <a:extLst>
-              <a:ext uri="{FF2B5EF4-FFF2-40B4-BE49-F238E27FC236}">
-                <a16:creationId xmlns:a16="http://schemas.microsoft.com/office/drawing/2014/main" id="{9CF92849-9C7F-61C9-32C2-F99F37E01F43}"/>
-              </a:ext>
-            </a:extLst>
-          </p:cNvPr>
-          <p:cNvPicPr>
-            <a:picLocks noChangeAspect="1" noChangeArrowheads="1"/>
-          </p:cNvPicPr>
-          <p:nvPr/>
-        </p:nvPicPr>
-        <p:blipFill>
-          <a:blip r:embed="rId4">
-            <a:extLst>
-              <a:ext uri="{28A0092B-C50C-407E-A947-70E740481C1C}">
-                <a14:useLocalDpi xmlns:a14="http://schemas.microsoft.com/office/drawing/2010/main" val="0"/>
-              </a:ext>
-            </a:extLst>
-          </a:blip>
-          <a:srcRect/>
-          <a:stretch>
-            <a:fillRect/>
-          </a:stretch>
-        </p:blipFill>
-        <p:spPr bwMode="auto">
-          <a:xfrm>
-            <a:off x="4286719" y="2514707"/>
-            <a:ext cx="588793" cy="572693"/>
-          </a:xfrm>
-          <a:prstGeom prst="rect">
-            <a:avLst/>
-          </a:prstGeom>
-          <a:noFill/>
-          <a:extLst>
-            <a:ext uri="{909E8E84-426E-40DD-AFC4-6F175D3DCCD1}">
-              <a14:hiddenFill xmlns:a14="http://schemas.microsoft.com/office/drawing/2010/main">
-                <a:solidFill>
-                  <a:srgbClr val="FFFFFF"/>
-                </a:solidFill>
-              </a14:hiddenFill>
-            </a:ext>
-          </a:extLst>
-        </p:spPr>
-      </p:pic>
+          </a:p>
+        </p:txBody>
+      </p:sp>
     </p:spTree>
     <p:extLst>
       <p:ext uri="{BB962C8B-B14F-4D97-AF65-F5344CB8AC3E}">
@@ -9212,34 +9427,6 @@
 </file>
 
 <file path=customXml/item1.xml><?xml version="1.0" encoding="utf-8"?>
-<p:properties xmlns:p="http://schemas.microsoft.com/office/2006/metadata/properties" xmlns:xsi="http://www.w3.org/2001/XMLSchema-instance" xmlns:pc="http://schemas.microsoft.com/office/infopath/2007/PartnerControls">
-  <documentManagement>
-    <SharedWithUsers xmlns="03cb9dc2-e9ea-44ac-afed-001b6fad4f36">
-      <UserInfo>
-        <DisplayName>LEMARCHAND THOMAS</DisplayName>
-        <AccountId>16</AccountId>
-        <AccountType/>
-      </UserInfo>
-      <UserInfo>
-        <DisplayName>CHERVET Guillaume</DisplayName>
-        <AccountId>84</AccountId>
-        <AccountType/>
-      </UserInfo>
-    </SharedWithUsers>
-  </documentManagement>
-</p:properties>
-</file>
-
-<file path=customXml/item2.xml><?xml version="1.0" encoding="utf-8"?>
-<?mso-contentType ?>
-<FormTemplates xmlns="http://schemas.microsoft.com/sharepoint/v3/contenttype/forms">
-  <Display>DocumentLibraryForm</Display>
-  <Edit>DocumentLibraryForm</Edit>
-  <New>DocumentLibraryForm</New>
-</FormTemplates>
-</file>
-
-<file path=customXml/item3.xml><?xml version="1.0" encoding="utf-8"?>
 <ct:contentTypeSchema xmlns:ct="http://schemas.microsoft.com/office/2006/metadata/contentType" xmlns:ma="http://schemas.microsoft.com/office/2006/metadata/properties/metaAttributes" ct:_="" ma:_="" ma:contentTypeName="Document" ma:contentTypeID="0x0101003BE0F011240A094E827BA56BE9109944" ma:contentTypeVersion="13" ma:contentTypeDescription="Create a new document." ma:contentTypeScope="" ma:versionID="5dc1144dd420c1d8a9ebf51c7358c8f0">
   <xsd:schema xmlns:xsd="http://www.w3.org/2001/XMLSchema" xmlns:xs="http://www.w3.org/2001/XMLSchema" xmlns:p="http://schemas.microsoft.com/office/2006/metadata/properties" xmlns:ns3="03cb9dc2-e9ea-44ac-afed-001b6fad4f36" xmlns:ns4="d0879fa5-f2db-41a7-8861-4a44e7ee3b24" targetNamespace="http://schemas.microsoft.com/office/2006/metadata/properties" ma:root="true" ma:fieldsID="6dda18631f78ef64168f1da1c53d30ff" ns3:_="" ns4:_="">
     <xsd:import namespace="03cb9dc2-e9ea-44ac-afed-001b6fad4f36"/>
@@ -9462,32 +9649,35 @@
 </ct:contentTypeSchema>
 </file>
 
-<file path=customXml/itemProps1.xml><?xml version="1.0" encoding="utf-8"?>
-<ds:datastoreItem xmlns:ds="http://schemas.openxmlformats.org/officeDocument/2006/customXml" ds:itemID="{C522BBC0-3E7A-472B-9CC6-34C5EA434DEE}">
-  <ds:schemaRefs>
-    <ds:schemaRef ds:uri="http://purl.org/dc/terms/"/>
-    <ds:schemaRef ds:uri="http://schemas.openxmlformats.org/package/2006/metadata/core-properties"/>
-    <ds:schemaRef ds:uri="http://purl.org/dc/dcmitype/"/>
-    <ds:schemaRef ds:uri="http://schemas.microsoft.com/office/infopath/2007/PartnerControls"/>
-    <ds:schemaRef ds:uri="http://schemas.microsoft.com/office/2006/documentManagement/types"/>
-    <ds:schemaRef ds:uri="http://purl.org/dc/elements/1.1/"/>
-    <ds:schemaRef ds:uri="http://schemas.microsoft.com/office/2006/metadata/properties"/>
-    <ds:schemaRef ds:uri="d0879fa5-f2db-41a7-8861-4a44e7ee3b24"/>
-    <ds:schemaRef ds:uri="03cb9dc2-e9ea-44ac-afed-001b6fad4f36"/>
-    <ds:schemaRef ds:uri="http://www.w3.org/XML/1998/namespace"/>
-  </ds:schemaRefs>
-</ds:datastoreItem>
+<file path=customXml/item2.xml><?xml version="1.0" encoding="utf-8"?>
+<?mso-contentType ?>
+<FormTemplates xmlns="http://schemas.microsoft.com/sharepoint/v3/contenttype/forms">
+  <Display>DocumentLibraryForm</Display>
+  <Edit>DocumentLibraryForm</Edit>
+  <New>DocumentLibraryForm</New>
+</FormTemplates>
 </file>
 
-<file path=customXml/itemProps2.xml><?xml version="1.0" encoding="utf-8"?>
-<ds:datastoreItem xmlns:ds="http://schemas.openxmlformats.org/officeDocument/2006/customXml" ds:itemID="{05D7AB42-0DA9-4407-9B22-92C435FE7C62}">
-  <ds:schemaRefs>
-    <ds:schemaRef ds:uri="http://schemas.microsoft.com/sharepoint/v3/contenttype/forms"/>
-  </ds:schemaRefs>
-</ds:datastoreItem>
+<file path=customXml/item3.xml><?xml version="1.0" encoding="utf-8"?>
+<p:properties xmlns:p="http://schemas.microsoft.com/office/2006/metadata/properties" xmlns:xsi="http://www.w3.org/2001/XMLSchema-instance" xmlns:pc="http://schemas.microsoft.com/office/infopath/2007/PartnerControls">
+  <documentManagement>
+    <SharedWithUsers xmlns="03cb9dc2-e9ea-44ac-afed-001b6fad4f36">
+      <UserInfo>
+        <DisplayName>LEMARCHAND THOMAS</DisplayName>
+        <AccountId>16</AccountId>
+        <AccountType/>
+      </UserInfo>
+      <UserInfo>
+        <DisplayName>CHERVET Guillaume</DisplayName>
+        <AccountId>84</AccountId>
+        <AccountType/>
+      </UserInfo>
+    </SharedWithUsers>
+  </documentManagement>
+</p:properties>
 </file>
 
-<file path=customXml/itemProps3.xml><?xml version="1.0" encoding="utf-8"?>
+<file path=customXml/itemProps1.xml><?xml version="1.0" encoding="utf-8"?>
 <ds:datastoreItem xmlns:ds="http://schemas.openxmlformats.org/officeDocument/2006/customXml" ds:itemID="{C72C7657-97CD-4958-88DD-F8AC87258741}">
   <ds:schemaRefs>
     <ds:schemaRef ds:uri="http://schemas.microsoft.com/office/2006/metadata/contentType"/>
@@ -9504,4 +9694,29 @@
     <ds:schemaRef ds:uri="http://schemas.microsoft.com/internal/obd"/>
   </ds:schemaRefs>
 </ds:datastoreItem>
+</file>
+
+<file path=customXml/itemProps2.xml><?xml version="1.0" encoding="utf-8"?>
+<ds:datastoreItem xmlns:ds="http://schemas.openxmlformats.org/officeDocument/2006/customXml" ds:itemID="{05D7AB42-0DA9-4407-9B22-92C435FE7C62}">
+  <ds:schemaRefs>
+    <ds:schemaRef ds:uri="http://schemas.microsoft.com/sharepoint/v3/contenttype/forms"/>
+  </ds:schemaRefs>
+</ds:datastoreItem>
+</file>
+
+<file path=customXml/itemProps3.xml><?xml version="1.0" encoding="utf-8"?>
+<ds:datastoreItem xmlns:ds="http://schemas.openxmlformats.org/officeDocument/2006/customXml" ds:itemID="{C522BBC0-3E7A-472B-9CC6-34C5EA434DEE}">
+  <ds:schemaRefs>
+    <ds:schemaRef ds:uri="http://purl.org/dc/terms/"/>
+    <ds:schemaRef ds:uri="http://schemas.openxmlformats.org/package/2006/metadata/core-properties"/>
+    <ds:schemaRef ds:uri="http://purl.org/dc/dcmitype/"/>
+    <ds:schemaRef ds:uri="http://schemas.microsoft.com/office/infopath/2007/PartnerControls"/>
+    <ds:schemaRef ds:uri="http://schemas.microsoft.com/office/2006/documentManagement/types"/>
+    <ds:schemaRef ds:uri="http://purl.org/dc/elements/1.1/"/>
+    <ds:schemaRef ds:uri="http://schemas.microsoft.com/office/2006/metadata/properties"/>
+    <ds:schemaRef ds:uri="d0879fa5-f2db-41a7-8861-4a44e7ee3b24"/>
+    <ds:schemaRef ds:uri="03cb9dc2-e9ea-44ac-afed-001b6fad4f36"/>
+    <ds:schemaRef ds:uri="http://www.w3.org/XML/1998/namespace"/>
+  </ds:schemaRefs>
+</ds:datastoreItem>
 </file>
</xml_diff>

<commit_message>
fix(slimfaas): SlimFaasSubscribeEvents was not throw if not deployments are liscening to it
</commit_message>
<xml_diff>
--- a/documentation/slimfaas.pptx
+++ b/documentation/slimfaas.pptx
@@ -238,7 +238,7 @@
           <a:p>
             <a:fld id="{F60FFC85-34C0-4167-8801-71D65E4D986C}" type="datetimeFigureOut">
               <a:rPr lang="fr-FR" smtClean="0"/>
-              <a:t>31/05/2024</a:t>
+              <a:t>11/06/2024</a:t>
             </a:fld>
             <a:endParaRPr lang="fr-FR"/>
           </a:p>
@@ -415,7 +415,7 @@
           <a:p>
             <a:fld id="{F2EE8696-3B2B-7D49-B212-A8F746F3A84B}" type="datetimeFigureOut">
               <a:rPr lang="es-ES_tradnl" smtClean="0"/>
-              <a:t>31/05/2024</a:t>
+              <a:t>11/06/2024</a:t>
             </a:fld>
             <a:endParaRPr lang="es-ES_tradnl"/>
           </a:p>
@@ -1112,7 +1112,7 @@
           <a:p>
             <a:fld id="{80160E5B-2E24-B941-8DE0-C0A90C36B7C5}" type="datetimeFigureOut">
               <a:rPr lang="en-GB" smtClean="0"/>
-              <a:t>31/05/2024</a:t>
+              <a:t>11/06/2024</a:t>
             </a:fld>
             <a:endParaRPr lang="en-GB"/>
           </a:p>
@@ -1310,7 +1310,7 @@
           <a:p>
             <a:fld id="{80160E5B-2E24-B941-8DE0-C0A90C36B7C5}" type="datetimeFigureOut">
               <a:rPr lang="en-GB" smtClean="0"/>
-              <a:t>31/05/2024</a:t>
+              <a:t>11/06/2024</a:t>
             </a:fld>
             <a:endParaRPr lang="en-GB"/>
           </a:p>
@@ -1557,7 +1557,7 @@
           <a:p>
             <a:fld id="{80160E5B-2E24-B941-8DE0-C0A90C36B7C5}" type="datetimeFigureOut">
               <a:rPr lang="en-GB" smtClean="0"/>
-              <a:t>31/05/2024</a:t>
+              <a:t>11/06/2024</a:t>
             </a:fld>
             <a:endParaRPr lang="en-GB"/>
           </a:p>
@@ -1776,7 +1776,7 @@
           <a:p>
             <a:fld id="{80160E5B-2E24-B941-8DE0-C0A90C36B7C5}" type="datetimeFigureOut">
               <a:rPr lang="en-GB" smtClean="0"/>
-              <a:t>31/05/2024</a:t>
+              <a:t>11/06/2024</a:t>
             </a:fld>
             <a:endParaRPr lang="en-GB"/>
           </a:p>
@@ -2051,7 +2051,7 @@
           <a:p>
             <a:fld id="{80160E5B-2E24-B941-8DE0-C0A90C36B7C5}" type="datetimeFigureOut">
               <a:rPr lang="en-GB" smtClean="0"/>
-              <a:t>31/05/2024</a:t>
+              <a:t>11/06/2024</a:t>
             </a:fld>
             <a:endParaRPr lang="en-GB"/>
           </a:p>
@@ -2355,7 +2355,7 @@
           <a:p>
             <a:fld id="{80160E5B-2E24-B941-8DE0-C0A90C36B7C5}" type="datetimeFigureOut">
               <a:rPr lang="en-GB" smtClean="0"/>
-              <a:t>31/05/2024</a:t>
+              <a:t>11/06/2024</a:t>
             </a:fld>
             <a:endParaRPr lang="en-GB"/>
           </a:p>
@@ -2806,7 +2806,7 @@
           <a:p>
             <a:fld id="{80160E5B-2E24-B941-8DE0-C0A90C36B7C5}" type="datetimeFigureOut">
               <a:rPr lang="en-GB" smtClean="0"/>
-              <a:t>31/05/2024</a:t>
+              <a:t>11/06/2024</a:t>
             </a:fld>
             <a:endParaRPr lang="en-GB"/>
           </a:p>
@@ -2986,7 +2986,7 @@
           <a:p>
             <a:fld id="{80160E5B-2E24-B941-8DE0-C0A90C36B7C5}" type="datetimeFigureOut">
               <a:rPr lang="en-GB" smtClean="0"/>
-              <a:t>31/05/2024</a:t>
+              <a:t>11/06/2024</a:t>
             </a:fld>
             <a:endParaRPr lang="en-GB"/>
           </a:p>
@@ -3138,7 +3138,7 @@
           <a:p>
             <a:fld id="{80160E5B-2E24-B941-8DE0-C0A90C36B7C5}" type="datetimeFigureOut">
               <a:rPr lang="en-GB" smtClean="0"/>
-              <a:t>31/05/2024</a:t>
+              <a:t>11/06/2024</a:t>
             </a:fld>
             <a:endParaRPr lang="en-GB"/>
           </a:p>
@@ -3488,7 +3488,7 @@
           <a:p>
             <a:fld id="{80160E5B-2E24-B941-8DE0-C0A90C36B7C5}" type="datetimeFigureOut">
               <a:rPr lang="en-GB" smtClean="0"/>
-              <a:t>31/05/2024</a:t>
+              <a:t>11/06/2024</a:t>
             </a:fld>
             <a:endParaRPr lang="en-GB"/>
           </a:p>
@@ -3815,7 +3815,7 @@
           <a:p>
             <a:fld id="{80160E5B-2E24-B941-8DE0-C0A90C36B7C5}" type="datetimeFigureOut">
               <a:rPr lang="en-GB" smtClean="0"/>
-              <a:t>31/05/2024</a:t>
+              <a:t>11/06/2024</a:t>
             </a:fld>
             <a:endParaRPr lang="en-GB"/>
           </a:p>
@@ -4095,7 +4095,7 @@
           <a:p>
             <a:fld id="{80160E5B-2E24-B941-8DE0-C0A90C36B7C5}" type="datetimeFigureOut">
               <a:rPr lang="en-GB" smtClean="0"/>
-              <a:t>31/05/2024</a:t>
+              <a:t>11/06/2024</a:t>
             </a:fld>
             <a:endParaRPr lang="en-GB"/>
           </a:p>
@@ -6564,7 +6564,7 @@
             <a:r>
               <a:rPr lang="fr-FR" sz="1200" dirty="0">
                 <a:highlight>
-                  <a:srgbClr val="7EBEFF"/>
+                  <a:srgbClr val="00FF00"/>
                 </a:highlight>
                 <a:hlinkClick r:id="rId2"/>
               </a:rPr>
@@ -6572,7 +6572,7 @@
             </a:r>
             <a:endParaRPr lang="fr-FR" sz="1200" dirty="0">
               <a:highlight>
-                <a:srgbClr val="7EBEFF"/>
+                <a:srgbClr val="00FF00"/>
               </a:highlight>
             </a:endParaRPr>
           </a:p>
@@ -6620,8 +6620,8 @@
         </p:nvSpPr>
         <p:spPr>
           <a:xfrm>
-            <a:off x="7057603" y="3587533"/>
-            <a:ext cx="1659171" cy="830997"/>
+            <a:off x="8812332" y="2979399"/>
+            <a:ext cx="3144316" cy="830997"/>
           </a:xfrm>
           <a:prstGeom prst="rect">
             <a:avLst/>
@@ -6644,7 +6644,16 @@
               <a:rPr lang="fr-FR" sz="1600" dirty="0">
                 <a:hlinkClick r:id="rId3"/>
               </a:rPr>
-              <a:t>http://fibonacci</a:t>
+              <a:t>http://fibonacci/</a:t>
+            </a:r>
+            <a:r>
+              <a:rPr lang="fr-FR" sz="1600" dirty="0">
+                <a:highlight>
+                  <a:srgbClr val="00FF00"/>
+                </a:highlight>
+                <a:hlinkClick r:id="rId3"/>
+              </a:rPr>
+              <a:t>fib-event</a:t>
             </a:r>
             <a:r>
               <a:rPr lang="fr-FR" sz="1600" dirty="0"/>
@@ -6975,7 +6984,7 @@
                   <a:schemeClr val="bg1"/>
                 </a:solidFill>
                 <a:highlight>
-                  <a:srgbClr val="7EBEFF"/>
+                  <a:srgbClr val="00FF00"/>
                 </a:highlight>
               </a:rPr>
               <a:t>fib-event</a:t>
@@ -7540,7 +7549,7 @@
                   <a:schemeClr val="bg1"/>
                 </a:solidFill>
                 <a:highlight>
-                  <a:srgbClr val="7EBEFF"/>
+                  <a:srgbClr val="00FF00"/>
                 </a:highlight>
               </a:rPr>
               <a:t>fib-event</a:t>
@@ -9427,6 +9436,34 @@
 </file>
 
 <file path=customXml/item1.xml><?xml version="1.0" encoding="utf-8"?>
+<p:properties xmlns:p="http://schemas.microsoft.com/office/2006/metadata/properties" xmlns:xsi="http://www.w3.org/2001/XMLSchema-instance" xmlns:pc="http://schemas.microsoft.com/office/infopath/2007/PartnerControls">
+  <documentManagement>
+    <SharedWithUsers xmlns="03cb9dc2-e9ea-44ac-afed-001b6fad4f36">
+      <UserInfo>
+        <DisplayName>LEMARCHAND THOMAS</DisplayName>
+        <AccountId>16</AccountId>
+        <AccountType/>
+      </UserInfo>
+      <UserInfo>
+        <DisplayName>CHERVET Guillaume</DisplayName>
+        <AccountId>84</AccountId>
+        <AccountType/>
+      </UserInfo>
+    </SharedWithUsers>
+  </documentManagement>
+</p:properties>
+</file>
+
+<file path=customXml/item2.xml><?xml version="1.0" encoding="utf-8"?>
+<?mso-contentType ?>
+<FormTemplates xmlns="http://schemas.microsoft.com/sharepoint/v3/contenttype/forms">
+  <Display>DocumentLibraryForm</Display>
+  <Edit>DocumentLibraryForm</Edit>
+  <New>DocumentLibraryForm</New>
+</FormTemplates>
+</file>
+
+<file path=customXml/item3.xml><?xml version="1.0" encoding="utf-8"?>
 <ct:contentTypeSchema xmlns:ct="http://schemas.microsoft.com/office/2006/metadata/contentType" xmlns:ma="http://schemas.microsoft.com/office/2006/metadata/properties/metaAttributes" ct:_="" ma:_="" ma:contentTypeName="Document" ma:contentTypeID="0x0101003BE0F011240A094E827BA56BE9109944" ma:contentTypeVersion="13" ma:contentTypeDescription="Create a new document." ma:contentTypeScope="" ma:versionID="5dc1144dd420c1d8a9ebf51c7358c8f0">
   <xsd:schema xmlns:xsd="http://www.w3.org/2001/XMLSchema" xmlns:xs="http://www.w3.org/2001/XMLSchema" xmlns:p="http://schemas.microsoft.com/office/2006/metadata/properties" xmlns:ns3="03cb9dc2-e9ea-44ac-afed-001b6fad4f36" xmlns:ns4="d0879fa5-f2db-41a7-8861-4a44e7ee3b24" targetNamespace="http://schemas.microsoft.com/office/2006/metadata/properties" ma:root="true" ma:fieldsID="6dda18631f78ef64168f1da1c53d30ff" ns3:_="" ns4:_="">
     <xsd:import namespace="03cb9dc2-e9ea-44ac-afed-001b6fad4f36"/>
@@ -9649,35 +9686,32 @@
 </ct:contentTypeSchema>
 </file>
 
-<file path=customXml/item2.xml><?xml version="1.0" encoding="utf-8"?>
-<?mso-contentType ?>
-<FormTemplates xmlns="http://schemas.microsoft.com/sharepoint/v3/contenttype/forms">
-  <Display>DocumentLibraryForm</Display>
-  <Edit>DocumentLibraryForm</Edit>
-  <New>DocumentLibraryForm</New>
-</FormTemplates>
+<file path=customXml/itemProps1.xml><?xml version="1.0" encoding="utf-8"?>
+<ds:datastoreItem xmlns:ds="http://schemas.openxmlformats.org/officeDocument/2006/customXml" ds:itemID="{C522BBC0-3E7A-472B-9CC6-34C5EA434DEE}">
+  <ds:schemaRefs>
+    <ds:schemaRef ds:uri="http://purl.org/dc/terms/"/>
+    <ds:schemaRef ds:uri="http://schemas.openxmlformats.org/package/2006/metadata/core-properties"/>
+    <ds:schemaRef ds:uri="http://purl.org/dc/dcmitype/"/>
+    <ds:schemaRef ds:uri="http://schemas.microsoft.com/office/infopath/2007/PartnerControls"/>
+    <ds:schemaRef ds:uri="http://schemas.microsoft.com/office/2006/documentManagement/types"/>
+    <ds:schemaRef ds:uri="http://purl.org/dc/elements/1.1/"/>
+    <ds:schemaRef ds:uri="http://schemas.microsoft.com/office/2006/metadata/properties"/>
+    <ds:schemaRef ds:uri="d0879fa5-f2db-41a7-8861-4a44e7ee3b24"/>
+    <ds:schemaRef ds:uri="03cb9dc2-e9ea-44ac-afed-001b6fad4f36"/>
+    <ds:schemaRef ds:uri="http://www.w3.org/XML/1998/namespace"/>
+  </ds:schemaRefs>
+</ds:datastoreItem>
 </file>
 
-<file path=customXml/item3.xml><?xml version="1.0" encoding="utf-8"?>
-<p:properties xmlns:p="http://schemas.microsoft.com/office/2006/metadata/properties" xmlns:xsi="http://www.w3.org/2001/XMLSchema-instance" xmlns:pc="http://schemas.microsoft.com/office/infopath/2007/PartnerControls">
-  <documentManagement>
-    <SharedWithUsers xmlns="03cb9dc2-e9ea-44ac-afed-001b6fad4f36">
-      <UserInfo>
-        <DisplayName>LEMARCHAND THOMAS</DisplayName>
-        <AccountId>16</AccountId>
-        <AccountType/>
-      </UserInfo>
-      <UserInfo>
-        <DisplayName>CHERVET Guillaume</DisplayName>
-        <AccountId>84</AccountId>
-        <AccountType/>
-      </UserInfo>
-    </SharedWithUsers>
-  </documentManagement>
-</p:properties>
+<file path=customXml/itemProps2.xml><?xml version="1.0" encoding="utf-8"?>
+<ds:datastoreItem xmlns:ds="http://schemas.openxmlformats.org/officeDocument/2006/customXml" ds:itemID="{05D7AB42-0DA9-4407-9B22-92C435FE7C62}">
+  <ds:schemaRefs>
+    <ds:schemaRef ds:uri="http://schemas.microsoft.com/sharepoint/v3/contenttype/forms"/>
+  </ds:schemaRefs>
+</ds:datastoreItem>
 </file>
 
-<file path=customXml/itemProps1.xml><?xml version="1.0" encoding="utf-8"?>
+<file path=customXml/itemProps3.xml><?xml version="1.0" encoding="utf-8"?>
 <ds:datastoreItem xmlns:ds="http://schemas.openxmlformats.org/officeDocument/2006/customXml" ds:itemID="{C72C7657-97CD-4958-88DD-F8AC87258741}">
   <ds:schemaRefs>
     <ds:schemaRef ds:uri="http://schemas.microsoft.com/office/2006/metadata/contentType"/>
@@ -9694,29 +9728,4 @@
     <ds:schemaRef ds:uri="http://schemas.microsoft.com/internal/obd"/>
   </ds:schemaRefs>
 </ds:datastoreItem>
-</file>
-
-<file path=customXml/itemProps2.xml><?xml version="1.0" encoding="utf-8"?>
-<ds:datastoreItem xmlns:ds="http://schemas.openxmlformats.org/officeDocument/2006/customXml" ds:itemID="{05D7AB42-0DA9-4407-9B22-92C435FE7C62}">
-  <ds:schemaRefs>
-    <ds:schemaRef ds:uri="http://schemas.microsoft.com/sharepoint/v3/contenttype/forms"/>
-  </ds:schemaRefs>
-</ds:datastoreItem>
-</file>
-
-<file path=customXml/itemProps3.xml><?xml version="1.0" encoding="utf-8"?>
-<ds:datastoreItem xmlns:ds="http://schemas.openxmlformats.org/officeDocument/2006/customXml" ds:itemID="{C522BBC0-3E7A-472B-9CC6-34C5EA434DEE}">
-  <ds:schemaRefs>
-    <ds:schemaRef ds:uri="http://purl.org/dc/terms/"/>
-    <ds:schemaRef ds:uri="http://schemas.openxmlformats.org/package/2006/metadata/core-properties"/>
-    <ds:schemaRef ds:uri="http://purl.org/dc/dcmitype/"/>
-    <ds:schemaRef ds:uri="http://schemas.microsoft.com/office/infopath/2007/PartnerControls"/>
-    <ds:schemaRef ds:uri="http://schemas.microsoft.com/office/2006/documentManagement/types"/>
-    <ds:schemaRef ds:uri="http://purl.org/dc/elements/1.1/"/>
-    <ds:schemaRef ds:uri="http://schemas.microsoft.com/office/2006/metadata/properties"/>
-    <ds:schemaRef ds:uri="d0879fa5-f2db-41a7-8861-4a44e7ee3b24"/>
-    <ds:schemaRef ds:uri="03cb9dc2-e9ea-44ac-afed-001b6fad4f36"/>
-    <ds:schemaRef ds:uri="http://www.w3.org/XML/1998/namespace"/>
-  </ds:schemaRefs>
-</ds:datastoreItem>
 </file>
</xml_diff>

<commit_message>
fix(slimfaas): SlimFaasSubscribeEvents not throw if no deployment licenning to it (#62)
* fix(slimfaas): SlimFaasSubscribeEvents was not throw if not deployments are liscening to it

* Update
</commit_message>
<xml_diff>
--- a/documentation/slimfaas.pptx
+++ b/documentation/slimfaas.pptx
@@ -238,7 +238,7 @@
           <a:p>
             <a:fld id="{F60FFC85-34C0-4167-8801-71D65E4D986C}" type="datetimeFigureOut">
               <a:rPr lang="fr-FR" smtClean="0"/>
-              <a:t>31/05/2024</a:t>
+              <a:t>11/06/2024</a:t>
             </a:fld>
             <a:endParaRPr lang="fr-FR"/>
           </a:p>
@@ -415,7 +415,7 @@
           <a:p>
             <a:fld id="{F2EE8696-3B2B-7D49-B212-A8F746F3A84B}" type="datetimeFigureOut">
               <a:rPr lang="es-ES_tradnl" smtClean="0"/>
-              <a:t>31/05/2024</a:t>
+              <a:t>11/06/2024</a:t>
             </a:fld>
             <a:endParaRPr lang="es-ES_tradnl"/>
           </a:p>
@@ -1112,7 +1112,7 @@
           <a:p>
             <a:fld id="{80160E5B-2E24-B941-8DE0-C0A90C36B7C5}" type="datetimeFigureOut">
               <a:rPr lang="en-GB" smtClean="0"/>
-              <a:t>31/05/2024</a:t>
+              <a:t>11/06/2024</a:t>
             </a:fld>
             <a:endParaRPr lang="en-GB"/>
           </a:p>
@@ -1310,7 +1310,7 @@
           <a:p>
             <a:fld id="{80160E5B-2E24-B941-8DE0-C0A90C36B7C5}" type="datetimeFigureOut">
               <a:rPr lang="en-GB" smtClean="0"/>
-              <a:t>31/05/2024</a:t>
+              <a:t>11/06/2024</a:t>
             </a:fld>
             <a:endParaRPr lang="en-GB"/>
           </a:p>
@@ -1557,7 +1557,7 @@
           <a:p>
             <a:fld id="{80160E5B-2E24-B941-8DE0-C0A90C36B7C5}" type="datetimeFigureOut">
               <a:rPr lang="en-GB" smtClean="0"/>
-              <a:t>31/05/2024</a:t>
+              <a:t>11/06/2024</a:t>
             </a:fld>
             <a:endParaRPr lang="en-GB"/>
           </a:p>
@@ -1776,7 +1776,7 @@
           <a:p>
             <a:fld id="{80160E5B-2E24-B941-8DE0-C0A90C36B7C5}" type="datetimeFigureOut">
               <a:rPr lang="en-GB" smtClean="0"/>
-              <a:t>31/05/2024</a:t>
+              <a:t>11/06/2024</a:t>
             </a:fld>
             <a:endParaRPr lang="en-GB"/>
           </a:p>
@@ -2051,7 +2051,7 @@
           <a:p>
             <a:fld id="{80160E5B-2E24-B941-8DE0-C0A90C36B7C5}" type="datetimeFigureOut">
               <a:rPr lang="en-GB" smtClean="0"/>
-              <a:t>31/05/2024</a:t>
+              <a:t>11/06/2024</a:t>
             </a:fld>
             <a:endParaRPr lang="en-GB"/>
           </a:p>
@@ -2355,7 +2355,7 @@
           <a:p>
             <a:fld id="{80160E5B-2E24-B941-8DE0-C0A90C36B7C5}" type="datetimeFigureOut">
               <a:rPr lang="en-GB" smtClean="0"/>
-              <a:t>31/05/2024</a:t>
+              <a:t>11/06/2024</a:t>
             </a:fld>
             <a:endParaRPr lang="en-GB"/>
           </a:p>
@@ -2806,7 +2806,7 @@
           <a:p>
             <a:fld id="{80160E5B-2E24-B941-8DE0-C0A90C36B7C5}" type="datetimeFigureOut">
               <a:rPr lang="en-GB" smtClean="0"/>
-              <a:t>31/05/2024</a:t>
+              <a:t>11/06/2024</a:t>
             </a:fld>
             <a:endParaRPr lang="en-GB"/>
           </a:p>
@@ -2986,7 +2986,7 @@
           <a:p>
             <a:fld id="{80160E5B-2E24-B941-8DE0-C0A90C36B7C5}" type="datetimeFigureOut">
               <a:rPr lang="en-GB" smtClean="0"/>
-              <a:t>31/05/2024</a:t>
+              <a:t>11/06/2024</a:t>
             </a:fld>
             <a:endParaRPr lang="en-GB"/>
           </a:p>
@@ -3138,7 +3138,7 @@
           <a:p>
             <a:fld id="{80160E5B-2E24-B941-8DE0-C0A90C36B7C5}" type="datetimeFigureOut">
               <a:rPr lang="en-GB" smtClean="0"/>
-              <a:t>31/05/2024</a:t>
+              <a:t>11/06/2024</a:t>
             </a:fld>
             <a:endParaRPr lang="en-GB"/>
           </a:p>
@@ -3488,7 +3488,7 @@
           <a:p>
             <a:fld id="{80160E5B-2E24-B941-8DE0-C0A90C36B7C5}" type="datetimeFigureOut">
               <a:rPr lang="en-GB" smtClean="0"/>
-              <a:t>31/05/2024</a:t>
+              <a:t>11/06/2024</a:t>
             </a:fld>
             <a:endParaRPr lang="en-GB"/>
           </a:p>
@@ -3815,7 +3815,7 @@
           <a:p>
             <a:fld id="{80160E5B-2E24-B941-8DE0-C0A90C36B7C5}" type="datetimeFigureOut">
               <a:rPr lang="en-GB" smtClean="0"/>
-              <a:t>31/05/2024</a:t>
+              <a:t>11/06/2024</a:t>
             </a:fld>
             <a:endParaRPr lang="en-GB"/>
           </a:p>
@@ -4095,7 +4095,7 @@
           <a:p>
             <a:fld id="{80160E5B-2E24-B941-8DE0-C0A90C36B7C5}" type="datetimeFigureOut">
               <a:rPr lang="en-GB" smtClean="0"/>
-              <a:t>31/05/2024</a:t>
+              <a:t>11/06/2024</a:t>
             </a:fld>
             <a:endParaRPr lang="en-GB"/>
           </a:p>
@@ -6564,7 +6564,7 @@
             <a:r>
               <a:rPr lang="fr-FR" sz="1200" dirty="0">
                 <a:highlight>
-                  <a:srgbClr val="7EBEFF"/>
+                  <a:srgbClr val="00FF00"/>
                 </a:highlight>
                 <a:hlinkClick r:id="rId2"/>
               </a:rPr>
@@ -6572,7 +6572,7 @@
             </a:r>
             <a:endParaRPr lang="fr-FR" sz="1200" dirty="0">
               <a:highlight>
-                <a:srgbClr val="7EBEFF"/>
+                <a:srgbClr val="00FF00"/>
               </a:highlight>
             </a:endParaRPr>
           </a:p>
@@ -6620,8 +6620,8 @@
         </p:nvSpPr>
         <p:spPr>
           <a:xfrm>
-            <a:off x="7057603" y="3587533"/>
-            <a:ext cx="1659171" cy="830997"/>
+            <a:off x="8812332" y="2979399"/>
+            <a:ext cx="3144316" cy="830997"/>
           </a:xfrm>
           <a:prstGeom prst="rect">
             <a:avLst/>
@@ -6644,7 +6644,16 @@
               <a:rPr lang="fr-FR" sz="1600" dirty="0">
                 <a:hlinkClick r:id="rId3"/>
               </a:rPr>
-              <a:t>http://fibonacci</a:t>
+              <a:t>http://fibonacci/</a:t>
+            </a:r>
+            <a:r>
+              <a:rPr lang="fr-FR" sz="1600" dirty="0">
+                <a:highlight>
+                  <a:srgbClr val="00FF00"/>
+                </a:highlight>
+                <a:hlinkClick r:id="rId3"/>
+              </a:rPr>
+              <a:t>fib-event</a:t>
             </a:r>
             <a:r>
               <a:rPr lang="fr-FR" sz="1600" dirty="0"/>
@@ -6975,7 +6984,7 @@
                   <a:schemeClr val="bg1"/>
                 </a:solidFill>
                 <a:highlight>
-                  <a:srgbClr val="7EBEFF"/>
+                  <a:srgbClr val="00FF00"/>
                 </a:highlight>
               </a:rPr>
               <a:t>fib-event</a:t>
@@ -7540,7 +7549,7 @@
                   <a:schemeClr val="bg1"/>
                 </a:solidFill>
                 <a:highlight>
-                  <a:srgbClr val="7EBEFF"/>
+                  <a:srgbClr val="00FF00"/>
                 </a:highlight>
               </a:rPr>
               <a:t>fib-event</a:t>
@@ -9427,6 +9436,34 @@
 </file>
 
 <file path=customXml/item1.xml><?xml version="1.0" encoding="utf-8"?>
+<p:properties xmlns:p="http://schemas.microsoft.com/office/2006/metadata/properties" xmlns:xsi="http://www.w3.org/2001/XMLSchema-instance" xmlns:pc="http://schemas.microsoft.com/office/infopath/2007/PartnerControls">
+  <documentManagement>
+    <SharedWithUsers xmlns="03cb9dc2-e9ea-44ac-afed-001b6fad4f36">
+      <UserInfo>
+        <DisplayName>LEMARCHAND THOMAS</DisplayName>
+        <AccountId>16</AccountId>
+        <AccountType/>
+      </UserInfo>
+      <UserInfo>
+        <DisplayName>CHERVET Guillaume</DisplayName>
+        <AccountId>84</AccountId>
+        <AccountType/>
+      </UserInfo>
+    </SharedWithUsers>
+  </documentManagement>
+</p:properties>
+</file>
+
+<file path=customXml/item2.xml><?xml version="1.0" encoding="utf-8"?>
+<?mso-contentType ?>
+<FormTemplates xmlns="http://schemas.microsoft.com/sharepoint/v3/contenttype/forms">
+  <Display>DocumentLibraryForm</Display>
+  <Edit>DocumentLibraryForm</Edit>
+  <New>DocumentLibraryForm</New>
+</FormTemplates>
+</file>
+
+<file path=customXml/item3.xml><?xml version="1.0" encoding="utf-8"?>
 <ct:contentTypeSchema xmlns:ct="http://schemas.microsoft.com/office/2006/metadata/contentType" xmlns:ma="http://schemas.microsoft.com/office/2006/metadata/properties/metaAttributes" ct:_="" ma:_="" ma:contentTypeName="Document" ma:contentTypeID="0x0101003BE0F011240A094E827BA56BE9109944" ma:contentTypeVersion="13" ma:contentTypeDescription="Create a new document." ma:contentTypeScope="" ma:versionID="5dc1144dd420c1d8a9ebf51c7358c8f0">
   <xsd:schema xmlns:xsd="http://www.w3.org/2001/XMLSchema" xmlns:xs="http://www.w3.org/2001/XMLSchema" xmlns:p="http://schemas.microsoft.com/office/2006/metadata/properties" xmlns:ns3="03cb9dc2-e9ea-44ac-afed-001b6fad4f36" xmlns:ns4="d0879fa5-f2db-41a7-8861-4a44e7ee3b24" targetNamespace="http://schemas.microsoft.com/office/2006/metadata/properties" ma:root="true" ma:fieldsID="6dda18631f78ef64168f1da1c53d30ff" ns3:_="" ns4:_="">
     <xsd:import namespace="03cb9dc2-e9ea-44ac-afed-001b6fad4f36"/>
@@ -9649,35 +9686,32 @@
 </ct:contentTypeSchema>
 </file>
 
-<file path=customXml/item2.xml><?xml version="1.0" encoding="utf-8"?>
-<?mso-contentType ?>
-<FormTemplates xmlns="http://schemas.microsoft.com/sharepoint/v3/contenttype/forms">
-  <Display>DocumentLibraryForm</Display>
-  <Edit>DocumentLibraryForm</Edit>
-  <New>DocumentLibraryForm</New>
-</FormTemplates>
+<file path=customXml/itemProps1.xml><?xml version="1.0" encoding="utf-8"?>
+<ds:datastoreItem xmlns:ds="http://schemas.openxmlformats.org/officeDocument/2006/customXml" ds:itemID="{C522BBC0-3E7A-472B-9CC6-34C5EA434DEE}">
+  <ds:schemaRefs>
+    <ds:schemaRef ds:uri="http://purl.org/dc/terms/"/>
+    <ds:schemaRef ds:uri="http://schemas.openxmlformats.org/package/2006/metadata/core-properties"/>
+    <ds:schemaRef ds:uri="http://purl.org/dc/dcmitype/"/>
+    <ds:schemaRef ds:uri="http://schemas.microsoft.com/office/infopath/2007/PartnerControls"/>
+    <ds:schemaRef ds:uri="http://schemas.microsoft.com/office/2006/documentManagement/types"/>
+    <ds:schemaRef ds:uri="http://purl.org/dc/elements/1.1/"/>
+    <ds:schemaRef ds:uri="http://schemas.microsoft.com/office/2006/metadata/properties"/>
+    <ds:schemaRef ds:uri="d0879fa5-f2db-41a7-8861-4a44e7ee3b24"/>
+    <ds:schemaRef ds:uri="03cb9dc2-e9ea-44ac-afed-001b6fad4f36"/>
+    <ds:schemaRef ds:uri="http://www.w3.org/XML/1998/namespace"/>
+  </ds:schemaRefs>
+</ds:datastoreItem>
 </file>
 
-<file path=customXml/item3.xml><?xml version="1.0" encoding="utf-8"?>
-<p:properties xmlns:p="http://schemas.microsoft.com/office/2006/metadata/properties" xmlns:xsi="http://www.w3.org/2001/XMLSchema-instance" xmlns:pc="http://schemas.microsoft.com/office/infopath/2007/PartnerControls">
-  <documentManagement>
-    <SharedWithUsers xmlns="03cb9dc2-e9ea-44ac-afed-001b6fad4f36">
-      <UserInfo>
-        <DisplayName>LEMARCHAND THOMAS</DisplayName>
-        <AccountId>16</AccountId>
-        <AccountType/>
-      </UserInfo>
-      <UserInfo>
-        <DisplayName>CHERVET Guillaume</DisplayName>
-        <AccountId>84</AccountId>
-        <AccountType/>
-      </UserInfo>
-    </SharedWithUsers>
-  </documentManagement>
-</p:properties>
+<file path=customXml/itemProps2.xml><?xml version="1.0" encoding="utf-8"?>
+<ds:datastoreItem xmlns:ds="http://schemas.openxmlformats.org/officeDocument/2006/customXml" ds:itemID="{05D7AB42-0DA9-4407-9B22-92C435FE7C62}">
+  <ds:schemaRefs>
+    <ds:schemaRef ds:uri="http://schemas.microsoft.com/sharepoint/v3/contenttype/forms"/>
+  </ds:schemaRefs>
+</ds:datastoreItem>
 </file>
 
-<file path=customXml/itemProps1.xml><?xml version="1.0" encoding="utf-8"?>
+<file path=customXml/itemProps3.xml><?xml version="1.0" encoding="utf-8"?>
 <ds:datastoreItem xmlns:ds="http://schemas.openxmlformats.org/officeDocument/2006/customXml" ds:itemID="{C72C7657-97CD-4958-88DD-F8AC87258741}">
   <ds:schemaRefs>
     <ds:schemaRef ds:uri="http://schemas.microsoft.com/office/2006/metadata/contentType"/>
@@ -9694,29 +9728,4 @@
     <ds:schemaRef ds:uri="http://schemas.microsoft.com/internal/obd"/>
   </ds:schemaRefs>
 </ds:datastoreItem>
-</file>
-
-<file path=customXml/itemProps2.xml><?xml version="1.0" encoding="utf-8"?>
-<ds:datastoreItem xmlns:ds="http://schemas.openxmlformats.org/officeDocument/2006/customXml" ds:itemID="{05D7AB42-0DA9-4407-9B22-92C435FE7C62}">
-  <ds:schemaRefs>
-    <ds:schemaRef ds:uri="http://schemas.microsoft.com/sharepoint/v3/contenttype/forms"/>
-  </ds:schemaRefs>
-</ds:datastoreItem>
-</file>
-
-<file path=customXml/itemProps3.xml><?xml version="1.0" encoding="utf-8"?>
-<ds:datastoreItem xmlns:ds="http://schemas.openxmlformats.org/officeDocument/2006/customXml" ds:itemID="{C522BBC0-3E7A-472B-9CC6-34C5EA434DEE}">
-  <ds:schemaRefs>
-    <ds:schemaRef ds:uri="http://purl.org/dc/terms/"/>
-    <ds:schemaRef ds:uri="http://schemas.openxmlformats.org/package/2006/metadata/core-properties"/>
-    <ds:schemaRef ds:uri="http://purl.org/dc/dcmitype/"/>
-    <ds:schemaRef ds:uri="http://schemas.microsoft.com/office/infopath/2007/PartnerControls"/>
-    <ds:schemaRef ds:uri="http://schemas.microsoft.com/office/2006/documentManagement/types"/>
-    <ds:schemaRef ds:uri="http://purl.org/dc/elements/1.1/"/>
-    <ds:schemaRef ds:uri="http://schemas.microsoft.com/office/2006/metadata/properties"/>
-    <ds:schemaRef ds:uri="d0879fa5-f2db-41a7-8861-4a44e7ee3b24"/>
-    <ds:schemaRef ds:uri="03cb9dc2-e9ea-44ac-afed-001b6fad4f36"/>
-    <ds:schemaRef ds:uri="http://www.w3.org/XML/1998/namespace"/>
-  </ds:schemaRefs>
-</ds:datastoreItem>
 </file>
</xml_diff>

<commit_message>
doc(slimfaas): fix image publish in readme
</commit_message>
<xml_diff>
--- a/documentation/slimfaas.pptx
+++ b/documentation/slimfaas.pptx
@@ -6476,8 +6476,8 @@
         </p:nvCxnSpPr>
         <p:spPr>
           <a:xfrm flipV="1">
-            <a:off x="3046235" y="4441930"/>
-            <a:ext cx="1133163" cy="3902"/>
+            <a:off x="3219449" y="4441930"/>
+            <a:ext cx="959949" cy="3902"/>
           </a:xfrm>
           <a:prstGeom prst="straightConnector1">
             <a:avLst/>
@@ -6520,8 +6520,8 @@
         </p:nvSpPr>
         <p:spPr>
           <a:xfrm>
-            <a:off x="140221" y="4122666"/>
-            <a:ext cx="2906014" cy="646331"/>
+            <a:off x="72470" y="4122666"/>
+            <a:ext cx="3146979" cy="646331"/>
           </a:xfrm>
           <a:prstGeom prst="rect">
             <a:avLst/>
@@ -6570,11 +6570,18 @@
               </a:rPr>
               <a:t>fib-event</a:t>
             </a:r>
-            <a:endParaRPr lang="fr-FR" sz="1200" dirty="0">
-              <a:highlight>
-                <a:srgbClr val="00FF00"/>
-              </a:highlight>
-            </a:endParaRPr>
+            <a:r>
+              <a:rPr lang="fr-FR" sz="1200" dirty="0"/>
+              <a:t>/</a:t>
+            </a:r>
+            <a:r>
+              <a:rPr lang="fr-FR" sz="1200" dirty="0">
+                <a:highlight>
+                  <a:srgbClr val="FF6C45"/>
+                </a:highlight>
+              </a:rPr>
+              <a:t>path</a:t>
+            </a:r>
           </a:p>
           <a:p>
             <a:r>
@@ -6649,15 +6656,11 @@
             <a:r>
               <a:rPr lang="fr-FR" sz="1600" dirty="0">
                 <a:highlight>
-                  <a:srgbClr val="00FF00"/>
+                  <a:srgbClr val="FF6C45"/>
                 </a:highlight>
                 <a:hlinkClick r:id="rId3"/>
               </a:rPr>
-              <a:t>fib-event</a:t>
-            </a:r>
-            <a:r>
-              <a:rPr lang="fr-FR" sz="1600" dirty="0"/>
-              <a:t> </a:t>
+              <a:t>path</a:t>
             </a:r>
             <a:br>
               <a:rPr lang="fr-FR" sz="1600" dirty="0"/>
@@ -9436,34 +9439,6 @@
 </file>
 
 <file path=customXml/item1.xml><?xml version="1.0" encoding="utf-8"?>
-<p:properties xmlns:p="http://schemas.microsoft.com/office/2006/metadata/properties" xmlns:xsi="http://www.w3.org/2001/XMLSchema-instance" xmlns:pc="http://schemas.microsoft.com/office/infopath/2007/PartnerControls">
-  <documentManagement>
-    <SharedWithUsers xmlns="03cb9dc2-e9ea-44ac-afed-001b6fad4f36">
-      <UserInfo>
-        <DisplayName>LEMARCHAND THOMAS</DisplayName>
-        <AccountId>16</AccountId>
-        <AccountType/>
-      </UserInfo>
-      <UserInfo>
-        <DisplayName>CHERVET Guillaume</DisplayName>
-        <AccountId>84</AccountId>
-        <AccountType/>
-      </UserInfo>
-    </SharedWithUsers>
-  </documentManagement>
-</p:properties>
-</file>
-
-<file path=customXml/item2.xml><?xml version="1.0" encoding="utf-8"?>
-<?mso-contentType ?>
-<FormTemplates xmlns="http://schemas.microsoft.com/sharepoint/v3/contenttype/forms">
-  <Display>DocumentLibraryForm</Display>
-  <Edit>DocumentLibraryForm</Edit>
-  <New>DocumentLibraryForm</New>
-</FormTemplates>
-</file>
-
-<file path=customXml/item3.xml><?xml version="1.0" encoding="utf-8"?>
 <ct:contentTypeSchema xmlns:ct="http://schemas.microsoft.com/office/2006/metadata/contentType" xmlns:ma="http://schemas.microsoft.com/office/2006/metadata/properties/metaAttributes" ct:_="" ma:_="" ma:contentTypeName="Document" ma:contentTypeID="0x0101003BE0F011240A094E827BA56BE9109944" ma:contentTypeVersion="13" ma:contentTypeDescription="Create a new document." ma:contentTypeScope="" ma:versionID="5dc1144dd420c1d8a9ebf51c7358c8f0">
   <xsd:schema xmlns:xsd="http://www.w3.org/2001/XMLSchema" xmlns:xs="http://www.w3.org/2001/XMLSchema" xmlns:p="http://schemas.microsoft.com/office/2006/metadata/properties" xmlns:ns3="03cb9dc2-e9ea-44ac-afed-001b6fad4f36" xmlns:ns4="d0879fa5-f2db-41a7-8861-4a44e7ee3b24" targetNamespace="http://schemas.microsoft.com/office/2006/metadata/properties" ma:root="true" ma:fieldsID="6dda18631f78ef64168f1da1c53d30ff" ns3:_="" ns4:_="">
     <xsd:import namespace="03cb9dc2-e9ea-44ac-afed-001b6fad4f36"/>
@@ -9686,32 +9661,35 @@
 </ct:contentTypeSchema>
 </file>
 
-<file path=customXml/itemProps1.xml><?xml version="1.0" encoding="utf-8"?>
-<ds:datastoreItem xmlns:ds="http://schemas.openxmlformats.org/officeDocument/2006/customXml" ds:itemID="{C522BBC0-3E7A-472B-9CC6-34C5EA434DEE}">
-  <ds:schemaRefs>
-    <ds:schemaRef ds:uri="http://purl.org/dc/terms/"/>
-    <ds:schemaRef ds:uri="http://schemas.openxmlformats.org/package/2006/metadata/core-properties"/>
-    <ds:schemaRef ds:uri="http://purl.org/dc/dcmitype/"/>
-    <ds:schemaRef ds:uri="http://schemas.microsoft.com/office/infopath/2007/PartnerControls"/>
-    <ds:schemaRef ds:uri="http://schemas.microsoft.com/office/2006/documentManagement/types"/>
-    <ds:schemaRef ds:uri="http://purl.org/dc/elements/1.1/"/>
-    <ds:schemaRef ds:uri="http://schemas.microsoft.com/office/2006/metadata/properties"/>
-    <ds:schemaRef ds:uri="d0879fa5-f2db-41a7-8861-4a44e7ee3b24"/>
-    <ds:schemaRef ds:uri="03cb9dc2-e9ea-44ac-afed-001b6fad4f36"/>
-    <ds:schemaRef ds:uri="http://www.w3.org/XML/1998/namespace"/>
-  </ds:schemaRefs>
-</ds:datastoreItem>
+<file path=customXml/item2.xml><?xml version="1.0" encoding="utf-8"?>
+<?mso-contentType ?>
+<FormTemplates xmlns="http://schemas.microsoft.com/sharepoint/v3/contenttype/forms">
+  <Display>DocumentLibraryForm</Display>
+  <Edit>DocumentLibraryForm</Edit>
+  <New>DocumentLibraryForm</New>
+</FormTemplates>
 </file>
 
-<file path=customXml/itemProps2.xml><?xml version="1.0" encoding="utf-8"?>
-<ds:datastoreItem xmlns:ds="http://schemas.openxmlformats.org/officeDocument/2006/customXml" ds:itemID="{05D7AB42-0DA9-4407-9B22-92C435FE7C62}">
-  <ds:schemaRefs>
-    <ds:schemaRef ds:uri="http://schemas.microsoft.com/sharepoint/v3/contenttype/forms"/>
-  </ds:schemaRefs>
-</ds:datastoreItem>
+<file path=customXml/item3.xml><?xml version="1.0" encoding="utf-8"?>
+<p:properties xmlns:p="http://schemas.microsoft.com/office/2006/metadata/properties" xmlns:xsi="http://www.w3.org/2001/XMLSchema-instance" xmlns:pc="http://schemas.microsoft.com/office/infopath/2007/PartnerControls">
+  <documentManagement>
+    <SharedWithUsers xmlns="03cb9dc2-e9ea-44ac-afed-001b6fad4f36">
+      <UserInfo>
+        <DisplayName>LEMARCHAND THOMAS</DisplayName>
+        <AccountId>16</AccountId>
+        <AccountType/>
+      </UserInfo>
+      <UserInfo>
+        <DisplayName>CHERVET Guillaume</DisplayName>
+        <AccountId>84</AccountId>
+        <AccountType/>
+      </UserInfo>
+    </SharedWithUsers>
+  </documentManagement>
+</p:properties>
 </file>
 
-<file path=customXml/itemProps3.xml><?xml version="1.0" encoding="utf-8"?>
+<file path=customXml/itemProps1.xml><?xml version="1.0" encoding="utf-8"?>
 <ds:datastoreItem xmlns:ds="http://schemas.openxmlformats.org/officeDocument/2006/customXml" ds:itemID="{C72C7657-97CD-4958-88DD-F8AC87258741}">
   <ds:schemaRefs>
     <ds:schemaRef ds:uri="http://schemas.microsoft.com/office/2006/metadata/contentType"/>
@@ -9728,4 +9706,29 @@
     <ds:schemaRef ds:uri="http://schemas.microsoft.com/internal/obd"/>
   </ds:schemaRefs>
 </ds:datastoreItem>
+</file>
+
+<file path=customXml/itemProps2.xml><?xml version="1.0" encoding="utf-8"?>
+<ds:datastoreItem xmlns:ds="http://schemas.openxmlformats.org/officeDocument/2006/customXml" ds:itemID="{05D7AB42-0DA9-4407-9B22-92C435FE7C62}">
+  <ds:schemaRefs>
+    <ds:schemaRef ds:uri="http://schemas.microsoft.com/sharepoint/v3/contenttype/forms"/>
+  </ds:schemaRefs>
+</ds:datastoreItem>
+</file>
+
+<file path=customXml/itemProps3.xml><?xml version="1.0" encoding="utf-8"?>
+<ds:datastoreItem xmlns:ds="http://schemas.openxmlformats.org/officeDocument/2006/customXml" ds:itemID="{C522BBC0-3E7A-472B-9CC6-34C5EA434DEE}">
+  <ds:schemaRefs>
+    <ds:schemaRef ds:uri="http://purl.org/dc/terms/"/>
+    <ds:schemaRef ds:uri="http://schemas.openxmlformats.org/package/2006/metadata/core-properties"/>
+    <ds:schemaRef ds:uri="http://purl.org/dc/dcmitype/"/>
+    <ds:schemaRef ds:uri="http://schemas.microsoft.com/office/infopath/2007/PartnerControls"/>
+    <ds:schemaRef ds:uri="http://schemas.microsoft.com/office/2006/documentManagement/types"/>
+    <ds:schemaRef ds:uri="http://purl.org/dc/elements/1.1/"/>
+    <ds:schemaRef ds:uri="http://schemas.microsoft.com/office/2006/metadata/properties"/>
+    <ds:schemaRef ds:uri="d0879fa5-f2db-41a7-8861-4a44e7ee3b24"/>
+    <ds:schemaRef ds:uri="03cb9dc2-e9ea-44ac-afed-001b6fad4f36"/>
+    <ds:schemaRef ds:uri="http://www.w3.org/XML/1998/namespace"/>
+  </ds:schemaRefs>
+</ds:datastoreItem>
 </file>
</xml_diff>

<commit_message>
doc(demo): update demo and readme
</commit_message>
<xml_diff>
--- a/documentation/slimfaas.pptx
+++ b/documentation/slimfaas.pptx
@@ -240,7 +240,7 @@
           <a:p>
             <a:fld id="{F60FFC85-34C0-4167-8801-71D65E4D986C}" type="datetimeFigureOut">
               <a:rPr lang="fr-FR" smtClean="0"/>
-              <a:t>24/06/2024</a:t>
+              <a:t>08/10/2024</a:t>
             </a:fld>
             <a:endParaRPr lang="fr-FR"/>
           </a:p>
@@ -417,7 +417,7 @@
           <a:p>
             <a:fld id="{F2EE8696-3B2B-7D49-B212-A8F746F3A84B}" type="datetimeFigureOut">
               <a:rPr lang="es-ES_tradnl" smtClean="0"/>
-              <a:t>24/06/2024</a:t>
+              <a:t>08/10/2024</a:t>
             </a:fld>
             <a:endParaRPr lang="es-ES_tradnl"/>
           </a:p>
@@ -1114,7 +1114,7 @@
           <a:p>
             <a:fld id="{80160E5B-2E24-B941-8DE0-C0A90C36B7C5}" type="datetimeFigureOut">
               <a:rPr lang="en-GB" smtClean="0"/>
-              <a:t>24/06/2024</a:t>
+              <a:t>08/10/2024</a:t>
             </a:fld>
             <a:endParaRPr lang="en-GB"/>
           </a:p>
@@ -1312,7 +1312,7 @@
           <a:p>
             <a:fld id="{80160E5B-2E24-B941-8DE0-C0A90C36B7C5}" type="datetimeFigureOut">
               <a:rPr lang="en-GB" smtClean="0"/>
-              <a:t>24/06/2024</a:t>
+              <a:t>08/10/2024</a:t>
             </a:fld>
             <a:endParaRPr lang="en-GB"/>
           </a:p>
@@ -1559,7 +1559,7 @@
           <a:p>
             <a:fld id="{80160E5B-2E24-B941-8DE0-C0A90C36B7C5}" type="datetimeFigureOut">
               <a:rPr lang="en-GB" smtClean="0"/>
-              <a:t>24/06/2024</a:t>
+              <a:t>08/10/2024</a:t>
             </a:fld>
             <a:endParaRPr lang="en-GB"/>
           </a:p>
@@ -1778,7 +1778,7 @@
           <a:p>
             <a:fld id="{80160E5B-2E24-B941-8DE0-C0A90C36B7C5}" type="datetimeFigureOut">
               <a:rPr lang="en-GB" smtClean="0"/>
-              <a:t>24/06/2024</a:t>
+              <a:t>08/10/2024</a:t>
             </a:fld>
             <a:endParaRPr lang="en-GB"/>
           </a:p>
@@ -2053,7 +2053,7 @@
           <a:p>
             <a:fld id="{80160E5B-2E24-B941-8DE0-C0A90C36B7C5}" type="datetimeFigureOut">
               <a:rPr lang="en-GB" smtClean="0"/>
-              <a:t>24/06/2024</a:t>
+              <a:t>08/10/2024</a:t>
             </a:fld>
             <a:endParaRPr lang="en-GB"/>
           </a:p>
@@ -2357,7 +2357,7 @@
           <a:p>
             <a:fld id="{80160E5B-2E24-B941-8DE0-C0A90C36B7C5}" type="datetimeFigureOut">
               <a:rPr lang="en-GB" smtClean="0"/>
-              <a:t>24/06/2024</a:t>
+              <a:t>08/10/2024</a:t>
             </a:fld>
             <a:endParaRPr lang="en-GB"/>
           </a:p>
@@ -2808,7 +2808,7 @@
           <a:p>
             <a:fld id="{80160E5B-2E24-B941-8DE0-C0A90C36B7C5}" type="datetimeFigureOut">
               <a:rPr lang="en-GB" smtClean="0"/>
-              <a:t>24/06/2024</a:t>
+              <a:t>08/10/2024</a:t>
             </a:fld>
             <a:endParaRPr lang="en-GB"/>
           </a:p>
@@ -2988,7 +2988,7 @@
           <a:p>
             <a:fld id="{80160E5B-2E24-B941-8DE0-C0A90C36B7C5}" type="datetimeFigureOut">
               <a:rPr lang="en-GB" smtClean="0"/>
-              <a:t>24/06/2024</a:t>
+              <a:t>08/10/2024</a:t>
             </a:fld>
             <a:endParaRPr lang="en-GB"/>
           </a:p>
@@ -3140,7 +3140,7 @@
           <a:p>
             <a:fld id="{80160E5B-2E24-B941-8DE0-C0A90C36B7C5}" type="datetimeFigureOut">
               <a:rPr lang="en-GB" smtClean="0"/>
-              <a:t>24/06/2024</a:t>
+              <a:t>08/10/2024</a:t>
             </a:fld>
             <a:endParaRPr lang="en-GB"/>
           </a:p>
@@ -3490,7 +3490,7 @@
           <a:p>
             <a:fld id="{80160E5B-2E24-B941-8DE0-C0A90C36B7C5}" type="datetimeFigureOut">
               <a:rPr lang="en-GB" smtClean="0"/>
-              <a:t>24/06/2024</a:t>
+              <a:t>08/10/2024</a:t>
             </a:fld>
             <a:endParaRPr lang="en-GB"/>
           </a:p>
@@ -3817,7 +3817,7 @@
           <a:p>
             <a:fld id="{80160E5B-2E24-B941-8DE0-C0A90C36B7C5}" type="datetimeFigureOut">
               <a:rPr lang="en-GB" smtClean="0"/>
-              <a:t>24/06/2024</a:t>
+              <a:t>08/10/2024</a:t>
             </a:fld>
             <a:endParaRPr lang="en-GB"/>
           </a:p>
@@ -4097,7 +4097,7 @@
           <a:p>
             <a:fld id="{80160E5B-2E24-B941-8DE0-C0A90C36B7C5}" type="datetimeFigureOut">
               <a:rPr lang="en-GB" smtClean="0"/>
-              <a:t>24/06/2024</a:t>
+              <a:t>08/10/2024</a:t>
             </a:fld>
             <a:endParaRPr lang="en-GB"/>
           </a:p>
@@ -5835,8 +5835,8 @@
         </p:nvCxnSpPr>
         <p:spPr>
           <a:xfrm>
-            <a:off x="4995157" y="1657406"/>
-            <a:ext cx="1035899" cy="3881"/>
+            <a:off x="5259755" y="1661287"/>
+            <a:ext cx="771301" cy="0"/>
           </a:xfrm>
           <a:prstGeom prst="straightConnector1">
             <a:avLst/>
@@ -5879,8 +5879,8 @@
         </p:nvSpPr>
         <p:spPr>
           <a:xfrm>
-            <a:off x="48143" y="1288074"/>
-            <a:ext cx="4947014" cy="738664"/>
+            <a:off x="50098" y="1245788"/>
+            <a:ext cx="5209657" cy="830997"/>
           </a:xfrm>
           <a:prstGeom prst="rect">
             <a:avLst/>
@@ -5894,19 +5894,19 @@
           <a:lstStyle/>
           <a:p>
             <a:r>
-              <a:rPr lang="fr-FR" sz="1400" dirty="0"/>
+              <a:rPr lang="fr-FR" sz="1600" dirty="0"/>
               <a:t>HTTP POST</a:t>
             </a:r>
           </a:p>
           <a:p>
             <a:r>
-              <a:rPr lang="fr-FR" sz="1400" dirty="0">
+              <a:rPr lang="fr-FR" sz="1600" dirty="0">
                 <a:hlinkClick r:id="rId4"/>
               </a:rPr>
               <a:t>http://slimfaas/</a:t>
             </a:r>
             <a:r>
-              <a:rPr lang="fr-FR" sz="1400" dirty="0">
+              <a:rPr lang="fr-FR" sz="1600" dirty="0">
                 <a:highlight>
                   <a:srgbClr val="FFFF00"/>
                 </a:highlight>
@@ -5915,13 +5915,13 @@
               <a:t>async-function</a:t>
             </a:r>
             <a:r>
-              <a:rPr lang="fr-FR" sz="1400" dirty="0">
+              <a:rPr lang="fr-FR" sz="1600" dirty="0">
                 <a:hlinkClick r:id="rId4"/>
               </a:rPr>
               <a:t>/</a:t>
             </a:r>
             <a:r>
-              <a:rPr lang="fr-FR" sz="1400" dirty="0">
+              <a:rPr lang="fr-FR" sz="1600" dirty="0">
                 <a:highlight>
                   <a:srgbClr val="00FF00"/>
                 </a:highlight>
@@ -5930,13 +5930,13 @@
               <a:t>fibonacci</a:t>
             </a:r>
             <a:r>
-              <a:rPr lang="fr-FR" sz="1400" dirty="0">
+              <a:rPr lang="fr-FR" sz="1600" dirty="0">
                 <a:hlinkClick r:id="rId4"/>
               </a:rPr>
               <a:t>/</a:t>
             </a:r>
             <a:r>
-              <a:rPr lang="fr-FR" sz="1400" dirty="0">
+              <a:rPr lang="fr-FR" sz="1600" dirty="0">
                 <a:highlight>
                   <a:srgbClr val="FF6C45"/>
                 </a:highlight>
@@ -5944,7 +5944,7 @@
               </a:rPr>
               <a:t>hello/guillaume</a:t>
             </a:r>
-            <a:endParaRPr lang="fr-FR" sz="1400" dirty="0">
+            <a:endParaRPr lang="fr-FR" sz="1600" dirty="0">
               <a:highlight>
                 <a:srgbClr val="FF6C45"/>
               </a:highlight>
@@ -5952,29 +5952,29 @@
           </a:p>
           <a:p>
             <a:r>
-              <a:rPr lang="fr-FR" sz="1400" dirty="0"/>
+              <a:rPr lang="fr-FR" sz="1600" dirty="0"/>
               <a:t>{</a:t>
             </a:r>
             <a:r>
-              <a:rPr lang="fr-FR" sz="1400" b="0" i="0" dirty="0">
+              <a:rPr lang="fr-FR" sz="1600" b="0" i="0" dirty="0">
                 <a:effectLst/>
                 <a:latin typeface="-apple-system"/>
               </a:rPr>
               <a:t>"</a:t>
             </a:r>
             <a:r>
-              <a:rPr lang="fr-FR" sz="1400" dirty="0"/>
+              <a:rPr lang="fr-FR" sz="1600" dirty="0"/>
               <a:t>input</a:t>
             </a:r>
             <a:r>
-              <a:rPr lang="fr-FR" sz="1400" b="0" i="0" dirty="0">
+              <a:rPr lang="fr-FR" sz="1600" b="0" i="0" dirty="0">
                 <a:effectLst/>
                 <a:latin typeface="-apple-system"/>
               </a:rPr>
               <a:t>"</a:t>
             </a:r>
             <a:r>
-              <a:rPr lang="fr-FR" sz="1400" dirty="0"/>
+              <a:rPr lang="fr-FR" sz="1600" dirty="0"/>
               <a:t>:42}</a:t>
             </a:r>
           </a:p>
@@ -6539,7 +6539,7 @@
         </p:nvSpPr>
         <p:spPr>
           <a:xfrm>
-            <a:off x="4179398" y="4170279"/>
+            <a:off x="5814767" y="3822474"/>
             <a:ext cx="1659171" cy="543302"/>
           </a:xfrm>
           <a:prstGeom prst="roundRect">
@@ -6603,9 +6603,9 @@
           <p:nvPr/>
         </p:nvCxnSpPr>
         <p:spPr>
-          <a:xfrm flipV="1">
-            <a:off x="3219449" y="4441930"/>
-            <a:ext cx="959949" cy="3902"/>
+          <a:xfrm>
+            <a:off x="4818185" y="4094125"/>
+            <a:ext cx="996582" cy="0"/>
           </a:xfrm>
           <a:prstGeom prst="straightConnector1">
             <a:avLst/>
@@ -6648,8 +6648,8 @@
         </p:nvSpPr>
         <p:spPr>
           <a:xfrm>
-            <a:off x="72470" y="4122666"/>
-            <a:ext cx="3146979" cy="646331"/>
+            <a:off x="0" y="3632460"/>
+            <a:ext cx="4818185" cy="923330"/>
           </a:xfrm>
           <a:prstGeom prst="rect">
             <a:avLst/>
@@ -6663,19 +6663,19 @@
           <a:lstStyle/>
           <a:p>
             <a:r>
-              <a:rPr lang="fr-FR" sz="1200" dirty="0"/>
+              <a:rPr lang="fr-FR" dirty="0"/>
               <a:t>HTTP POST</a:t>
             </a:r>
           </a:p>
           <a:p>
             <a:r>
-              <a:rPr lang="fr-FR" sz="1200" dirty="0">
+              <a:rPr lang="fr-FR" dirty="0">
                 <a:hlinkClick r:id="rId2"/>
               </a:rPr>
               <a:t>http://slimfaas/</a:t>
             </a:r>
             <a:r>
-              <a:rPr lang="fr-FR" sz="1200" dirty="0">
+              <a:rPr lang="fr-FR" dirty="0">
                 <a:highlight>
                   <a:srgbClr val="FFFF00"/>
                 </a:highlight>
@@ -6684,13 +6684,13 @@
               <a:t>publish-event</a:t>
             </a:r>
             <a:r>
-              <a:rPr lang="fr-FR" sz="1200" dirty="0">
+              <a:rPr lang="fr-FR" dirty="0">
                 <a:hlinkClick r:id="rId2"/>
               </a:rPr>
               <a:t>/</a:t>
             </a:r>
             <a:r>
-              <a:rPr lang="fr-FR" sz="1200" dirty="0">
+              <a:rPr lang="fr-FR" dirty="0">
                 <a:highlight>
                   <a:srgbClr val="00FF00"/>
                 </a:highlight>
@@ -6699,11 +6699,11 @@
               <a:t>fib-event</a:t>
             </a:r>
             <a:r>
-              <a:rPr lang="fr-FR" sz="1200" dirty="0"/>
+              <a:rPr lang="fr-FR" dirty="0"/>
               <a:t>/</a:t>
             </a:r>
             <a:r>
-              <a:rPr lang="fr-FR" sz="1200" dirty="0">
+              <a:rPr lang="fr-FR" dirty="0">
                 <a:highlight>
                   <a:srgbClr val="FF6C45"/>
                 </a:highlight>
@@ -6713,29 +6713,29 @@
           </a:p>
           <a:p>
             <a:r>
-              <a:rPr lang="fr-FR" sz="1200" dirty="0"/>
+              <a:rPr lang="fr-FR" dirty="0"/>
               <a:t>{</a:t>
             </a:r>
             <a:r>
-              <a:rPr lang="fr-FR" sz="1200" b="0" i="0" dirty="0">
+              <a:rPr lang="fr-FR" b="0" i="0" dirty="0">
                 <a:effectLst/>
                 <a:latin typeface="-apple-system"/>
               </a:rPr>
               <a:t>"</a:t>
             </a:r>
             <a:r>
-              <a:rPr lang="fr-FR" sz="1200" dirty="0"/>
+              <a:rPr lang="fr-FR" dirty="0"/>
               <a:t>input</a:t>
             </a:r>
             <a:r>
-              <a:rPr lang="fr-FR" sz="1200" b="0" i="0" dirty="0">
+              <a:rPr lang="fr-FR" b="0" i="0" dirty="0">
                 <a:effectLst/>
                 <a:latin typeface="-apple-system"/>
               </a:rPr>
               <a:t>"</a:t>
             </a:r>
             <a:r>
-              <a:rPr lang="fr-FR" sz="1200" dirty="0"/>
+              <a:rPr lang="fr-FR" dirty="0"/>
               <a:t>:42}</a:t>
             </a:r>
           </a:p>
@@ -6755,8 +6755,8 @@
         </p:nvSpPr>
         <p:spPr>
           <a:xfrm>
-            <a:off x="8812332" y="2979399"/>
-            <a:ext cx="3144316" cy="830997"/>
+            <a:off x="5893462" y="1629886"/>
+            <a:ext cx="2330078" cy="923330"/>
           </a:xfrm>
           <a:prstGeom prst="rect">
             <a:avLst/>
@@ -6770,19 +6770,19 @@
           <a:lstStyle/>
           <a:p>
             <a:r>
-              <a:rPr lang="fr-FR" sz="1600" dirty="0"/>
+              <a:rPr lang="fr-FR" dirty="0"/>
               <a:t>HTTP POST</a:t>
             </a:r>
           </a:p>
           <a:p>
             <a:r>
-              <a:rPr lang="fr-FR" sz="1600" dirty="0">
+              <a:rPr lang="fr-FR" dirty="0">
                 <a:hlinkClick r:id="rId3"/>
               </a:rPr>
               <a:t>http://fibonacci/</a:t>
             </a:r>
             <a:r>
-              <a:rPr lang="fr-FR" sz="1600" dirty="0">
+              <a:rPr lang="fr-FR" dirty="0">
                 <a:highlight>
                   <a:srgbClr val="FF6C45"/>
                 </a:highlight>
@@ -6791,32 +6791,32 @@
               <a:t>path</a:t>
             </a:r>
             <a:br>
-              <a:rPr lang="fr-FR" sz="1600" dirty="0"/>
+              <a:rPr lang="fr-FR" dirty="0"/>
             </a:br>
             <a:r>
-              <a:rPr lang="fr-FR" sz="1600" dirty="0"/>
+              <a:rPr lang="fr-FR" dirty="0"/>
               <a:t>{</a:t>
             </a:r>
             <a:r>
-              <a:rPr lang="fr-FR" sz="1600" b="0" i="0" dirty="0">
+              <a:rPr lang="fr-FR" b="0" i="0" dirty="0">
                 <a:effectLst/>
                 <a:latin typeface="-apple-system"/>
               </a:rPr>
               <a:t>"</a:t>
             </a:r>
             <a:r>
-              <a:rPr lang="fr-FR" sz="1600" dirty="0"/>
+              <a:rPr lang="fr-FR" dirty="0"/>
               <a:t>input</a:t>
             </a:r>
             <a:r>
-              <a:rPr lang="fr-FR" sz="1600" b="0" i="0" dirty="0">
+              <a:rPr lang="fr-FR" b="0" i="0" dirty="0">
                 <a:effectLst/>
                 <a:latin typeface="-apple-system"/>
               </a:rPr>
               <a:t>"</a:t>
             </a:r>
             <a:r>
-              <a:rPr lang="fr-FR" sz="1600" dirty="0"/>
+              <a:rPr lang="fr-FR" dirty="0"/>
               <a:t>:42}</a:t>
             </a:r>
           </a:p>
@@ -6953,8 +6953,8 @@
         </p:nvCxnSpPr>
         <p:spPr>
           <a:xfrm flipV="1">
-            <a:off x="5838569" y="937506"/>
-            <a:ext cx="2973764" cy="3504424"/>
+            <a:off x="7473938" y="937506"/>
+            <a:ext cx="1338395" cy="3156619"/>
           </a:xfrm>
           <a:prstGeom prst="straightConnector1">
             <a:avLst/>
@@ -7001,8 +7001,8 @@
         </p:nvCxnSpPr>
         <p:spPr>
           <a:xfrm flipV="1">
-            <a:off x="5838569" y="2360768"/>
-            <a:ext cx="2973764" cy="2081162"/>
+            <a:off x="7473938" y="2360768"/>
+            <a:ext cx="1338395" cy="1733357"/>
           </a:xfrm>
           <a:prstGeom prst="straightConnector1">
             <a:avLst/>
@@ -7045,14 +7045,16 @@
         </p:nvSpPr>
         <p:spPr>
           <a:xfrm>
-            <a:off x="819054" y="522900"/>
+            <a:off x="235352" y="275936"/>
             <a:ext cx="4922420" cy="1227315"/>
           </a:xfrm>
           <a:prstGeom prst="roundRect">
             <a:avLst/>
           </a:prstGeom>
           <a:solidFill>
-            <a:srgbClr val="7030A0"/>
+            <a:schemeClr val="bg1">
+              <a:lumMod val="50000"/>
+            </a:schemeClr>
           </a:solidFill>
           <a:ln>
             <a:noFill/>
@@ -7096,7 +7098,7 @@
                   <a:schemeClr val="bg1"/>
                 </a:solidFill>
               </a:rPr>
-              <a:t>other</a:t>
+              <a:t>fibonacci</a:t>
             </a:r>
           </a:p>
           <a:p>
@@ -7518,8 +7520,8 @@
         </p:nvCxnSpPr>
         <p:spPr>
           <a:xfrm>
-            <a:off x="5838569" y="4441930"/>
-            <a:ext cx="2973764" cy="159994"/>
+            <a:off x="7473938" y="4094125"/>
+            <a:ext cx="1338395" cy="507799"/>
           </a:xfrm>
           <a:prstGeom prst="straightConnector1">
             <a:avLst/>
@@ -7566,8 +7568,8 @@
         </p:nvCxnSpPr>
         <p:spPr>
           <a:xfrm>
-            <a:off x="5838569" y="4441930"/>
-            <a:ext cx="2973764" cy="1588093"/>
+            <a:off x="7473938" y="4094125"/>
+            <a:ext cx="1338395" cy="1935898"/>
           </a:xfrm>
           <a:prstGeom prst="straightConnector1">
             <a:avLst/>
@@ -7610,14 +7612,16 @@
         </p:nvSpPr>
         <p:spPr>
           <a:xfrm>
-            <a:off x="819054" y="1999049"/>
+            <a:off x="235352" y="1752085"/>
             <a:ext cx="4922420" cy="1227314"/>
           </a:xfrm>
           <a:prstGeom prst="roundRect">
             <a:avLst/>
           </a:prstGeom>
           <a:solidFill>
-            <a:srgbClr val="7030A0"/>
+            <a:schemeClr val="bg1">
+              <a:lumMod val="50000"/>
+            </a:schemeClr>
           </a:solidFill>
           <a:ln>
             <a:noFill/>
@@ -7692,6 +7696,87 @@
                 </a:solidFill>
               </a:rPr>
               <a:t>"</a:t>
+            </a:r>
+          </a:p>
+        </p:txBody>
+      </p:sp>
+      <p:sp>
+        <p:nvSpPr>
+          <p:cNvPr id="4" name="ZoneTexte 3">
+            <a:extLst>
+              <a:ext uri="{FF2B5EF4-FFF2-40B4-BE49-F238E27FC236}">
+                <a16:creationId xmlns:a16="http://schemas.microsoft.com/office/drawing/2014/main" id="{14E1F493-8193-9296-F981-B40EC109296F}"/>
+              </a:ext>
+            </a:extLst>
+          </p:cNvPr>
+          <p:cNvSpPr txBox="1"/>
+          <p:nvPr/>
+        </p:nvSpPr>
+        <p:spPr>
+          <a:xfrm>
+            <a:off x="6049579" y="4814452"/>
+            <a:ext cx="2368152" cy="923330"/>
+          </a:xfrm>
+          <a:prstGeom prst="rect">
+            <a:avLst/>
+          </a:prstGeom>
+          <a:noFill/>
+        </p:spPr>
+        <p:txBody>
+          <a:bodyPr wrap="square" rtlCol="0">
+            <a:spAutoFit/>
+          </a:bodyPr>
+          <a:lstStyle/>
+          <a:p>
+            <a:r>
+              <a:rPr lang="fr-FR" dirty="0"/>
+              <a:t>HTTP POST</a:t>
+            </a:r>
+          </a:p>
+          <a:p>
+            <a:r>
+              <a:rPr lang="fr-FR" dirty="0">
+                <a:hlinkClick r:id="rId3"/>
+              </a:rPr>
+              <a:t>http://other/</a:t>
+            </a:r>
+            <a:r>
+              <a:rPr lang="fr-FR" dirty="0">
+                <a:highlight>
+                  <a:srgbClr val="FF6C45"/>
+                </a:highlight>
+                <a:hlinkClick r:id="rId3"/>
+              </a:rPr>
+              <a:t>path</a:t>
+            </a:r>
+            <a:br>
+              <a:rPr lang="fr-FR" dirty="0"/>
+            </a:br>
+            <a:r>
+              <a:rPr lang="fr-FR" dirty="0"/>
+              <a:t>{</a:t>
+            </a:r>
+            <a:r>
+              <a:rPr lang="fr-FR" b="0" i="0" dirty="0">
+                <a:effectLst/>
+                <a:latin typeface="-apple-system"/>
+              </a:rPr>
+              <a:t>"</a:t>
+            </a:r>
+            <a:r>
+              <a:rPr lang="fr-FR" dirty="0"/>
+              <a:t>input</a:t>
+            </a:r>
+            <a:r>
+              <a:rPr lang="fr-FR" b="0" i="0" dirty="0">
+                <a:effectLst/>
+                <a:latin typeface="-apple-system"/>
+              </a:rPr>
+              <a:t>"</a:t>
+            </a:r>
+            <a:r>
+              <a:rPr lang="fr-FR" dirty="0"/>
+              <a:t>:42}</a:t>
             </a:r>
           </a:p>
         </p:txBody>
@@ -9567,8 +9652,8 @@
         </p:nvSpPr>
         <p:spPr bwMode="auto">
           <a:xfrm>
-            <a:off x="8050138" y="2485340"/>
-            <a:ext cx="2488839" cy="246221"/>
+            <a:off x="8050138" y="2423785"/>
+            <a:ext cx="2488839" cy="369332"/>
           </a:xfrm>
           <a:prstGeom prst="rect">
             <a:avLst/>
@@ -9607,7 +9692,7 @@
               <a:tabLst/>
             </a:pPr>
             <a:r>
-              <a:rPr kumimoji="0" lang="fr-FR" altLang="fr-FR" sz="1600" b="0" i="0" u="none" strike="noStrike" cap="none" normalizeH="0" baseline="0" dirty="0" err="1">
+              <a:rPr kumimoji="0" lang="fr-FR" altLang="fr-FR" sz="2400" b="0" i="0" u="none" strike="noStrike" cap="none" normalizeH="0" baseline="0" dirty="0">
                 <a:ln>
                   <a:noFill/>
                 </a:ln>
@@ -9617,49 +9702,10 @@
                 <a:effectLst/>
                 <a:latin typeface="var(--fontStack-monospace, ui-monospace, SFMono-Regular, SF Mono, Menlo, Consolas, Liberation Mono, monospace)"/>
               </a:rPr>
-              <a:t>Internal</a:t>
-            </a:r>
-            <a:r>
-              <a:rPr kumimoji="0" lang="fr-FR" altLang="fr-FR" sz="1600" b="0" i="0" u="none" strike="noStrike" cap="none" normalizeH="0" baseline="0" dirty="0">
-                <a:ln>
-                  <a:noFill/>
-                </a:ln>
-                <a:solidFill>
-                  <a:srgbClr val="FF6C45"/>
-                </a:solidFill>
-                <a:effectLst/>
-                <a:latin typeface="var(--fontStack-monospace, ui-monospace, SFMono-Regular, SF Mono, Menlo, Consolas, Liberation Mono, monospace)"/>
-              </a:rPr>
-              <a:t> </a:t>
-            </a:r>
-            <a:r>
-              <a:rPr kumimoji="0" lang="fr-FR" altLang="fr-FR" sz="1600" b="0" i="0" u="none" strike="noStrike" cap="none" normalizeH="0" baseline="0" dirty="0" err="1">
-                <a:ln>
-                  <a:noFill/>
-                </a:ln>
-                <a:solidFill>
-                  <a:srgbClr val="FF6C45"/>
-                </a:solidFill>
-                <a:effectLst/>
-                <a:latin typeface="var(--fontStack-monospace, ui-monospace, SFMono-Regular, SF Mono, Menlo, Consolas, Liberation Mono, monospace)"/>
-              </a:rPr>
-              <a:t>SimData</a:t>
-            </a:r>
-            <a:r>
-              <a:rPr kumimoji="0" lang="fr-FR" altLang="fr-FR" sz="1600" b="0" i="0" u="none" strike="noStrike" cap="none" normalizeH="0" baseline="0" dirty="0">
-                <a:ln>
-                  <a:noFill/>
-                </a:ln>
-                <a:solidFill>
-                  <a:srgbClr val="FF6C45"/>
-                </a:solidFill>
-                <a:effectLst/>
-                <a:latin typeface="var(--fontStack-monospace, ui-monospace, SFMono-Regular, SF Mono, Menlo, Consolas, Liberation Mono, monospace)"/>
-              </a:rPr>
-              <a:t> Port: 3262</a:t>
-            </a:r>
-            <a:r>
-              <a:rPr kumimoji="0" lang="fr-FR" altLang="fr-FR" sz="1400" b="0" i="0" u="none" strike="noStrike" cap="none" normalizeH="0" baseline="0" dirty="0">
+              <a:t>Port: 3262</a:t>
+            </a:r>
+            <a:r>
+              <a:rPr kumimoji="0" lang="fr-FR" altLang="fr-FR" sz="2000" b="0" i="0" u="none" strike="noStrike" cap="none" normalizeH="0" baseline="0" dirty="0">
                 <a:ln>
                   <a:noFill/>
                 </a:ln>
@@ -9670,7 +9716,7 @@
               </a:rPr>
               <a:t> </a:t>
             </a:r>
-            <a:endParaRPr kumimoji="0" lang="fr-FR" altLang="fr-FR" sz="4000" b="0" i="0" u="none" strike="noStrike" cap="none" normalizeH="0" baseline="0" dirty="0">
+            <a:endParaRPr kumimoji="0" lang="fr-FR" altLang="fr-FR" sz="5400" b="0" i="0" u="none" strike="noStrike" cap="none" normalizeH="0" baseline="0" dirty="0">
               <a:ln>
                 <a:noFill/>
               </a:ln>
@@ -9829,8 +9875,8 @@
         </p:nvSpPr>
         <p:spPr>
           <a:xfrm>
-            <a:off x="165248" y="3204084"/>
-            <a:ext cx="4782639" cy="738664"/>
+            <a:off x="165249" y="3204084"/>
+            <a:ext cx="4223206" cy="1323439"/>
           </a:xfrm>
           <a:prstGeom prst="rect">
             <a:avLst/>
@@ -9844,44 +9890,44 @@
           <a:lstStyle/>
           <a:p>
             <a:r>
-              <a:rPr lang="fr-FR" sz="1400" dirty="0"/>
+              <a:rPr lang="fr-FR" sz="2000" dirty="0"/>
               <a:t>HTTP POST</a:t>
             </a:r>
           </a:p>
           <a:p>
             <a:r>
-              <a:rPr lang="fr-FR" sz="1400" dirty="0">
+              <a:rPr lang="fr-FR" sz="2000" dirty="0">
                 <a:hlinkClick r:id="rId3"/>
               </a:rPr>
               <a:t>http://slimfaas/async-function/fibonacci/hello/guillaume</a:t>
             </a:r>
-            <a:endParaRPr lang="fr-FR" sz="1400" dirty="0"/>
-          </a:p>
-          <a:p>
-            <a:r>
-              <a:rPr lang="fr-FR" sz="1400" dirty="0"/>
+            <a:endParaRPr lang="fr-FR" sz="2000" dirty="0"/>
+          </a:p>
+          <a:p>
+            <a:r>
+              <a:rPr lang="fr-FR" sz="2000" dirty="0"/>
               <a:t>{</a:t>
             </a:r>
             <a:r>
-              <a:rPr lang="fr-FR" sz="1400" b="0" i="0" dirty="0">
+              <a:rPr lang="fr-FR" sz="2000" b="0" i="0" dirty="0">
                 <a:effectLst/>
                 <a:latin typeface="-apple-system"/>
               </a:rPr>
               <a:t>"</a:t>
             </a:r>
             <a:r>
-              <a:rPr lang="fr-FR" sz="1400" dirty="0"/>
+              <a:rPr lang="fr-FR" sz="2000" dirty="0"/>
               <a:t>input</a:t>
             </a:r>
             <a:r>
-              <a:rPr lang="fr-FR" sz="1400" b="0" i="0" dirty="0">
+              <a:rPr lang="fr-FR" sz="2000" b="0" i="0" dirty="0">
                 <a:effectLst/>
                 <a:latin typeface="-apple-system"/>
               </a:rPr>
               <a:t>"</a:t>
             </a:r>
             <a:r>
-              <a:rPr lang="fr-FR" sz="1400" dirty="0"/>
+              <a:rPr lang="fr-FR" sz="2000" dirty="0"/>
               <a:t>:42}</a:t>
             </a:r>
           </a:p>
@@ -9905,8 +9951,8 @@
         </p:nvCxnSpPr>
         <p:spPr>
           <a:xfrm>
-            <a:off x="4947887" y="3573416"/>
-            <a:ext cx="1784118" cy="1171417"/>
+            <a:off x="4388455" y="3865804"/>
+            <a:ext cx="2343550" cy="879029"/>
           </a:xfrm>
           <a:prstGeom prst="straightConnector1">
             <a:avLst/>
@@ -10125,8 +10171,8 @@
         </p:nvSpPr>
         <p:spPr bwMode="auto">
           <a:xfrm>
-            <a:off x="6208595" y="4045110"/>
-            <a:ext cx="1260230" cy="246221"/>
+            <a:off x="5151898" y="3686005"/>
+            <a:ext cx="1784118" cy="369332"/>
           </a:xfrm>
           <a:prstGeom prst="rect">
             <a:avLst/>
@@ -10163,7 +10209,7 @@
               <a:tabLst/>
             </a:pPr>
             <a:r>
-              <a:rPr kumimoji="0" lang="fr-FR" altLang="fr-FR" sz="1600" b="0" i="0" u="none" strike="noStrike" cap="none" normalizeH="0" baseline="0" dirty="0">
+              <a:rPr kumimoji="0" lang="fr-FR" altLang="fr-FR" sz="2400" b="0" i="0" u="none" strike="noStrike" cap="none" normalizeH="0" baseline="0" dirty="0">
                 <a:ln>
                   <a:noFill/>
                 </a:ln>
@@ -10176,7 +10222,7 @@
               <a:t>Port: 5000</a:t>
             </a:r>
             <a:r>
-              <a:rPr kumimoji="0" lang="fr-FR" altLang="fr-FR" sz="1400" b="0" i="0" u="none" strike="noStrike" cap="none" normalizeH="0" baseline="0" dirty="0">
+              <a:rPr kumimoji="0" lang="fr-FR" altLang="fr-FR" sz="2000" b="0" i="0" u="none" strike="noStrike" cap="none" normalizeH="0" baseline="0" dirty="0">
                 <a:ln>
                   <a:noFill/>
                 </a:ln>
@@ -10187,7 +10233,7 @@
               </a:rPr>
               <a:t> </a:t>
             </a:r>
-            <a:endParaRPr kumimoji="0" lang="fr-FR" altLang="fr-FR" sz="4000" b="0" i="0" u="none" strike="noStrike" cap="none" normalizeH="0" baseline="0" dirty="0">
+            <a:endParaRPr kumimoji="0" lang="fr-FR" altLang="fr-FR" sz="5400" b="0" i="0" u="none" strike="noStrike" cap="none" normalizeH="0" baseline="0" dirty="0">
               <a:ln>
                 <a:noFill/>
               </a:ln>
@@ -11065,34 +11111,6 @@
 </file>
 
 <file path=customXml/item1.xml><?xml version="1.0" encoding="utf-8"?>
-<p:properties xmlns:p="http://schemas.microsoft.com/office/2006/metadata/properties" xmlns:xsi="http://www.w3.org/2001/XMLSchema-instance" xmlns:pc="http://schemas.microsoft.com/office/infopath/2007/PartnerControls">
-  <documentManagement>
-    <SharedWithUsers xmlns="03cb9dc2-e9ea-44ac-afed-001b6fad4f36">
-      <UserInfo>
-        <DisplayName>LEMARCHAND THOMAS</DisplayName>
-        <AccountId>16</AccountId>
-        <AccountType/>
-      </UserInfo>
-      <UserInfo>
-        <DisplayName>CHERVET Guillaume</DisplayName>
-        <AccountId>84</AccountId>
-        <AccountType/>
-      </UserInfo>
-    </SharedWithUsers>
-  </documentManagement>
-</p:properties>
-</file>
-
-<file path=customXml/item2.xml><?xml version="1.0" encoding="utf-8"?>
-<?mso-contentType ?>
-<FormTemplates xmlns="http://schemas.microsoft.com/sharepoint/v3/contenttype/forms">
-  <Display>DocumentLibraryForm</Display>
-  <Edit>DocumentLibraryForm</Edit>
-  <New>DocumentLibraryForm</New>
-</FormTemplates>
-</file>
-
-<file path=customXml/item3.xml><?xml version="1.0" encoding="utf-8"?>
 <ct:contentTypeSchema xmlns:ct="http://schemas.microsoft.com/office/2006/metadata/contentType" xmlns:ma="http://schemas.microsoft.com/office/2006/metadata/properties/metaAttributes" ct:_="" ma:_="" ma:contentTypeName="Document" ma:contentTypeID="0x0101003BE0F011240A094E827BA56BE9109944" ma:contentTypeVersion="13" ma:contentTypeDescription="Create a new document." ma:contentTypeScope="" ma:versionID="5dc1144dd420c1d8a9ebf51c7358c8f0">
   <xsd:schema xmlns:xsd="http://www.w3.org/2001/XMLSchema" xmlns:xs="http://www.w3.org/2001/XMLSchema" xmlns:p="http://schemas.microsoft.com/office/2006/metadata/properties" xmlns:ns3="03cb9dc2-e9ea-44ac-afed-001b6fad4f36" xmlns:ns4="d0879fa5-f2db-41a7-8861-4a44e7ee3b24" targetNamespace="http://schemas.microsoft.com/office/2006/metadata/properties" ma:root="true" ma:fieldsID="6dda18631f78ef64168f1da1c53d30ff" ns3:_="" ns4:_="">
     <xsd:import namespace="03cb9dc2-e9ea-44ac-afed-001b6fad4f36"/>
@@ -11315,32 +11333,35 @@
 </ct:contentTypeSchema>
 </file>
 
-<file path=customXml/itemProps1.xml><?xml version="1.0" encoding="utf-8"?>
-<ds:datastoreItem xmlns:ds="http://schemas.openxmlformats.org/officeDocument/2006/customXml" ds:itemID="{C522BBC0-3E7A-472B-9CC6-34C5EA434DEE}">
-  <ds:schemaRefs>
-    <ds:schemaRef ds:uri="http://purl.org/dc/terms/"/>
-    <ds:schemaRef ds:uri="http://schemas.openxmlformats.org/package/2006/metadata/core-properties"/>
-    <ds:schemaRef ds:uri="http://purl.org/dc/dcmitype/"/>
-    <ds:schemaRef ds:uri="http://schemas.microsoft.com/office/infopath/2007/PartnerControls"/>
-    <ds:schemaRef ds:uri="http://schemas.microsoft.com/office/2006/documentManagement/types"/>
-    <ds:schemaRef ds:uri="http://purl.org/dc/elements/1.1/"/>
-    <ds:schemaRef ds:uri="http://schemas.microsoft.com/office/2006/metadata/properties"/>
-    <ds:schemaRef ds:uri="d0879fa5-f2db-41a7-8861-4a44e7ee3b24"/>
-    <ds:schemaRef ds:uri="03cb9dc2-e9ea-44ac-afed-001b6fad4f36"/>
-    <ds:schemaRef ds:uri="http://www.w3.org/XML/1998/namespace"/>
-  </ds:schemaRefs>
-</ds:datastoreItem>
+<file path=customXml/item2.xml><?xml version="1.0" encoding="utf-8"?>
+<?mso-contentType ?>
+<FormTemplates xmlns="http://schemas.microsoft.com/sharepoint/v3/contenttype/forms">
+  <Display>DocumentLibraryForm</Display>
+  <Edit>DocumentLibraryForm</Edit>
+  <New>DocumentLibraryForm</New>
+</FormTemplates>
 </file>
 
-<file path=customXml/itemProps2.xml><?xml version="1.0" encoding="utf-8"?>
-<ds:datastoreItem xmlns:ds="http://schemas.openxmlformats.org/officeDocument/2006/customXml" ds:itemID="{05D7AB42-0DA9-4407-9B22-92C435FE7C62}">
-  <ds:schemaRefs>
-    <ds:schemaRef ds:uri="http://schemas.microsoft.com/sharepoint/v3/contenttype/forms"/>
-  </ds:schemaRefs>
-</ds:datastoreItem>
+<file path=customXml/item3.xml><?xml version="1.0" encoding="utf-8"?>
+<p:properties xmlns:p="http://schemas.microsoft.com/office/2006/metadata/properties" xmlns:xsi="http://www.w3.org/2001/XMLSchema-instance" xmlns:pc="http://schemas.microsoft.com/office/infopath/2007/PartnerControls">
+  <documentManagement>
+    <SharedWithUsers xmlns="03cb9dc2-e9ea-44ac-afed-001b6fad4f36">
+      <UserInfo>
+        <DisplayName>LEMARCHAND THOMAS</DisplayName>
+        <AccountId>16</AccountId>
+        <AccountType/>
+      </UserInfo>
+      <UserInfo>
+        <DisplayName>CHERVET Guillaume</DisplayName>
+        <AccountId>84</AccountId>
+        <AccountType/>
+      </UserInfo>
+    </SharedWithUsers>
+  </documentManagement>
+</p:properties>
 </file>
 
-<file path=customXml/itemProps3.xml><?xml version="1.0" encoding="utf-8"?>
+<file path=customXml/itemProps1.xml><?xml version="1.0" encoding="utf-8"?>
 <ds:datastoreItem xmlns:ds="http://schemas.openxmlformats.org/officeDocument/2006/customXml" ds:itemID="{C72C7657-97CD-4958-88DD-F8AC87258741}">
   <ds:schemaRefs>
     <ds:schemaRef ds:uri="http://schemas.microsoft.com/office/2006/metadata/contentType"/>
@@ -11357,4 +11378,29 @@
     <ds:schemaRef ds:uri="http://schemas.microsoft.com/internal/obd"/>
   </ds:schemaRefs>
 </ds:datastoreItem>
+</file>
+
+<file path=customXml/itemProps2.xml><?xml version="1.0" encoding="utf-8"?>
+<ds:datastoreItem xmlns:ds="http://schemas.openxmlformats.org/officeDocument/2006/customXml" ds:itemID="{05D7AB42-0DA9-4407-9B22-92C435FE7C62}">
+  <ds:schemaRefs>
+    <ds:schemaRef ds:uri="http://schemas.microsoft.com/sharepoint/v3/contenttype/forms"/>
+  </ds:schemaRefs>
+</ds:datastoreItem>
+</file>
+
+<file path=customXml/itemProps3.xml><?xml version="1.0" encoding="utf-8"?>
+<ds:datastoreItem xmlns:ds="http://schemas.openxmlformats.org/officeDocument/2006/customXml" ds:itemID="{C522BBC0-3E7A-472B-9CC6-34C5EA434DEE}">
+  <ds:schemaRefs>
+    <ds:schemaRef ds:uri="http://purl.org/dc/terms/"/>
+    <ds:schemaRef ds:uri="http://schemas.openxmlformats.org/package/2006/metadata/core-properties"/>
+    <ds:schemaRef ds:uri="http://purl.org/dc/dcmitype/"/>
+    <ds:schemaRef ds:uri="http://schemas.microsoft.com/office/infopath/2007/PartnerControls"/>
+    <ds:schemaRef ds:uri="http://schemas.microsoft.com/office/2006/documentManagement/types"/>
+    <ds:schemaRef ds:uri="http://purl.org/dc/elements/1.1/"/>
+    <ds:schemaRef ds:uri="http://schemas.microsoft.com/office/2006/metadata/properties"/>
+    <ds:schemaRef ds:uri="d0879fa5-f2db-41a7-8861-4a44e7ee3b24"/>
+    <ds:schemaRef ds:uri="03cb9dc2-e9ea-44ac-afed-001b6fad4f36"/>
+    <ds:schemaRef ds:uri="http://www.w3.org/XML/1998/namespace"/>
+  </ds:schemaRefs>
+</ds:datastoreItem>
 </file>
</xml_diff>